<commit_message>
add: 2024.CA.C (greedy & sort problem) & upd: math problm
</commit_message>
<xml_diff>
--- a/Paper Reading/____Writing/Fig_Overview.pptx
+++ b/Paper Reading/____Writing/Fig_Overview.pptx
@@ -342,7 +342,7 @@
           <a:p>
             <a:fld id="{B7268E1E-0E44-426D-905E-8AD9B19D2182}" type="datetimeFigureOut">
               <a:rPr lang="cs-CZ" smtClean="0"/>
-              <a:t>28.02.2025</a:t>
+              <a:t>02.03.2025</a:t>
             </a:fld>
             <a:endParaRPr lang="cs-CZ"/>
           </a:p>
@@ -11356,44 +11356,120 @@
           <a:chExt cx="0" cy="0"/>
         </a:xfrm>
       </p:grpSpPr>
+      <p:sp>
+        <p:nvSpPr>
+          <p:cNvPr id="8" name="AutoShape 8"/>
+          <p:cNvSpPr/>
+          <p:nvPr/>
+        </p:nvSpPr>
+        <p:spPr>
+          <a:xfrm>
+            <a:off x="175563" y="132767"/>
+            <a:ext cx="2219315" cy="2297141"/>
+          </a:xfrm>
+          <a:prstGeom prst="roundRect">
+            <a:avLst>
+              <a:gd name="adj" fmla="val 0"/>
+            </a:avLst>
+          </a:prstGeom>
+          <a:noFill/>
+          <a:ln w="25400" cap="flat">
+            <a:solidFill>
+              <a:srgbClr val="000000">
+                <a:alpha val="100000"/>
+              </a:srgbClr>
+            </a:solidFill>
+            <a:prstDash val="dash"/>
+          </a:ln>
+        </p:spPr>
+        <p:txBody>
+          <a:bodyPr lIns="91440" tIns="45720" rIns="91440" bIns="45720" rtlCol="0" anchor="ctr">
+            <a:noAutofit/>
+          </a:bodyPr>
+          <a:lstStyle/>
+          <a:p>
+            <a:pPr algn="ctr">
+              <a:defRPr/>
+            </a:pPr>
+            <a:endParaRPr dirty="0"/>
+          </a:p>
+        </p:txBody>
+      </p:sp>
+      <p:sp>
+        <p:nvSpPr>
+          <p:cNvPr id="9" name="AutoShape 9"/>
+          <p:cNvSpPr/>
+          <p:nvPr/>
+        </p:nvSpPr>
+        <p:spPr>
+          <a:xfrm>
+            <a:off x="208478" y="132767"/>
+            <a:ext cx="2191336" cy="368300"/>
+          </a:xfrm>
+          <a:prstGeom prst="rect">
+            <a:avLst/>
+          </a:prstGeom>
+          <a:noFill/>
+          <a:ln w="12700">
+            <a:noFill/>
+            <a:prstDash val="solid"/>
+          </a:ln>
+        </p:spPr>
+        <p:txBody>
+          <a:bodyPr lIns="91440" tIns="45720" rIns="91440" bIns="45720" rtlCol="0" anchor="t">
+            <a:noAutofit/>
+          </a:bodyPr>
+          <a:lstStyle/>
+          <a:p>
+            <a:pPr>
+              <a:defRPr/>
+            </a:pPr>
+            <a:r>
+              <a:rPr lang="en-US" sz="1800" b="1" dirty="0"/>
+              <a:t>Project Collection</a:t>
+            </a:r>
+            <a:endParaRPr lang="en-US" sz="1100" dirty="0"/>
+          </a:p>
+        </p:txBody>
+      </p:sp>
       <p:grpSp>
         <p:nvGrpSpPr>
-          <p:cNvPr id="7" name="Group 7"/>
+          <p:cNvPr id="10" name="Group 10"/>
           <p:cNvGrpSpPr/>
           <p:nvPr/>
         </p:nvGrpSpPr>
         <p:grpSpPr>
           <a:xfrm>
-            <a:off x="118560" y="339379"/>
-            <a:ext cx="2253544" cy="3178734"/>
-            <a:chOff x="151272" y="1232151"/>
-            <a:chExt cx="2253544" cy="3178734"/>
+            <a:off x="394062" y="471834"/>
+            <a:ext cx="1912105" cy="363206"/>
+            <a:chOff x="263549" y="1618545"/>
+            <a:chExt cx="1912105" cy="363206"/>
           </a:xfrm>
         </p:grpSpPr>
         <p:sp>
           <p:nvSpPr>
-            <p:cNvPr id="8" name="AutoShape 8"/>
+            <p:cNvPr id="11" name="AutoShape 11"/>
             <p:cNvSpPr/>
             <p:nvPr/>
           </p:nvSpPr>
           <p:spPr>
             <a:xfrm>
-              <a:off x="151272" y="1232151"/>
-              <a:ext cx="2253544" cy="3178734"/>
+              <a:off x="263549" y="1618545"/>
+              <a:ext cx="1832302" cy="363206"/>
             </a:xfrm>
             <a:prstGeom prst="roundRect">
               <a:avLst>
-                <a:gd name="adj" fmla="val 0"/>
+                <a:gd name="adj" fmla="val 6803"/>
               </a:avLst>
             </a:prstGeom>
             <a:noFill/>
             <a:ln w="25400" cap="flat">
               <a:solidFill>
-                <a:srgbClr val="000000">
+                <a:srgbClr val="262626">
                   <a:alpha val="100000"/>
                 </a:srgbClr>
               </a:solidFill>
-              <a:prstDash val="dash"/>
+              <a:prstDash val="solid"/>
             </a:ln>
           </p:spPr>
           <p:txBody>
@@ -11405,20 +11481,49 @@
               <a:pPr algn="ctr">
                 <a:defRPr/>
               </a:pPr>
-              <a:endParaRPr/>
+              <a:endParaRPr dirty="0"/>
             </a:p>
           </p:txBody>
         </p:sp>
+        <p:pic>
+          <p:nvPicPr>
+            <p:cNvPr id="12" name="Picture 12"/>
+            <p:cNvPicPr>
+              <a:picLocks noChangeAspect="1"/>
+            </p:cNvPicPr>
+            <p:nvPr/>
+          </p:nvPicPr>
+          <p:blipFill>
+            <a:blip r:embed="rId3"/>
+            <a:srcRect/>
+            <a:stretch>
+              <a:fillRect/>
+            </a:stretch>
+          </p:blipFill>
+          <p:spPr>
+            <a:xfrm>
+              <a:off x="285950" y="1647808"/>
+              <a:ext cx="295298" cy="289289"/>
+            </a:xfrm>
+            <a:prstGeom prst="rect">
+              <a:avLst/>
+            </a:prstGeom>
+            <a:ln w="12700">
+              <a:noFill/>
+              <a:prstDash val="solid"/>
+            </a:ln>
+          </p:spPr>
+        </p:pic>
         <p:sp>
           <p:nvSpPr>
-            <p:cNvPr id="9" name="AutoShape 9"/>
+            <p:cNvPr id="13" name="AutoShape 13"/>
             <p:cNvSpPr/>
             <p:nvPr/>
           </p:nvSpPr>
           <p:spPr>
             <a:xfrm>
-              <a:off x="213480" y="1232151"/>
-              <a:ext cx="2191336" cy="368300"/>
+              <a:off x="470001" y="1685177"/>
+              <a:ext cx="1705653" cy="215493"/>
             </a:xfrm>
             <a:prstGeom prst="rect">
               <a:avLst/>
@@ -11435,144 +11540,37 @@
             </a:bodyPr>
             <a:lstStyle/>
             <a:p>
-              <a:pPr>
+              <a:pPr algn="ctr">
                 <a:defRPr/>
               </a:pPr>
               <a:r>
-                <a:rPr lang="en-US" sz="1800" b="1" dirty="0"/>
-                <a:t>Project Collection</a:t>
+                <a:rPr lang="en-US" sz="1000" dirty="0"/>
+                <a:t>Open Source Repositories</a:t>
               </a:r>
-              <a:endParaRPr lang="en-US" sz="1100" dirty="0"/>
             </a:p>
           </p:txBody>
         </p:sp>
-        <p:grpSp>
-          <p:nvGrpSpPr>
-            <p:cNvPr id="10" name="Group 10"/>
-            <p:cNvGrpSpPr/>
-            <p:nvPr/>
-          </p:nvGrpSpPr>
-          <p:grpSpPr>
-            <a:xfrm>
-              <a:off x="263549" y="1618544"/>
-              <a:ext cx="1977135" cy="562880"/>
-              <a:chOff x="263549" y="1618544"/>
-              <a:chExt cx="1977135" cy="562880"/>
-            </a:xfrm>
-          </p:grpSpPr>
-          <p:sp>
-            <p:nvSpPr>
-              <p:cNvPr id="11" name="AutoShape 11"/>
-              <p:cNvSpPr/>
-              <p:nvPr/>
-            </p:nvSpPr>
-            <p:spPr>
-              <a:xfrm>
-                <a:off x="263549" y="1618544"/>
-                <a:ext cx="1977135" cy="562880"/>
-              </a:xfrm>
-              <a:prstGeom prst="roundRect">
-                <a:avLst>
-                  <a:gd name="adj" fmla="val 6803"/>
-                </a:avLst>
-              </a:prstGeom>
-              <a:noFill/>
-              <a:ln w="25400" cap="flat">
-                <a:solidFill>
-                  <a:srgbClr val="262626">
-                    <a:alpha val="100000"/>
-                  </a:srgbClr>
-                </a:solidFill>
-                <a:prstDash val="solid"/>
-              </a:ln>
-            </p:spPr>
-            <p:txBody>
-              <a:bodyPr lIns="91440" tIns="45720" rIns="91440" bIns="45720" rtlCol="0" anchor="ctr">
-                <a:noAutofit/>
-              </a:bodyPr>
-              <a:lstStyle/>
-              <a:p>
-                <a:pPr algn="ctr">
-                  <a:defRPr/>
-                </a:pPr>
-                <a:endParaRPr/>
-              </a:p>
-            </p:txBody>
-          </p:sp>
-          <p:pic>
-            <p:nvPicPr>
-              <p:cNvPr id="12" name="Picture 12"/>
-              <p:cNvPicPr>
-                <a:picLocks noChangeAspect="1"/>
-              </p:cNvPicPr>
-              <p:nvPr/>
-            </p:nvPicPr>
-            <p:blipFill>
-              <a:blip r:embed="rId3"/>
-              <a:srcRect/>
-              <a:stretch>
-                <a:fillRect/>
-              </a:stretch>
-            </p:blipFill>
-            <p:spPr>
-              <a:xfrm>
-                <a:off x="348603" y="1618544"/>
-                <a:ext cx="573593" cy="561920"/>
-              </a:xfrm>
-              <a:prstGeom prst="rect">
-                <a:avLst/>
-              </a:prstGeom>
-              <a:ln w="12700">
-                <a:noFill/>
-                <a:prstDash val="solid"/>
-              </a:ln>
-            </p:spPr>
-          </p:pic>
-          <p:sp>
-            <p:nvSpPr>
-              <p:cNvPr id="13" name="AutoShape 13"/>
-              <p:cNvSpPr/>
-              <p:nvPr/>
-            </p:nvSpPr>
-            <p:spPr>
-              <a:xfrm>
-                <a:off x="870079" y="1661581"/>
-                <a:ext cx="1289918" cy="457200"/>
-              </a:xfrm>
-              <a:prstGeom prst="rect">
-                <a:avLst/>
-              </a:prstGeom>
-              <a:noFill/>
-              <a:ln w="12700">
-                <a:noFill/>
-                <a:prstDash val="solid"/>
-              </a:ln>
-            </p:spPr>
-            <p:txBody>
-              <a:bodyPr lIns="91440" tIns="45720" rIns="91440" bIns="45720" rtlCol="0" anchor="t">
-                <a:noAutofit/>
-              </a:bodyPr>
-              <a:lstStyle/>
-              <a:p>
-                <a:pPr algn="ctr">
-                  <a:defRPr/>
-                </a:pPr>
-                <a:r>
-                  <a:rPr lang="en-US" sz="1200" dirty="0"/>
-                  <a:t>Open Source</a:t>
-                </a:r>
-                <a:endParaRPr lang="en-US" sz="1100" dirty="0"/>
-              </a:p>
-              <a:p>
-                <a:pPr algn="ctr"/>
-                <a:r>
-                  <a:rPr lang="en-US" sz="1200" dirty="0"/>
-                  <a:t>Repositories</a:t>
-                </a:r>
-              </a:p>
-            </p:txBody>
-          </p:sp>
-        </p:grpSp>
+      </p:grpSp>
+      <p:grpSp>
+        <p:nvGrpSpPr>
+          <p:cNvPr id="148" name="组合 147">
+            <a:extLst>
+              <a:ext uri="{FF2B5EF4-FFF2-40B4-BE49-F238E27FC236}">
+                <a16:creationId xmlns:a16="http://schemas.microsoft.com/office/drawing/2014/main" id="{9F0F279B-D923-371E-2484-808A01A2B079}"/>
+              </a:ext>
+            </a:extLst>
+          </p:cNvPr>
+          <p:cNvGrpSpPr/>
+          <p:nvPr/>
+        </p:nvGrpSpPr>
+        <p:grpSpPr>
+          <a:xfrm>
+            <a:off x="539580" y="863241"/>
+            <a:ext cx="1323762" cy="270290"/>
+            <a:chOff x="153579" y="1175873"/>
+            <a:chExt cx="1323762" cy="270290"/>
+          </a:xfrm>
+        </p:grpSpPr>
         <p:sp>
           <p:nvSpPr>
             <p:cNvPr id="14" name="AutoShape 14"/>
@@ -11581,8 +11579,8 @@
           </p:nvSpPr>
           <p:spPr>
             <a:xfrm>
-              <a:off x="1574130" y="2223120"/>
-              <a:ext cx="326688" cy="401320"/>
+              <a:off x="1183161" y="1209812"/>
+              <a:ext cx="204600" cy="236351"/>
             </a:xfrm>
             <a:prstGeom prst="downArrow">
               <a:avLst>
@@ -11627,7 +11625,7 @@
           </p:nvSpPr>
           <p:spPr>
             <a:xfrm>
-              <a:off x="250368" y="2278862"/>
+              <a:off x="153579" y="1175873"/>
               <a:ext cx="1323762" cy="266700"/>
             </a:xfrm>
             <a:prstGeom prst="rect">
@@ -11649,140 +11647,153 @@
                 <a:defRPr/>
               </a:pPr>
               <a:r>
-                <a:rPr lang="en-US" sz="1200" dirty="0"/>
+                <a:rPr lang="en-US" sz="1050" dirty="0"/>
                 <a:t>Tags &amp; Topics</a:t>
               </a:r>
-              <a:endParaRPr lang="en-US" sz="1100" dirty="0"/>
+              <a:endParaRPr lang="en-US" sz="1000" dirty="0"/>
             </a:p>
           </p:txBody>
         </p:sp>
-        <p:grpSp>
-          <p:nvGrpSpPr>
-            <p:cNvPr id="16" name="Group 16"/>
-            <p:cNvGrpSpPr/>
+      </p:grpSp>
+      <p:grpSp>
+        <p:nvGrpSpPr>
+          <p:cNvPr id="16" name="Group 16"/>
+          <p:cNvGrpSpPr/>
+          <p:nvPr/>
+        </p:nvGrpSpPr>
+        <p:grpSpPr>
+          <a:xfrm>
+            <a:off x="402168" y="1161732"/>
+            <a:ext cx="1804730" cy="346483"/>
+            <a:chOff x="289530" y="2392556"/>
+            <a:chExt cx="1135546" cy="429942"/>
+          </a:xfrm>
+        </p:grpSpPr>
+        <p:sp>
+          <p:nvSpPr>
+            <p:cNvPr id="17" name="AutoShape 17"/>
+            <p:cNvSpPr/>
             <p:nvPr/>
-          </p:nvGrpSpPr>
-          <p:grpSpPr>
-            <a:xfrm>
-              <a:off x="306608" y="2684456"/>
-              <a:ext cx="1977135" cy="536057"/>
-              <a:chOff x="306608" y="2684456"/>
-              <a:chExt cx="1977135" cy="536057"/>
-            </a:xfrm>
-          </p:grpSpPr>
-          <p:sp>
-            <p:nvSpPr>
-              <p:cNvPr id="17" name="AutoShape 17"/>
-              <p:cNvSpPr/>
-              <p:nvPr/>
-            </p:nvSpPr>
-            <p:spPr>
-              <a:xfrm>
-                <a:off x="306608" y="2684456"/>
-                <a:ext cx="1977135" cy="536057"/>
-              </a:xfrm>
-              <a:prstGeom prst="roundRect">
-                <a:avLst>
-                  <a:gd name="adj" fmla="val 6802"/>
-                </a:avLst>
-              </a:prstGeom>
-              <a:noFill/>
-              <a:ln w="25400" cap="flat">
-                <a:solidFill>
-                  <a:srgbClr val="262626">
-                    <a:alpha val="100000"/>
-                  </a:srgbClr>
-                </a:solidFill>
-                <a:prstDash val="solid"/>
-              </a:ln>
-            </p:spPr>
-            <p:txBody>
-              <a:bodyPr lIns="91440" tIns="45720" rIns="91440" bIns="45720" rtlCol="0" anchor="ctr">
-                <a:noAutofit/>
-              </a:bodyPr>
-              <a:lstStyle/>
-              <a:p>
-                <a:pPr algn="ctr">
-                  <a:defRPr/>
-                </a:pPr>
-                <a:endParaRPr/>
-              </a:p>
-            </p:txBody>
-          </p:sp>
-          <p:sp>
-            <p:nvSpPr>
-              <p:cNvPr id="18" name="AutoShape 18"/>
-              <p:cNvSpPr/>
-              <p:nvPr/>
-            </p:nvSpPr>
-            <p:spPr>
-              <a:xfrm>
-                <a:off x="913138" y="2722574"/>
-                <a:ext cx="1289918" cy="457200"/>
-              </a:xfrm>
-              <a:prstGeom prst="rect">
-                <a:avLst/>
-              </a:prstGeom>
-              <a:noFill/>
-              <a:ln w="12700">
-                <a:noFill/>
-                <a:prstDash val="solid"/>
-              </a:ln>
-            </p:spPr>
-            <p:txBody>
-              <a:bodyPr lIns="91440" tIns="45720" rIns="91440" bIns="45720" rtlCol="0" anchor="t">
-                <a:noAutofit/>
-              </a:bodyPr>
-              <a:lstStyle/>
-              <a:p>
-                <a:pPr algn="ctr">
-                  <a:defRPr/>
-                </a:pPr>
-                <a:r>
-                  <a:rPr lang="en-US" sz="1200"/>
-                  <a:t>Unity-based</a:t>
-                </a:r>
-                <a:br>
-                  <a:rPr lang="en-US" sz="1200"/>
-                </a:br>
-                <a:r>
-                  <a:rPr lang="en-US" sz="1200"/>
-                  <a:t>Projects</a:t>
-                </a:r>
-                <a:endParaRPr lang="en-US" sz="1100"/>
-              </a:p>
-            </p:txBody>
-          </p:sp>
-        </p:grpSp>
-        <p:pic>
-          <p:nvPicPr>
-            <p:cNvPr id="19" name="Picture 19"/>
-            <p:cNvPicPr>
-              <a:picLocks noChangeAspect="1"/>
-            </p:cNvPicPr>
-            <p:nvPr/>
-          </p:nvPicPr>
-          <p:blipFill>
-            <a:blip r:embed="rId4"/>
-            <a:srcRect/>
-            <a:stretch>
-              <a:fillRect/>
-            </a:stretch>
-          </p:blipFill>
+          </p:nvSpPr>
           <p:spPr>
             <a:xfrm>
-              <a:off x="479621" y="2737268"/>
-              <a:ext cx="390458" cy="432676"/>
+              <a:off x="289530" y="2392556"/>
+              <a:ext cx="1135546" cy="429942"/>
+            </a:xfrm>
+            <a:prstGeom prst="roundRect">
+              <a:avLst>
+                <a:gd name="adj" fmla="val 6802"/>
+              </a:avLst>
+            </a:prstGeom>
+            <a:noFill/>
+            <a:ln w="25400" cap="flat">
+              <a:solidFill>
+                <a:srgbClr val="262626">
+                  <a:alpha val="100000"/>
+                </a:srgbClr>
+              </a:solidFill>
+              <a:prstDash val="solid"/>
+            </a:ln>
+          </p:spPr>
+          <p:txBody>
+            <a:bodyPr lIns="91440" tIns="45720" rIns="91440" bIns="45720" rtlCol="0" anchor="ctr">
+              <a:noAutofit/>
+            </a:bodyPr>
+            <a:lstStyle/>
+            <a:p>
+              <a:pPr algn="ctr">
+                <a:defRPr/>
+              </a:pPr>
+              <a:endParaRPr dirty="0"/>
+            </a:p>
+          </p:txBody>
+        </p:sp>
+        <p:sp>
+          <p:nvSpPr>
+            <p:cNvPr id="18" name="AutoShape 18"/>
+            <p:cNvSpPr/>
+            <p:nvPr/>
+          </p:nvSpPr>
+          <p:spPr>
+            <a:xfrm>
+              <a:off x="449965" y="2468779"/>
+              <a:ext cx="916915" cy="238657"/>
             </a:xfrm>
             <a:prstGeom prst="rect">
               <a:avLst/>
             </a:prstGeom>
+            <a:noFill/>
             <a:ln w="12700">
               <a:noFill/>
               <a:prstDash val="solid"/>
             </a:ln>
           </p:spPr>
-        </p:pic>
+          <p:txBody>
+            <a:bodyPr lIns="91440" tIns="45720" rIns="91440" bIns="45720" rtlCol="0" anchor="t">
+              <a:noAutofit/>
+            </a:bodyPr>
+            <a:lstStyle/>
+            <a:p>
+              <a:pPr algn="ctr">
+                <a:defRPr/>
+              </a:pPr>
+              <a:r>
+                <a:rPr lang="en-US" sz="1050" dirty="0"/>
+                <a:t>Unity-based Projects</a:t>
+              </a:r>
+            </a:p>
+          </p:txBody>
+        </p:sp>
+      </p:grpSp>
+      <p:pic>
+        <p:nvPicPr>
+          <p:cNvPr id="19" name="Picture 19"/>
+          <p:cNvPicPr>
+            <a:picLocks noChangeAspect="1"/>
+          </p:cNvPicPr>
+          <p:nvPr/>
+        </p:nvPicPr>
+        <p:blipFill>
+          <a:blip r:embed="rId4"/>
+          <a:srcRect/>
+          <a:stretch>
+            <a:fillRect/>
+          </a:stretch>
+        </p:blipFill>
+        <p:spPr>
+          <a:xfrm>
+            <a:off x="448427" y="1219900"/>
+            <a:ext cx="214392" cy="237573"/>
+          </a:xfrm>
+          <a:prstGeom prst="rect">
+            <a:avLst/>
+          </a:prstGeom>
+          <a:ln w="12700">
+            <a:noFill/>
+            <a:prstDash val="solid"/>
+          </a:ln>
+        </p:spPr>
+      </p:pic>
+      <p:grpSp>
+        <p:nvGrpSpPr>
+          <p:cNvPr id="152" name="组合 151">
+            <a:extLst>
+              <a:ext uri="{FF2B5EF4-FFF2-40B4-BE49-F238E27FC236}">
+                <a16:creationId xmlns:a16="http://schemas.microsoft.com/office/drawing/2014/main" id="{D271149E-5CB0-86A2-D6E6-0FA33E27CBAF}"/>
+              </a:ext>
+            </a:extLst>
+          </p:cNvPr>
+          <p:cNvGrpSpPr/>
+          <p:nvPr/>
+        </p:nvGrpSpPr>
+        <p:grpSpPr>
+          <a:xfrm>
+            <a:off x="376711" y="1876595"/>
+            <a:ext cx="1852392" cy="388904"/>
+            <a:chOff x="420657" y="2183146"/>
+            <a:chExt cx="1794226" cy="388904"/>
+          </a:xfrm>
+        </p:grpSpPr>
         <p:grpSp>
           <p:nvGrpSpPr>
             <p:cNvPr id="20" name="Group 20"/>
@@ -11791,10 +11802,10 @@
           </p:nvGrpSpPr>
           <p:grpSpPr>
             <a:xfrm>
-              <a:off x="313381" y="3697260"/>
-              <a:ext cx="2003649" cy="536057"/>
-              <a:chOff x="313381" y="3697260"/>
-              <a:chExt cx="2003649" cy="536057"/>
+              <a:off x="420657" y="2183146"/>
+              <a:ext cx="1794226" cy="388904"/>
+              <a:chOff x="204912" y="3167433"/>
+              <a:chExt cx="1359720" cy="442796"/>
             </a:xfrm>
           </p:grpSpPr>
           <p:sp>
@@ -11805,8 +11816,8 @@
             </p:nvSpPr>
             <p:spPr>
               <a:xfrm>
-                <a:off x="313381" y="3697260"/>
-                <a:ext cx="1977135" cy="536057"/>
+                <a:off x="204912" y="3167433"/>
+                <a:ext cx="1351621" cy="442796"/>
               </a:xfrm>
               <a:prstGeom prst="roundRect">
                 <a:avLst>
@@ -11844,8 +11855,8 @@
             </p:nvSpPr>
             <p:spPr>
               <a:xfrm>
-                <a:off x="843565" y="3768009"/>
-                <a:ext cx="1473465" cy="393700"/>
+                <a:off x="379776" y="3270617"/>
+                <a:ext cx="1184856" cy="331760"/>
               </a:xfrm>
               <a:prstGeom prst="rect">
                 <a:avLst/>
@@ -11867,15 +11878,7 @@
                 </a:pPr>
                 <a:r>
                   <a:rPr lang="en-US" sz="1000" dirty="0"/>
-                  <a:t>Quality Unity-based</a:t>
-                </a:r>
-                <a:endParaRPr lang="en-US" sz="1100" dirty="0"/>
-              </a:p>
-              <a:p>
-                <a:pPr algn="ctr"/>
-                <a:r>
-                  <a:rPr lang="en-US" sz="1000" dirty="0"/>
-                  <a:t>VR Projects</a:t>
+                  <a:t>Quality Unity VR Projects</a:t>
                 </a:r>
               </a:p>
             </p:txBody>
@@ -11889,10 +11892,10 @@
           </p:nvGrpSpPr>
           <p:grpSpPr>
             <a:xfrm>
-              <a:off x="429501" y="3720959"/>
-              <a:ext cx="551090" cy="477937"/>
-              <a:chOff x="429501" y="3720959"/>
-              <a:chExt cx="551090" cy="477937"/>
+              <a:off x="482514" y="2260901"/>
+              <a:ext cx="299348" cy="305809"/>
+              <a:chOff x="254041" y="3222883"/>
+              <a:chExt cx="354124" cy="379460"/>
             </a:xfrm>
           </p:grpSpPr>
           <p:pic>
@@ -11912,8 +11915,8 @@
             </p:blipFill>
             <p:spPr>
               <a:xfrm>
-                <a:off x="429501" y="3720959"/>
-                <a:ext cx="310913" cy="344530"/>
+                <a:off x="254041" y="3222883"/>
+                <a:ext cx="268277" cy="297284"/>
               </a:xfrm>
               <a:prstGeom prst="rect">
                 <a:avLst/>
@@ -11941,8 +11944,8 @@
             </p:blipFill>
             <p:spPr>
               <a:xfrm>
-                <a:off x="706539" y="3945763"/>
-                <a:ext cx="274052" cy="253133"/>
+                <a:off x="457034" y="3462748"/>
+                <a:ext cx="151131" cy="139595"/>
               </a:xfrm>
               <a:prstGeom prst="rect">
                 <a:avLst/>
@@ -11954,96 +11957,6 @@
             </p:spPr>
           </p:pic>
         </p:grpSp>
-        <p:sp>
-          <p:nvSpPr>
-            <p:cNvPr id="26" name="AutoShape 26"/>
-            <p:cNvSpPr/>
-            <p:nvPr/>
-          </p:nvSpPr>
-          <p:spPr>
-            <a:xfrm>
-              <a:off x="203408" y="3262209"/>
-              <a:ext cx="1324096" cy="393700"/>
-            </a:xfrm>
-            <a:prstGeom prst="rect">
-              <a:avLst/>
-            </a:prstGeom>
-            <a:noFill/>
-            <a:ln w="12700">
-              <a:noFill/>
-              <a:prstDash val="solid"/>
-            </a:ln>
-          </p:spPr>
-          <p:txBody>
-            <a:bodyPr lIns="91440" tIns="45720" rIns="91440" bIns="45720" rtlCol="0" anchor="t">
-              <a:noAutofit/>
-            </a:bodyPr>
-            <a:lstStyle/>
-            <a:p>
-              <a:pPr algn="ctr">
-                <a:defRPr/>
-              </a:pPr>
-              <a:r>
-                <a:rPr lang="en-US" sz="1000"/>
-                <a:t>Manifest Validation </a:t>
-              </a:r>
-              <a:endParaRPr lang="en-US" sz="1100"/>
-            </a:p>
-            <a:p>
-              <a:pPr algn="ctr"/>
-              <a:r>
-                <a:rPr lang="en-US" sz="1000"/>
-                <a:t>&amp; Manual Check</a:t>
-              </a:r>
-            </a:p>
-          </p:txBody>
-        </p:sp>
-        <p:sp>
-          <p:nvSpPr>
-            <p:cNvPr id="27" name="AutoShape 27"/>
-            <p:cNvSpPr/>
-            <p:nvPr/>
-          </p:nvSpPr>
-          <p:spPr>
-            <a:xfrm>
-              <a:off x="1583533" y="3256455"/>
-              <a:ext cx="320040" cy="401320"/>
-            </a:xfrm>
-            <a:prstGeom prst="downArrow">
-              <a:avLst>
-                <a:gd name="adj1" fmla="val 50000"/>
-                <a:gd name="adj2" fmla="val 50000"/>
-              </a:avLst>
-            </a:prstGeom>
-            <a:ln/>
-          </p:spPr>
-          <p:style>
-            <a:lnRef idx="1">
-              <a:schemeClr val="dk1"/>
-            </a:lnRef>
-            <a:fillRef idx="2">
-              <a:schemeClr val="dk1"/>
-            </a:fillRef>
-            <a:effectRef idx="1">
-              <a:schemeClr val="dk1"/>
-            </a:effectRef>
-            <a:fontRef idx="minor">
-              <a:schemeClr val="dk1"/>
-            </a:fontRef>
-          </p:style>
-          <p:txBody>
-            <a:bodyPr lIns="91440" tIns="45720" rIns="91440" bIns="45720" rtlCol="0" anchor="ctr">
-              <a:noAutofit/>
-            </a:bodyPr>
-            <a:lstStyle/>
-            <a:p>
-              <a:pPr algn="ctr">
-                <a:defRPr/>
-              </a:pPr>
-              <a:endParaRPr dirty="0"/>
-            </a:p>
-          </p:txBody>
-        </p:sp>
       </p:grpSp>
       <p:sp>
         <p:nvSpPr>
@@ -12089,1150 +12002,124 @@
           </a:p>
         </p:txBody>
       </p:sp>
+      <p:sp>
+        <p:nvSpPr>
+          <p:cNvPr id="94" name="AutoShape 94"/>
+          <p:cNvSpPr/>
+          <p:nvPr/>
+        </p:nvSpPr>
+        <p:spPr>
+          <a:xfrm>
+            <a:off x="2729287" y="473127"/>
+            <a:ext cx="3722489" cy="1193069"/>
+          </a:xfrm>
+          <a:prstGeom prst="roundRect">
+            <a:avLst>
+              <a:gd name="adj" fmla="val 1335"/>
+            </a:avLst>
+          </a:prstGeom>
+          <a:noFill/>
+          <a:ln w="12700" cap="flat" cmpd="sng">
+            <a:solidFill>
+              <a:schemeClr val="tx1"/>
+            </a:solidFill>
+            <a:prstDash val="solid"/>
+            <a:round/>
+          </a:ln>
+        </p:spPr>
+        <p:txBody>
+          <a:bodyPr lIns="63500" tIns="63500" rIns="63500" bIns="63500" rtlCol="0" anchor="ctr">
+            <a:noAutofit/>
+          </a:bodyPr>
+          <a:lstStyle/>
+          <a:p>
+            <a:pPr algn="ctr">
+              <a:defRPr/>
+            </a:pPr>
+            <a:endParaRPr dirty="0"/>
+          </a:p>
+        </p:txBody>
+      </p:sp>
       <p:grpSp>
         <p:nvGrpSpPr>
-          <p:cNvPr id="93" name="Group 93"/>
+          <p:cNvPr id="104" name="Group 104"/>
           <p:cNvGrpSpPr/>
           <p:nvPr/>
         </p:nvGrpSpPr>
         <p:grpSpPr>
           <a:xfrm>
-            <a:off x="2729287" y="454630"/>
-            <a:ext cx="4057988" cy="2780087"/>
-            <a:chOff x="2724109" y="1411455"/>
-            <a:chExt cx="4057988" cy="2780087"/>
+            <a:off x="2805451" y="607133"/>
+            <a:ext cx="3522099" cy="1077372"/>
+            <a:chOff x="2800273" y="1563958"/>
+            <a:chExt cx="3522099" cy="1077372"/>
           </a:xfrm>
         </p:grpSpPr>
+        <p:pic>
+          <p:nvPicPr>
+            <p:cNvPr id="105" name="Picture 105"/>
+            <p:cNvPicPr>
+              <a:picLocks noChangeAspect="1"/>
+            </p:cNvPicPr>
+            <p:nvPr/>
+          </p:nvPicPr>
+          <p:blipFill>
+            <a:blip r:embed="rId6"/>
+            <a:stretch>
+              <a:fillRect/>
+            </a:stretch>
+          </p:blipFill>
+          <p:spPr>
+            <a:xfrm>
+              <a:off x="2800273" y="1581459"/>
+              <a:ext cx="1217367" cy="835792"/>
+            </a:xfrm>
+            <a:prstGeom prst="rect">
+              <a:avLst/>
+            </a:prstGeom>
+            <a:ln>
+              <a:noFill/>
+              <a:prstDash val="solid"/>
+            </a:ln>
+          </p:spPr>
+        </p:pic>
+        <p:pic>
+          <p:nvPicPr>
+            <p:cNvPr id="106" name="Picture 106"/>
+            <p:cNvPicPr>
+              <a:picLocks noChangeAspect="1"/>
+            </p:cNvPicPr>
+            <p:nvPr/>
+          </p:nvPicPr>
+          <p:blipFill>
+            <a:blip r:embed="rId7"/>
+            <a:stretch>
+              <a:fillRect/>
+            </a:stretch>
+          </p:blipFill>
+          <p:spPr>
+            <a:xfrm>
+              <a:off x="5024022" y="1563958"/>
+              <a:ext cx="1221304" cy="872974"/>
+            </a:xfrm>
+            <a:prstGeom prst="rect">
+              <a:avLst/>
+            </a:prstGeom>
+            <a:ln>
+              <a:noFill/>
+              <a:prstDash val="solid"/>
+            </a:ln>
+          </p:spPr>
+        </p:pic>
         <p:sp>
           <p:nvSpPr>
-            <p:cNvPr id="94" name="AutoShape 94"/>
+            <p:cNvPr id="107" name="AutoShape 107"/>
             <p:cNvSpPr/>
             <p:nvPr/>
           </p:nvSpPr>
           <p:spPr>
-            <a:xfrm>
-              <a:off x="2724109" y="1429952"/>
-              <a:ext cx="3766450" cy="2761590"/>
-            </a:xfrm>
-            <a:prstGeom prst="roundRect">
-              <a:avLst>
-                <a:gd name="adj" fmla="val 1335"/>
-              </a:avLst>
-            </a:prstGeom>
-            <a:noFill/>
-            <a:ln w="12700" cap="flat" cmpd="sng">
-              <a:solidFill>
-                <a:schemeClr val="tx1"/>
-              </a:solidFill>
-              <a:prstDash val="solid"/>
-              <a:round/>
-            </a:ln>
-          </p:spPr>
-          <p:txBody>
-            <a:bodyPr lIns="63500" tIns="63500" rIns="63500" bIns="63500" rtlCol="0" anchor="ctr">
-              <a:noAutofit/>
-            </a:bodyPr>
-            <a:lstStyle/>
-            <a:p>
-              <a:pPr algn="ctr">
-                <a:defRPr/>
-              </a:pPr>
-              <a:endParaRPr dirty="0"/>
-            </a:p>
-          </p:txBody>
-        </p:sp>
-        <p:grpSp>
-          <p:nvGrpSpPr>
-            <p:cNvPr id="95" name="Group 95"/>
-            <p:cNvGrpSpPr/>
-            <p:nvPr/>
-          </p:nvGrpSpPr>
-          <p:grpSpPr>
-            <a:xfrm>
-              <a:off x="5129760" y="3197891"/>
-              <a:ext cx="1318745" cy="808609"/>
-              <a:chOff x="5129760" y="3197891"/>
-              <a:chExt cx="1318745" cy="808609"/>
-            </a:xfrm>
-          </p:grpSpPr>
-          <p:sp>
-            <p:nvSpPr>
-              <p:cNvPr id="96" name="AutoShape 96"/>
-              <p:cNvSpPr/>
-              <p:nvPr/>
-            </p:nvSpPr>
-            <p:spPr>
-              <a:xfrm>
-                <a:off x="5129760" y="3197891"/>
-                <a:ext cx="1231900" cy="791700"/>
-              </a:xfrm>
-              <a:prstGeom prst="roundRect">
-                <a:avLst>
-                  <a:gd name="adj" fmla="val 12833"/>
-                </a:avLst>
-              </a:prstGeom>
-              <a:solidFill>
-                <a:srgbClr val="FCB86B">
-                  <a:alpha val="70000"/>
-                </a:srgbClr>
-              </a:solidFill>
-              <a:ln w="25400" cap="flat" cmpd="sng">
-                <a:solidFill>
-                  <a:srgbClr val="2B2F36">
-                    <a:alpha val="70000"/>
-                  </a:srgbClr>
-                </a:solidFill>
-                <a:prstDash val="solid"/>
-                <a:round/>
-              </a:ln>
-            </p:spPr>
-            <p:txBody>
-              <a:bodyPr lIns="63500" tIns="63500" rIns="63500" bIns="63500" rtlCol="0" anchor="ctr">
-                <a:noAutofit/>
-              </a:bodyPr>
-              <a:lstStyle/>
-              <a:p>
-                <a:pPr algn="ctr">
-                  <a:defRPr/>
-                </a:pPr>
-                <a:endParaRPr/>
-              </a:p>
-            </p:txBody>
-          </p:sp>
-          <p:grpSp>
-            <p:nvGrpSpPr>
-              <p:cNvPr id="97" name="Group 97"/>
-              <p:cNvGrpSpPr/>
-              <p:nvPr/>
-            </p:nvGrpSpPr>
-            <p:grpSpPr>
-              <a:xfrm>
-                <a:off x="5315414" y="3279362"/>
-                <a:ext cx="432300" cy="456990"/>
-                <a:chOff x="5315414" y="3279362"/>
-                <a:chExt cx="432300" cy="456990"/>
-              </a:xfrm>
-            </p:grpSpPr>
-            <p:pic>
-              <p:nvPicPr>
-                <p:cNvPr id="98" name="Picture 98"/>
-                <p:cNvPicPr>
-                  <a:picLocks noChangeAspect="1"/>
-                </p:cNvPicPr>
-                <p:nvPr/>
-              </p:nvPicPr>
-              <p:blipFill>
-                <a:blip r:embed="rId6"/>
-                <a:stretch>
-                  <a:fillRect/>
-                </a:stretch>
-              </p:blipFill>
-              <p:spPr>
-                <a:xfrm>
-                  <a:off x="5315414" y="3279362"/>
-                  <a:ext cx="385930" cy="378504"/>
-                </a:xfrm>
-                <a:prstGeom prst="roundRect">
-                  <a:avLst>
-                    <a:gd name="adj" fmla="val 10920"/>
-                  </a:avLst>
-                </a:prstGeom>
-                <a:ln>
-                  <a:noFill/>
-                  <a:prstDash val="solid"/>
-                </a:ln>
-              </p:spPr>
-            </p:pic>
-            <p:pic>
-              <p:nvPicPr>
-                <p:cNvPr id="99" name="Picture 99"/>
-                <p:cNvPicPr>
-                  <a:picLocks noChangeAspect="1"/>
-                </p:cNvPicPr>
-                <p:nvPr/>
-              </p:nvPicPr>
-              <p:blipFill>
-                <a:blip r:embed="rId7"/>
-                <a:stretch>
-                  <a:fillRect/>
-                </a:stretch>
-              </p:blipFill>
-              <p:spPr>
-                <a:xfrm>
-                  <a:off x="5548991" y="3541452"/>
-                  <a:ext cx="198723" cy="194900"/>
-                </a:xfrm>
-                <a:prstGeom prst="rect">
-                  <a:avLst/>
-                </a:prstGeom>
-                <a:ln>
-                  <a:noFill/>
-                  <a:prstDash val="solid"/>
-                </a:ln>
-              </p:spPr>
-            </p:pic>
-          </p:grpSp>
-          <p:sp>
-            <p:nvSpPr>
-              <p:cNvPr id="100" name="AutoShape 100"/>
-              <p:cNvSpPr/>
-              <p:nvPr/>
-            </p:nvSpPr>
-            <p:spPr>
-              <a:xfrm>
-                <a:off x="5129760" y="3701700"/>
-                <a:ext cx="1318745" cy="304800"/>
-              </a:xfrm>
-              <a:prstGeom prst="rect">
-                <a:avLst/>
-              </a:prstGeom>
-              <a:noFill/>
-              <a:ln w="12700">
-                <a:noFill/>
-                <a:prstDash val="solid"/>
-              </a:ln>
-            </p:spPr>
-            <p:txBody>
-              <a:bodyPr lIns="91440" tIns="45720" rIns="91440" bIns="45720" rtlCol="0" anchor="t">
-                <a:noAutofit/>
-              </a:bodyPr>
-              <a:lstStyle/>
-              <a:p>
-                <a:pPr>
-                  <a:defRPr/>
-                </a:pPr>
-                <a:r>
-                  <a:rPr lang="en-US" sz="700"/>
-                  <a:t>Mono Scripts Implemented Entity Interface</a:t>
-                </a:r>
-                <a:endParaRPr lang="en-US" sz="1100"/>
-              </a:p>
-            </p:txBody>
-          </p:sp>
-          <p:grpSp>
-            <p:nvGrpSpPr>
-              <p:cNvPr id="101" name="Group 101"/>
-              <p:cNvGrpSpPr/>
-              <p:nvPr/>
-            </p:nvGrpSpPr>
-            <p:grpSpPr>
-              <a:xfrm>
-                <a:off x="5761861" y="3292477"/>
-                <a:ext cx="419164" cy="446593"/>
-                <a:chOff x="5761861" y="3292477"/>
-                <a:chExt cx="419164" cy="446593"/>
-              </a:xfrm>
-            </p:grpSpPr>
-            <p:pic>
-              <p:nvPicPr>
-                <p:cNvPr id="102" name="Picture 102"/>
-                <p:cNvPicPr>
-                  <a:picLocks noChangeAspect="1"/>
-                </p:cNvPicPr>
-                <p:nvPr/>
-              </p:nvPicPr>
-              <p:blipFill>
-                <a:blip r:embed="rId6"/>
-                <a:stretch>
-                  <a:fillRect/>
-                </a:stretch>
-              </p:blipFill>
-              <p:spPr>
-                <a:xfrm>
-                  <a:off x="5761861" y="3292477"/>
-                  <a:ext cx="385930" cy="378504"/>
-                </a:xfrm>
-                <a:prstGeom prst="roundRect">
-                  <a:avLst>
-                    <a:gd name="adj" fmla="val 10920"/>
-                  </a:avLst>
-                </a:prstGeom>
-                <a:ln>
-                  <a:noFill/>
-                  <a:prstDash val="solid"/>
-                </a:ln>
-              </p:spPr>
-            </p:pic>
-            <p:pic>
-              <p:nvPicPr>
-                <p:cNvPr id="103" name="Picture 103"/>
-                <p:cNvPicPr>
-                  <a:picLocks noChangeAspect="1"/>
-                </p:cNvPicPr>
-                <p:nvPr/>
-              </p:nvPicPr>
-              <p:blipFill>
-                <a:blip r:embed="rId7"/>
-                <a:stretch>
-                  <a:fillRect/>
-                </a:stretch>
-              </p:blipFill>
-              <p:spPr>
-                <a:xfrm>
-                  <a:off x="5982302" y="3544170"/>
-                  <a:ext cx="198723" cy="194900"/>
-                </a:xfrm>
-                <a:prstGeom prst="rect">
-                  <a:avLst/>
-                </a:prstGeom>
-                <a:ln>
-                  <a:noFill/>
-                  <a:prstDash val="solid"/>
-                </a:ln>
-              </p:spPr>
-            </p:pic>
-          </p:grpSp>
-        </p:grpSp>
-        <p:grpSp>
-          <p:nvGrpSpPr>
-            <p:cNvPr id="104" name="Group 104"/>
-            <p:cNvGrpSpPr/>
-            <p:nvPr/>
-          </p:nvGrpSpPr>
-          <p:grpSpPr>
-            <a:xfrm>
-              <a:off x="2800273" y="1563957"/>
-              <a:ext cx="3503565" cy="1268293"/>
-              <a:chOff x="2800273" y="1563957"/>
-              <a:chExt cx="3503565" cy="1268293"/>
-            </a:xfrm>
-          </p:grpSpPr>
-          <p:pic>
-            <p:nvPicPr>
-              <p:cNvPr id="105" name="Picture 105"/>
-              <p:cNvPicPr>
-                <a:picLocks noChangeAspect="1"/>
-              </p:cNvPicPr>
-              <p:nvPr/>
-            </p:nvPicPr>
-            <p:blipFill>
-              <a:blip r:embed="rId8"/>
-              <a:stretch>
-                <a:fillRect/>
-              </a:stretch>
-            </p:blipFill>
-            <p:spPr>
-              <a:xfrm>
-                <a:off x="2800273" y="1581459"/>
-                <a:ext cx="1217367" cy="835792"/>
-              </a:xfrm>
-              <a:prstGeom prst="rect">
-                <a:avLst/>
-              </a:prstGeom>
-              <a:ln>
-                <a:noFill/>
-                <a:prstDash val="solid"/>
-              </a:ln>
-            </p:spPr>
-          </p:pic>
-          <p:pic>
-            <p:nvPicPr>
-              <p:cNvPr id="106" name="Picture 106"/>
-              <p:cNvPicPr>
-                <a:picLocks noChangeAspect="1"/>
-              </p:cNvPicPr>
-              <p:nvPr/>
-            </p:nvPicPr>
-            <p:blipFill>
-              <a:blip r:embed="rId9"/>
-              <a:stretch>
-                <a:fillRect/>
-              </a:stretch>
-            </p:blipFill>
-            <p:spPr>
-              <a:xfrm>
-                <a:off x="4820042" y="1563957"/>
-                <a:ext cx="1425284" cy="1018777"/>
-              </a:xfrm>
-              <a:prstGeom prst="rect">
-                <a:avLst/>
-              </a:prstGeom>
-              <a:ln>
-                <a:noFill/>
-                <a:prstDash val="solid"/>
-              </a:ln>
-            </p:spPr>
-          </p:pic>
-          <p:sp>
-            <p:nvSpPr>
-              <p:cNvPr id="107" name="AutoShape 107"/>
-              <p:cNvSpPr/>
-              <p:nvPr/>
-            </p:nvSpPr>
-            <p:spPr>
-              <a:xfrm rot="16200000">
-                <a:off x="4268484" y="1900696"/>
-                <a:ext cx="197372" cy="607329"/>
-              </a:xfrm>
-              <a:prstGeom prst="downArrow">
-                <a:avLst>
-                  <a:gd name="adj1" fmla="val 50000"/>
-                  <a:gd name="adj2" fmla="val 50000"/>
-                </a:avLst>
-              </a:prstGeom>
-              <a:ln w="6350"/>
-            </p:spPr>
-            <p:style>
-              <a:lnRef idx="1">
-                <a:schemeClr val="dk1"/>
-              </a:lnRef>
-              <a:fillRef idx="2">
-                <a:schemeClr val="dk1"/>
-              </a:fillRef>
-              <a:effectRef idx="1">
-                <a:schemeClr val="dk1"/>
-              </a:effectRef>
-              <a:fontRef idx="minor">
-                <a:schemeClr val="dk1"/>
-              </a:fontRef>
-            </p:style>
-            <p:txBody>
-              <a:bodyPr lIns="91440" tIns="45720" rIns="0" bIns="45720" rtlCol="0" anchor="ctr">
-                <a:noAutofit/>
-              </a:bodyPr>
-              <a:lstStyle/>
-              <a:p>
-                <a:pPr algn="ctr">
-                  <a:defRPr/>
-                </a:pPr>
-                <a:endParaRPr/>
-              </a:p>
-            </p:txBody>
-          </p:sp>
-          <p:sp>
-            <p:nvSpPr>
-              <p:cNvPr id="108" name="AutoShape 108"/>
-              <p:cNvSpPr/>
-              <p:nvPr/>
-            </p:nvSpPr>
-            <p:spPr>
-              <a:xfrm>
-                <a:off x="3831818" y="1903063"/>
-                <a:ext cx="1058353" cy="241300"/>
-              </a:xfrm>
-              <a:prstGeom prst="rect">
-                <a:avLst/>
-              </a:prstGeom>
-              <a:noFill/>
-              <a:ln w="12700">
-                <a:noFill/>
-                <a:prstDash val="solid"/>
-              </a:ln>
-            </p:spPr>
-            <p:txBody>
-              <a:bodyPr lIns="91440" tIns="45720" rIns="91440" bIns="45720" rtlCol="0" anchor="t">
-                <a:noAutofit/>
-              </a:bodyPr>
-              <a:lstStyle/>
-              <a:p>
-                <a:pPr algn="ctr">
-                  <a:defRPr/>
-                </a:pPr>
-                <a:r>
-                  <a:rPr lang="en-US" sz="1000" dirty="0">
-                    <a:solidFill>
-                      <a:srgbClr val="2B2F36"/>
-                    </a:solidFill>
-                  </a:rPr>
-                  <a:t>Bake NavMesh</a:t>
-                </a:r>
-                <a:endParaRPr lang="en-US" sz="1100" dirty="0"/>
-              </a:p>
-            </p:txBody>
-          </p:sp>
-          <p:sp>
-            <p:nvSpPr>
-              <p:cNvPr id="109" name="AutoShape 109"/>
-              <p:cNvSpPr/>
-              <p:nvPr/>
-            </p:nvSpPr>
-            <p:spPr>
-              <a:xfrm>
-                <a:off x="2837170" y="2309379"/>
-                <a:ext cx="1180471" cy="241300"/>
-              </a:xfrm>
-              <a:prstGeom prst="rect">
-                <a:avLst/>
-              </a:prstGeom>
-              <a:noFill/>
-              <a:ln w="12700">
-                <a:noFill/>
-                <a:prstDash val="solid"/>
-              </a:ln>
-            </p:spPr>
-            <p:txBody>
-              <a:bodyPr lIns="91440" tIns="45720" rIns="91440" bIns="45720" rtlCol="0" anchor="t">
-                <a:noAutofit/>
-              </a:bodyPr>
-              <a:lstStyle/>
-              <a:p>
-                <a:pPr algn="ctr">
-                  <a:defRPr/>
-                </a:pPr>
-                <a:r>
-                  <a:rPr lang="en-US" sz="1000"/>
-                  <a:t>Original Scene</a:t>
-                </a:r>
-                <a:endParaRPr lang="en-US" sz="1100"/>
-              </a:p>
-            </p:txBody>
-          </p:sp>
-          <p:sp>
-            <p:nvSpPr>
-              <p:cNvPr id="110" name="AutoShape 110"/>
-              <p:cNvSpPr/>
-              <p:nvPr/>
-            </p:nvSpPr>
-            <p:spPr>
-              <a:xfrm>
-                <a:off x="4906046" y="2590950"/>
-                <a:ext cx="1397792" cy="241300"/>
-              </a:xfrm>
-              <a:prstGeom prst="rect">
-                <a:avLst/>
-              </a:prstGeom>
-              <a:noFill/>
-              <a:ln w="12700">
-                <a:noFill/>
-                <a:prstDash val="solid"/>
-              </a:ln>
-            </p:spPr>
-            <p:txBody>
-              <a:bodyPr lIns="91440" tIns="45720" rIns="91440" bIns="45720" rtlCol="0" anchor="t">
-                <a:noAutofit/>
-              </a:bodyPr>
-              <a:lstStyle/>
-              <a:p>
-                <a:pPr algn="ctr">
-                  <a:defRPr/>
-                </a:pPr>
-                <a:r>
-                  <a:rPr lang="en-US" sz="1000"/>
-                  <a:t>Scene with NavMesh</a:t>
-                </a:r>
-                <a:endParaRPr lang="en-US" sz="1100"/>
-              </a:p>
-            </p:txBody>
-          </p:sp>
-        </p:grpSp>
-        <p:sp>
-          <p:nvSpPr>
-            <p:cNvPr id="111" name="AutoShape 111"/>
-            <p:cNvSpPr/>
-            <p:nvPr/>
-          </p:nvSpPr>
-          <p:spPr>
-            <a:xfrm>
-              <a:off x="4127297" y="3044499"/>
-              <a:ext cx="1108143" cy="660400"/>
-            </a:xfrm>
-            <a:prstGeom prst="rect">
-              <a:avLst/>
-            </a:prstGeom>
-            <a:noFill/>
-            <a:ln w="12700">
-              <a:noFill/>
-              <a:prstDash val="solid"/>
-            </a:ln>
-          </p:spPr>
-          <p:txBody>
-            <a:bodyPr lIns="91440" tIns="45720" rIns="91440" bIns="45720" rtlCol="0" anchor="t">
-              <a:noAutofit/>
-            </a:bodyPr>
-            <a:lstStyle/>
-            <a:p>
-              <a:pPr algn="ctr">
-                <a:lnSpc>
-                  <a:spcPct val="125000"/>
-                </a:lnSpc>
-                <a:defRPr/>
-              </a:pPr>
-              <a:r>
-                <a:rPr lang="en-US" sz="1000">
-                  <a:solidFill>
-                    <a:srgbClr val="2B2F36"/>
-                  </a:solidFill>
-                </a:rPr>
-                <a:t> Customizing Entity Interface Configuration</a:t>
-              </a:r>
-              <a:endParaRPr lang="en-US" sz="1100"/>
-            </a:p>
-          </p:txBody>
-        </p:sp>
-        <p:grpSp>
-          <p:nvGrpSpPr>
-            <p:cNvPr id="112" name="Group 112"/>
-            <p:cNvGrpSpPr/>
-            <p:nvPr/>
-          </p:nvGrpSpPr>
-          <p:grpSpPr>
-            <a:xfrm>
-              <a:off x="2800273" y="2703432"/>
-              <a:ext cx="1571995" cy="1415682"/>
-              <a:chOff x="2800273" y="2703432"/>
-              <a:chExt cx="1571995" cy="1415682"/>
-            </a:xfrm>
-          </p:grpSpPr>
-          <p:grpSp>
-            <p:nvGrpSpPr>
-              <p:cNvPr id="113" name="Group 113"/>
-              <p:cNvGrpSpPr/>
-              <p:nvPr/>
-            </p:nvGrpSpPr>
-            <p:grpSpPr>
-              <a:xfrm>
-                <a:off x="2800273" y="2703432"/>
-                <a:ext cx="1571995" cy="1373600"/>
-                <a:chOff x="2800273" y="2703432"/>
-                <a:chExt cx="1571995" cy="1373600"/>
-              </a:xfrm>
-            </p:grpSpPr>
-            <p:grpSp>
-              <p:nvGrpSpPr>
-                <p:cNvPr id="114" name="Group 114"/>
-                <p:cNvGrpSpPr/>
-                <p:nvPr/>
-              </p:nvGrpSpPr>
-              <p:grpSpPr>
-                <a:xfrm>
-                  <a:off x="2800273" y="2703432"/>
-                  <a:ext cx="1571995" cy="1373600"/>
-                  <a:chOff x="2800273" y="2703432"/>
-                  <a:chExt cx="1571995" cy="1373600"/>
-                </a:xfrm>
-              </p:grpSpPr>
-              <p:sp>
-                <p:nvSpPr>
-                  <p:cNvPr id="115" name="AutoShape 115"/>
-                  <p:cNvSpPr/>
-                  <p:nvPr/>
-                </p:nvSpPr>
-                <p:spPr>
-                  <a:xfrm>
-                    <a:off x="2800273" y="2703432"/>
-                    <a:ext cx="1397000" cy="1373600"/>
-                  </a:xfrm>
-                  <a:prstGeom prst="roundRect">
-                    <a:avLst>
-                      <a:gd name="adj" fmla="val 9090"/>
-                    </a:avLst>
-                  </a:prstGeom>
-                  <a:solidFill>
-                    <a:srgbClr val="DEE0E3">
-                      <a:alpha val="20000"/>
-                    </a:srgbClr>
-                  </a:solidFill>
-                  <a:ln w="25400" cap="flat" cmpd="sng">
-                    <a:solidFill>
-                      <a:srgbClr val="2B2F36">
-                        <a:alpha val="20000"/>
-                      </a:srgbClr>
-                    </a:solidFill>
-                    <a:prstDash val="solid"/>
-                    <a:round/>
-                  </a:ln>
-                </p:spPr>
-                <p:txBody>
-                  <a:bodyPr lIns="63500" tIns="63500" rIns="63500" bIns="63500" rtlCol="0" anchor="ctr">
-                    <a:noAutofit/>
-                  </a:bodyPr>
-                  <a:lstStyle/>
-                  <a:p>
-                    <a:pPr algn="ctr">
-                      <a:defRPr/>
-                    </a:pPr>
-                    <a:endParaRPr/>
-                  </a:p>
-                </p:txBody>
-              </p:sp>
-              <p:sp>
-                <p:nvSpPr>
-                  <p:cNvPr id="116" name="AutoShape 116"/>
-                  <p:cNvSpPr/>
-                  <p:nvPr/>
-                </p:nvSpPr>
-                <p:spPr>
-                  <a:xfrm>
-                    <a:off x="2912541" y="3316174"/>
-                    <a:ext cx="1114207" cy="600241"/>
-                  </a:xfrm>
-                  <a:prstGeom prst="roundRect">
-                    <a:avLst>
-                      <a:gd name="adj" fmla="val 17647"/>
-                    </a:avLst>
-                  </a:prstGeom>
-                  <a:solidFill>
-                    <a:srgbClr val="FAD355">
-                      <a:alpha val="70000"/>
-                    </a:srgbClr>
-                  </a:solidFill>
-                  <a:ln w="25400" cap="flat" cmpd="sng">
-                    <a:solidFill>
-                      <a:srgbClr val="2B2F36">
-                        <a:alpha val="70000"/>
-                      </a:srgbClr>
-                    </a:solidFill>
-                    <a:prstDash val="solid"/>
-                    <a:round/>
-                  </a:ln>
-                </p:spPr>
-                <p:txBody>
-                  <a:bodyPr lIns="63500" tIns="63500" rIns="63500" bIns="63500" rtlCol="0" anchor="ctr">
-                    <a:noAutofit/>
-                  </a:bodyPr>
-                  <a:lstStyle/>
-                  <a:p>
-                    <a:pPr algn="ctr">
-                      <a:defRPr/>
-                    </a:pPr>
-                    <a:endParaRPr/>
-                  </a:p>
-                </p:txBody>
-              </p:sp>
-              <p:pic>
-                <p:nvPicPr>
-                  <p:cNvPr id="117" name="Picture 117"/>
-                  <p:cNvPicPr>
-                    <a:picLocks noChangeAspect="1"/>
-                  </p:cNvPicPr>
-                  <p:nvPr/>
-                </p:nvPicPr>
-                <p:blipFill>
-                  <a:blip r:embed="rId6"/>
-                  <a:stretch>
-                    <a:fillRect/>
-                  </a:stretch>
-                </p:blipFill>
-                <p:spPr>
-                  <a:xfrm>
-                    <a:off x="3052291" y="3349520"/>
-                    <a:ext cx="406400" cy="383855"/>
-                  </a:xfrm>
-                  <a:prstGeom prst="roundRect">
-                    <a:avLst>
-                      <a:gd name="adj" fmla="val 10768"/>
-                    </a:avLst>
-                  </a:prstGeom>
-                  <a:ln>
-                    <a:noFill/>
-                    <a:prstDash val="solid"/>
-                  </a:ln>
-                </p:spPr>
-              </p:pic>
-              <p:pic>
-                <p:nvPicPr>
-                  <p:cNvPr id="118" name="Picture 118"/>
-                  <p:cNvPicPr>
-                    <a:picLocks noChangeAspect="1"/>
-                  </p:cNvPicPr>
-                  <p:nvPr/>
-                </p:nvPicPr>
-                <p:blipFill>
-                  <a:blip r:embed="rId10"/>
-                  <a:stretch>
-                    <a:fillRect/>
-                  </a:stretch>
-                </p:blipFill>
-                <p:spPr>
-                  <a:xfrm>
-                    <a:off x="2923113" y="2755175"/>
-                    <a:ext cx="406250" cy="383713"/>
-                  </a:xfrm>
-                  <a:prstGeom prst="rect">
-                    <a:avLst/>
-                  </a:prstGeom>
-                  <a:ln>
-                    <a:noFill/>
-                    <a:prstDash val="solid"/>
-                  </a:ln>
-                </p:spPr>
-              </p:pic>
-              <p:sp>
-                <p:nvSpPr>
-                  <p:cNvPr id="119" name="AutoShape 119"/>
-                  <p:cNvSpPr/>
-                  <p:nvPr/>
-                </p:nvSpPr>
-                <p:spPr>
-                  <a:xfrm>
-                    <a:off x="3034896" y="3700515"/>
-                    <a:ext cx="1155700" cy="215900"/>
-                  </a:xfrm>
-                  <a:prstGeom prst="rect">
-                    <a:avLst/>
-                  </a:prstGeom>
-                  <a:noFill/>
-                  <a:ln w="12700">
-                    <a:noFill/>
-                    <a:prstDash val="solid"/>
-                  </a:ln>
-                </p:spPr>
-                <p:txBody>
-                  <a:bodyPr lIns="91440" tIns="45720" rIns="91440" bIns="45720" rtlCol="0" anchor="t">
-                    <a:noAutofit/>
-                  </a:bodyPr>
-                  <a:lstStyle/>
-                  <a:p>
-                    <a:pPr>
-                      <a:defRPr/>
-                    </a:pPr>
-                    <a:r>
-                      <a:rPr lang="en-US" sz="800" dirty="0"/>
-                      <a:t>Core C# Scripts</a:t>
-                    </a:r>
-                    <a:endParaRPr lang="en-US" sz="1100" dirty="0"/>
-                  </a:p>
-                </p:txBody>
-              </p:sp>
-              <p:sp>
-                <p:nvSpPr>
-                  <p:cNvPr id="120" name="AutoShape 120"/>
-                  <p:cNvSpPr/>
-                  <p:nvPr/>
-                </p:nvSpPr>
-                <p:spPr>
-                  <a:xfrm>
-                    <a:off x="2975268" y="3103778"/>
-                    <a:ext cx="1397000" cy="215900"/>
-                  </a:xfrm>
-                  <a:prstGeom prst="rect">
-                    <a:avLst/>
-                  </a:prstGeom>
-                  <a:noFill/>
-                  <a:ln w="12700">
-                    <a:noFill/>
-                    <a:prstDash val="solid"/>
-                  </a:ln>
-                </p:spPr>
-                <p:txBody>
-                  <a:bodyPr lIns="91440" tIns="45720" rIns="91440" bIns="45720" rtlCol="0" anchor="t">
-                    <a:noAutofit/>
-                  </a:bodyPr>
-                  <a:lstStyle/>
-                  <a:p>
-                    <a:pPr>
-                      <a:defRPr/>
-                    </a:pPr>
-                    <a:r>
-                      <a:rPr lang="en-US" sz="800" dirty="0">
-                        <a:solidFill>
-                          <a:srgbClr val="1F2329"/>
-                        </a:solidFill>
-                        <a:latin typeface="Noto Sans SC"/>
-                        <a:ea typeface="Noto Sans SC"/>
-                        <a:cs typeface="Noto Sans SC"/>
-                        <a:sym typeface="Noto Sans SC"/>
-                      </a:rPr>
-                      <a:t>Plugins/Tools/.dll</a:t>
-                    </a:r>
-                    <a:endParaRPr lang="en-US" sz="1100" dirty="0"/>
-                  </a:p>
-                </p:txBody>
-              </p:sp>
-              <p:pic>
-                <p:nvPicPr>
-                  <p:cNvPr id="121" name="Picture 121"/>
-                  <p:cNvPicPr>
-                    <a:picLocks noChangeAspect="1"/>
-                  </p:cNvPicPr>
-                  <p:nvPr/>
-                </p:nvPicPr>
-                <p:blipFill>
-                  <a:blip r:embed="rId10"/>
-                  <a:stretch>
-                    <a:fillRect/>
-                  </a:stretch>
-                </p:blipFill>
-                <p:spPr>
-                  <a:xfrm>
-                    <a:off x="3329363" y="2755175"/>
-                    <a:ext cx="406250" cy="383713"/>
-                  </a:xfrm>
-                  <a:prstGeom prst="rect">
-                    <a:avLst/>
-                  </a:prstGeom>
-                  <a:ln>
-                    <a:noFill/>
-                    <a:prstDash val="solid"/>
-                  </a:ln>
-                </p:spPr>
-              </p:pic>
-              <p:pic>
-                <p:nvPicPr>
-                  <p:cNvPr id="122" name="Picture 122"/>
-                  <p:cNvPicPr>
-                    <a:picLocks noChangeAspect="1"/>
-                  </p:cNvPicPr>
-                  <p:nvPr/>
-                </p:nvPicPr>
-                <p:blipFill>
-                  <a:blip r:embed="rId10"/>
-                  <a:stretch>
-                    <a:fillRect/>
-                  </a:stretch>
-                </p:blipFill>
-                <p:spPr>
-                  <a:xfrm>
-                    <a:off x="3735612" y="2755175"/>
-                    <a:ext cx="406250" cy="383713"/>
-                  </a:xfrm>
-                  <a:prstGeom prst="rect">
-                    <a:avLst/>
-                  </a:prstGeom>
-                  <a:ln>
-                    <a:noFill/>
-                    <a:prstDash val="solid"/>
-                  </a:ln>
-                </p:spPr>
-              </p:pic>
-            </p:grpSp>
-            <p:pic>
-              <p:nvPicPr>
-                <p:cNvPr id="123" name="Picture 123"/>
-                <p:cNvPicPr>
-                  <a:picLocks noChangeAspect="1"/>
-                </p:cNvPicPr>
-                <p:nvPr/>
-              </p:nvPicPr>
-              <p:blipFill>
-                <a:blip r:embed="rId6"/>
-                <a:stretch>
-                  <a:fillRect/>
-                </a:stretch>
-              </p:blipFill>
-              <p:spPr>
-                <a:xfrm>
-                  <a:off x="3461944" y="3360059"/>
-                  <a:ext cx="406400" cy="383855"/>
-                </a:xfrm>
-                <a:prstGeom prst="roundRect">
-                  <a:avLst>
-                    <a:gd name="adj" fmla="val 10768"/>
-                  </a:avLst>
-                </a:prstGeom>
-                <a:ln>
-                  <a:noFill/>
-                  <a:prstDash val="solid"/>
-                </a:ln>
-              </p:spPr>
-            </p:pic>
-          </p:grpSp>
-          <p:sp>
-            <p:nvSpPr>
-              <p:cNvPr id="124" name="AutoShape 124"/>
-              <p:cNvSpPr/>
-              <p:nvPr/>
-            </p:nvSpPr>
-            <p:spPr>
-              <a:xfrm>
-                <a:off x="3076595" y="3890514"/>
-                <a:ext cx="1155700" cy="228600"/>
-              </a:xfrm>
-              <a:prstGeom prst="rect">
-                <a:avLst/>
-              </a:prstGeom>
-              <a:noFill/>
-              <a:ln w="12700">
-                <a:noFill/>
-                <a:prstDash val="solid"/>
-              </a:ln>
-            </p:spPr>
-            <p:txBody>
-              <a:bodyPr lIns="91440" tIns="45720" rIns="91440" bIns="45720" rtlCol="0" anchor="t">
-                <a:noAutofit/>
-              </a:bodyPr>
-              <a:lstStyle/>
-              <a:p>
-                <a:pPr>
-                  <a:defRPr/>
-                </a:pPr>
-                <a:r>
-                  <a:rPr lang="en-US" sz="900" dirty="0">
-                    <a:solidFill>
-                      <a:srgbClr val="1F2329"/>
-                    </a:solidFill>
-                    <a:latin typeface="Noto Sans SC"/>
-                    <a:ea typeface="Noto Sans SC"/>
-                    <a:cs typeface="Noto Sans SC"/>
-                    <a:sym typeface="Noto Sans SC"/>
-                  </a:rPr>
-                  <a:t>Original Code</a:t>
-                </a:r>
-                <a:endParaRPr lang="en-US" sz="1100" dirty="0"/>
-              </a:p>
-            </p:txBody>
-          </p:sp>
-        </p:grpSp>
-        <p:grpSp>
-          <p:nvGrpSpPr>
-            <p:cNvPr id="125" name="Group 125"/>
-            <p:cNvGrpSpPr/>
-            <p:nvPr/>
-          </p:nvGrpSpPr>
-          <p:grpSpPr>
-            <a:xfrm>
-              <a:off x="2795898" y="1411455"/>
-              <a:ext cx="2454729" cy="279400"/>
-              <a:chOff x="2795898" y="1411455"/>
-              <a:chExt cx="2454729" cy="279400"/>
-            </a:xfrm>
-          </p:grpSpPr>
-          <p:sp>
-            <p:nvSpPr>
-              <p:cNvPr id="126" name="AutoShape 126"/>
-              <p:cNvSpPr/>
-              <p:nvPr/>
-            </p:nvSpPr>
-            <p:spPr>
-              <a:xfrm>
-                <a:off x="2859398" y="1411455"/>
-                <a:ext cx="2391229" cy="279400"/>
-              </a:xfrm>
-              <a:prstGeom prst="rect">
-                <a:avLst/>
-              </a:prstGeom>
-              <a:noFill/>
-              <a:ln w="12700">
-                <a:noFill/>
-                <a:prstDash val="solid"/>
-              </a:ln>
-            </p:spPr>
-            <p:txBody>
-              <a:bodyPr lIns="91440" tIns="45720" rIns="91440" bIns="45720" rtlCol="0" anchor="t">
-                <a:noAutofit/>
-              </a:bodyPr>
-              <a:lstStyle/>
-              <a:p>
-                <a:pPr algn="ctr">
-                  <a:defRPr/>
-                </a:pPr>
-                <a:r>
-                  <a:rPr lang="en-US" sz="1200" b="1" i="1" dirty="0">
-                    <a:solidFill>
-                      <a:srgbClr val="2B2F36"/>
-                    </a:solidFill>
-                    <a:latin typeface="Times New Roman"/>
-                    <a:ea typeface="Times New Roman"/>
-                    <a:cs typeface="Times New Roman"/>
-                    <a:sym typeface="Times New Roman"/>
-                  </a:rPr>
-                  <a:t>Preliminary Scene Configuration</a:t>
-                </a:r>
-                <a:endParaRPr lang="en-US" sz="1100" dirty="0"/>
-              </a:p>
-            </p:txBody>
-          </p:sp>
-          <p:grpSp>
-            <p:nvGrpSpPr>
-              <p:cNvPr id="127" name="Group 127"/>
-              <p:cNvGrpSpPr/>
-              <p:nvPr/>
-            </p:nvGrpSpPr>
-            <p:grpSpPr>
-              <a:xfrm>
-                <a:off x="2795898" y="1435137"/>
-                <a:ext cx="183799" cy="192218"/>
-                <a:chOff x="2795898" y="1435137"/>
-                <a:chExt cx="183799" cy="192218"/>
-              </a:xfrm>
-            </p:grpSpPr>
-            <p:sp>
-              <p:nvSpPr>
-                <p:cNvPr id="128" name="AutoShape 128"/>
-                <p:cNvSpPr/>
-                <p:nvPr/>
-              </p:nvSpPr>
-              <p:spPr>
-                <a:xfrm>
-                  <a:off x="2795898" y="1449555"/>
-                  <a:ext cx="177800" cy="177800"/>
-                </a:xfrm>
-                <a:prstGeom prst="ellipse">
-                  <a:avLst/>
-                </a:prstGeom>
-                <a:solidFill>
-                  <a:srgbClr val="000000">
-                    <a:alpha val="100000"/>
-                  </a:srgbClr>
-                </a:solidFill>
-                <a:ln w="25400">
-                  <a:noFill/>
-                  <a:prstDash val="solid"/>
-                </a:ln>
-              </p:spPr>
-              <p:txBody>
-                <a:bodyPr lIns="63500" tIns="63500" rIns="0" bIns="63500" rtlCol="0" anchor="ctr">
-                  <a:noAutofit/>
-                </a:bodyPr>
-                <a:lstStyle/>
-                <a:p>
-                  <a:pPr algn="ctr">
-                    <a:defRPr/>
-                  </a:pPr>
-                  <a:endParaRPr/>
-                </a:p>
-              </p:txBody>
-            </p:sp>
-            <p:sp>
-              <p:nvSpPr>
-                <p:cNvPr id="129" name="AutoShape 129"/>
-                <p:cNvSpPr/>
-                <p:nvPr/>
-              </p:nvSpPr>
-              <p:spPr>
-                <a:xfrm>
-                  <a:off x="2852697" y="1435137"/>
-                  <a:ext cx="127000" cy="190500"/>
-                </a:xfrm>
-                <a:prstGeom prst="rect">
-                  <a:avLst/>
-                </a:prstGeom>
-                <a:noFill/>
-                <a:ln w="12700">
-                  <a:noFill/>
-                  <a:prstDash val="solid"/>
-                </a:ln>
-              </p:spPr>
-              <p:txBody>
-                <a:bodyPr lIns="0" tIns="0" rIns="0" bIns="0" rtlCol="0" anchor="ctr">
-                  <a:noAutofit/>
-                </a:bodyPr>
-                <a:lstStyle/>
-                <a:p>
-                  <a:pPr>
-                    <a:lnSpc>
-                      <a:spcPct val="125000"/>
-                    </a:lnSpc>
-                    <a:defRPr/>
-                  </a:pPr>
-                  <a:r>
-                    <a:rPr lang="en-US" sz="1000" dirty="0">
-                      <a:solidFill>
-                        <a:srgbClr val="FFFFFF"/>
-                      </a:solidFill>
-                      <a:latin typeface="Times New Roman"/>
-                      <a:ea typeface="Times New Roman"/>
-                      <a:cs typeface="Times New Roman"/>
-                      <a:sym typeface="Times New Roman"/>
-                    </a:rPr>
-                    <a:t>1</a:t>
-                  </a:r>
-                  <a:endParaRPr lang="en-US" sz="1100" dirty="0"/>
-                </a:p>
-              </p:txBody>
-            </p:sp>
-          </p:grpSp>
-        </p:grpSp>
-        <p:sp>
-          <p:nvSpPr>
-            <p:cNvPr id="130" name="AutoShape 130"/>
-            <p:cNvSpPr/>
-            <p:nvPr/>
-          </p:nvSpPr>
-          <p:spPr>
-            <a:xfrm rot="-5400000">
-              <a:off x="4581989" y="3329491"/>
-              <a:ext cx="177109" cy="806095"/>
+            <a:xfrm rot="16200000">
+              <a:off x="4268484" y="1900696"/>
+              <a:ext cx="197372" cy="607329"/>
             </a:xfrm>
             <a:prstGeom prst="downArrow">
               <a:avLst>
@@ -13265,34 +12152,246 @@
               <a:pPr algn="ctr">
                 <a:defRPr/>
               </a:pPr>
-              <a:endParaRPr dirty="0"/>
+              <a:endParaRPr/>
+            </a:p>
+          </p:txBody>
+        </p:sp>
+        <p:sp>
+          <p:nvSpPr>
+            <p:cNvPr id="108" name="AutoShape 108"/>
+            <p:cNvSpPr/>
+            <p:nvPr/>
+          </p:nvSpPr>
+          <p:spPr>
+            <a:xfrm>
+              <a:off x="3831818" y="1903063"/>
+              <a:ext cx="1058353" cy="241300"/>
+            </a:xfrm>
+            <a:prstGeom prst="rect">
+              <a:avLst/>
+            </a:prstGeom>
+            <a:noFill/>
+            <a:ln w="12700">
+              <a:noFill/>
+              <a:prstDash val="solid"/>
+            </a:ln>
+          </p:spPr>
+          <p:txBody>
+            <a:bodyPr lIns="91440" tIns="45720" rIns="91440" bIns="45720" rtlCol="0" anchor="t">
+              <a:noAutofit/>
+            </a:bodyPr>
+            <a:lstStyle/>
+            <a:p>
+              <a:pPr algn="ctr">
+                <a:defRPr/>
+              </a:pPr>
+              <a:r>
+                <a:rPr lang="en-US" sz="1000" dirty="0">
+                  <a:solidFill>
+                    <a:srgbClr val="2B2F36"/>
+                  </a:solidFill>
+                </a:rPr>
+                <a:t>Bake NavMesh</a:t>
+              </a:r>
+              <a:endParaRPr lang="en-US" sz="1100" dirty="0"/>
+            </a:p>
+          </p:txBody>
+        </p:sp>
+        <p:sp>
+          <p:nvSpPr>
+            <p:cNvPr id="109" name="AutoShape 109"/>
+            <p:cNvSpPr/>
+            <p:nvPr/>
+          </p:nvSpPr>
+          <p:spPr>
+            <a:xfrm>
+              <a:off x="2837170" y="2309379"/>
+              <a:ext cx="1180471" cy="241300"/>
+            </a:xfrm>
+            <a:prstGeom prst="rect">
+              <a:avLst/>
+            </a:prstGeom>
+            <a:noFill/>
+            <a:ln w="12700">
+              <a:noFill/>
+              <a:prstDash val="solid"/>
+            </a:ln>
+          </p:spPr>
+          <p:txBody>
+            <a:bodyPr lIns="91440" tIns="45720" rIns="91440" bIns="45720" rtlCol="0" anchor="t">
+              <a:noAutofit/>
+            </a:bodyPr>
+            <a:lstStyle/>
+            <a:p>
+              <a:pPr algn="ctr">
+                <a:defRPr/>
+              </a:pPr>
+              <a:r>
+                <a:rPr lang="en-US" sz="1000"/>
+                <a:t>Original Scene</a:t>
+              </a:r>
+              <a:endParaRPr lang="en-US" sz="1100"/>
+            </a:p>
+          </p:txBody>
+        </p:sp>
+        <p:sp>
+          <p:nvSpPr>
+            <p:cNvPr id="110" name="AutoShape 110"/>
+            <p:cNvSpPr/>
+            <p:nvPr/>
+          </p:nvSpPr>
+          <p:spPr>
+            <a:xfrm>
+              <a:off x="4924580" y="2400030"/>
+              <a:ext cx="1397792" cy="241300"/>
+            </a:xfrm>
+            <a:prstGeom prst="rect">
+              <a:avLst/>
+            </a:prstGeom>
+            <a:noFill/>
+            <a:ln w="12700">
+              <a:noFill/>
+              <a:prstDash val="solid"/>
+            </a:ln>
+          </p:spPr>
+          <p:txBody>
+            <a:bodyPr lIns="91440" tIns="45720" rIns="91440" bIns="45720" rtlCol="0" anchor="t">
+              <a:noAutofit/>
+            </a:bodyPr>
+            <a:lstStyle/>
+            <a:p>
+              <a:pPr algn="ctr">
+                <a:defRPr/>
+              </a:pPr>
+              <a:r>
+                <a:rPr lang="en-US" sz="1000" dirty="0"/>
+                <a:t>Scene with NavMesh</a:t>
+              </a:r>
+              <a:endParaRPr lang="en-US" sz="1100" dirty="0"/>
+            </a:p>
+          </p:txBody>
+        </p:sp>
+      </p:grpSp>
+      <p:grpSp>
+        <p:nvGrpSpPr>
+          <p:cNvPr id="125" name="Group 125"/>
+          <p:cNvGrpSpPr/>
+          <p:nvPr/>
+        </p:nvGrpSpPr>
+        <p:grpSpPr>
+          <a:xfrm>
+            <a:off x="2801076" y="454630"/>
+            <a:ext cx="2454729" cy="279400"/>
+            <a:chOff x="2795898" y="1411455"/>
+            <a:chExt cx="2454729" cy="279400"/>
+          </a:xfrm>
+        </p:grpSpPr>
+        <p:sp>
+          <p:nvSpPr>
+            <p:cNvPr id="126" name="AutoShape 126"/>
+            <p:cNvSpPr/>
+            <p:nvPr/>
+          </p:nvSpPr>
+          <p:spPr>
+            <a:xfrm>
+              <a:off x="2859398" y="1411455"/>
+              <a:ext cx="2391229" cy="279400"/>
+            </a:xfrm>
+            <a:prstGeom prst="rect">
+              <a:avLst/>
+            </a:prstGeom>
+            <a:noFill/>
+            <a:ln w="12700">
+              <a:noFill/>
+              <a:prstDash val="solid"/>
+            </a:ln>
+          </p:spPr>
+          <p:txBody>
+            <a:bodyPr lIns="91440" tIns="45720" rIns="91440" bIns="45720" rtlCol="0" anchor="t">
+              <a:noAutofit/>
+            </a:bodyPr>
+            <a:lstStyle/>
+            <a:p>
+              <a:pPr algn="ctr">
+                <a:defRPr/>
+              </a:pPr>
+              <a:r>
+                <a:rPr lang="en-US" sz="1200" b="1" i="1" dirty="0">
+                  <a:solidFill>
+                    <a:srgbClr val="2B2F36"/>
+                  </a:solidFill>
+                  <a:latin typeface="Times New Roman"/>
+                  <a:ea typeface="Times New Roman"/>
+                  <a:cs typeface="Times New Roman"/>
+                  <a:sym typeface="Times New Roman"/>
+                </a:rPr>
+                <a:t>Preliminary Scene Configuration</a:t>
+              </a:r>
+              <a:endParaRPr lang="en-US" sz="1100" dirty="0"/>
             </a:p>
           </p:txBody>
         </p:sp>
         <p:grpSp>
           <p:nvGrpSpPr>
-            <p:cNvPr id="131" name="Group 131"/>
+            <p:cNvPr id="127" name="Group 127"/>
             <p:cNvGrpSpPr/>
             <p:nvPr/>
           </p:nvGrpSpPr>
           <p:grpSpPr>
             <a:xfrm>
-              <a:off x="4280197" y="2830813"/>
-              <a:ext cx="2501900" cy="279400"/>
-              <a:chOff x="4280197" y="2830813"/>
-              <a:chExt cx="2501900" cy="279400"/>
+              <a:off x="2795898" y="1435137"/>
+              <a:ext cx="183799" cy="192218"/>
+              <a:chOff x="2795898" y="1435137"/>
+              <a:chExt cx="183799" cy="192218"/>
             </a:xfrm>
           </p:grpSpPr>
           <p:sp>
             <p:nvSpPr>
-              <p:cNvPr id="132" name="AutoShape 132"/>
+              <p:cNvPr id="128" name="AutoShape 128"/>
               <p:cNvSpPr/>
               <p:nvPr/>
             </p:nvSpPr>
             <p:spPr>
               <a:xfrm>
-                <a:off x="4394497" y="2830813"/>
-                <a:ext cx="2387600" cy="279400"/>
+                <a:off x="2795898" y="1449555"/>
+                <a:ext cx="177800" cy="177800"/>
+              </a:xfrm>
+              <a:prstGeom prst="ellipse">
+                <a:avLst/>
+              </a:prstGeom>
+              <a:solidFill>
+                <a:srgbClr val="000000">
+                  <a:alpha val="100000"/>
+                </a:srgbClr>
+              </a:solidFill>
+              <a:ln w="25400">
+                <a:noFill/>
+                <a:prstDash val="solid"/>
+              </a:ln>
+            </p:spPr>
+            <p:txBody>
+              <a:bodyPr lIns="63500" tIns="63500" rIns="0" bIns="63500" rtlCol="0" anchor="ctr">
+                <a:noAutofit/>
+              </a:bodyPr>
+              <a:lstStyle/>
+              <a:p>
+                <a:pPr algn="ctr">
+                  <a:defRPr/>
+                </a:pPr>
+                <a:endParaRPr/>
+              </a:p>
+            </p:txBody>
+          </p:sp>
+          <p:sp>
+            <p:nvSpPr>
+              <p:cNvPr id="129" name="AutoShape 129"/>
+              <p:cNvSpPr/>
+              <p:nvPr/>
+            </p:nvSpPr>
+            <p:spPr>
+              <a:xfrm>
+                <a:off x="2852697" y="1435137"/>
+                <a:ext cx="127000" cy="190500"/>
               </a:xfrm>
               <a:prstGeom prst="rect">
                 <a:avLst/>
@@ -13304,130 +12403,193 @@
               </a:ln>
             </p:spPr>
             <p:txBody>
-              <a:bodyPr lIns="91440" tIns="45720" rIns="91440" bIns="45720" rtlCol="0" anchor="t">
+              <a:bodyPr lIns="0" tIns="0" rIns="0" bIns="0" rtlCol="0" anchor="ctr">
                 <a:noAutofit/>
               </a:bodyPr>
               <a:lstStyle/>
               <a:p>
                 <a:pPr>
+                  <a:lnSpc>
+                    <a:spcPct val="125000"/>
+                  </a:lnSpc>
                   <a:defRPr/>
                 </a:pPr>
                 <a:r>
-                  <a:rPr lang="en-US" sz="1200" b="1" i="1">
+                  <a:rPr lang="en-US" sz="1000" dirty="0">
                     <a:solidFill>
-                      <a:srgbClr val="2B2F36"/>
+                      <a:srgbClr val="FFFFFF"/>
                     </a:solidFill>
                     <a:latin typeface="Times New Roman"/>
                     <a:ea typeface="Times New Roman"/>
                     <a:cs typeface="Times New Roman"/>
                     <a:sym typeface="Times New Roman"/>
                   </a:rPr>
-                  <a:t>Implementation Interface</a:t>
+                  <a:t>1</a:t>
                 </a:r>
-                <a:endParaRPr lang="en-US" sz="1100"/>
+                <a:endParaRPr lang="en-US" sz="1100" dirty="0"/>
               </a:p>
             </p:txBody>
           </p:sp>
-          <p:grpSp>
-            <p:nvGrpSpPr>
-              <p:cNvPr id="133" name="Group 133"/>
-              <p:cNvGrpSpPr/>
+        </p:grpSp>
+      </p:grpSp>
+      <p:grpSp>
+        <p:nvGrpSpPr>
+          <p:cNvPr id="131" name="Group 131"/>
+          <p:cNvGrpSpPr/>
+          <p:nvPr/>
+        </p:nvGrpSpPr>
+        <p:grpSpPr>
+          <a:xfrm>
+            <a:off x="4285375" y="1873988"/>
+            <a:ext cx="2501900" cy="279400"/>
+            <a:chOff x="4280197" y="2830813"/>
+            <a:chExt cx="2501900" cy="279400"/>
+          </a:xfrm>
+        </p:grpSpPr>
+        <p:sp>
+          <p:nvSpPr>
+            <p:cNvPr id="132" name="AutoShape 132"/>
+            <p:cNvSpPr/>
+            <p:nvPr/>
+          </p:nvSpPr>
+          <p:spPr>
+            <a:xfrm>
+              <a:off x="4394497" y="2830813"/>
+              <a:ext cx="2387600" cy="279400"/>
+            </a:xfrm>
+            <a:prstGeom prst="rect">
+              <a:avLst/>
+            </a:prstGeom>
+            <a:noFill/>
+            <a:ln w="12700">
+              <a:noFill/>
+              <a:prstDash val="solid"/>
+            </a:ln>
+          </p:spPr>
+          <p:txBody>
+            <a:bodyPr lIns="91440" tIns="45720" rIns="91440" bIns="45720" rtlCol="0" anchor="t">
+              <a:noAutofit/>
+            </a:bodyPr>
+            <a:lstStyle/>
+            <a:p>
+              <a:pPr>
+                <a:defRPr/>
+              </a:pPr>
+              <a:r>
+                <a:rPr lang="en-US" sz="1200" b="1" i="1">
+                  <a:solidFill>
+                    <a:srgbClr val="2B2F36"/>
+                  </a:solidFill>
+                  <a:latin typeface="Times New Roman"/>
+                  <a:ea typeface="Times New Roman"/>
+                  <a:cs typeface="Times New Roman"/>
+                  <a:sym typeface="Times New Roman"/>
+                </a:rPr>
+                <a:t>Implementation Interface</a:t>
+              </a:r>
+              <a:endParaRPr lang="en-US" sz="1100"/>
+            </a:p>
+          </p:txBody>
+        </p:sp>
+        <p:grpSp>
+          <p:nvGrpSpPr>
+            <p:cNvPr id="133" name="Group 133"/>
+            <p:cNvGrpSpPr/>
+            <p:nvPr/>
+          </p:nvGrpSpPr>
+          <p:grpSpPr>
+            <a:xfrm>
+              <a:off x="4280197" y="2850262"/>
+              <a:ext cx="183799" cy="196451"/>
+              <a:chOff x="4280197" y="2850262"/>
+              <a:chExt cx="183799" cy="196451"/>
+            </a:xfrm>
+          </p:grpSpPr>
+          <p:sp>
+            <p:nvSpPr>
+              <p:cNvPr id="134" name="AutoShape 134"/>
+              <p:cNvSpPr/>
               <p:nvPr/>
-            </p:nvGrpSpPr>
-            <p:grpSpPr>
+            </p:nvSpPr>
+            <p:spPr>
               <a:xfrm>
-                <a:off x="4280197" y="2850262"/>
-                <a:ext cx="183799" cy="196451"/>
-                <a:chOff x="4280197" y="2850262"/>
-                <a:chExt cx="183799" cy="196451"/>
+                <a:off x="4280197" y="2868913"/>
+                <a:ext cx="177800" cy="177800"/>
               </a:xfrm>
-            </p:grpSpPr>
-            <p:sp>
-              <p:nvSpPr>
-                <p:cNvPr id="134" name="AutoShape 134"/>
-                <p:cNvSpPr/>
-                <p:nvPr/>
-              </p:nvSpPr>
-              <p:spPr>
-                <a:xfrm>
-                  <a:off x="4280197" y="2868913"/>
-                  <a:ext cx="177800" cy="177800"/>
-                </a:xfrm>
-                <a:prstGeom prst="ellipse">
-                  <a:avLst/>
-                </a:prstGeom>
-                <a:solidFill>
-                  <a:srgbClr val="000000">
-                    <a:alpha val="100000"/>
-                  </a:srgbClr>
-                </a:solidFill>
-                <a:ln w="25400">
-                  <a:noFill/>
-                  <a:prstDash val="solid"/>
-                </a:ln>
-              </p:spPr>
-              <p:txBody>
-                <a:bodyPr lIns="63500" tIns="63500" rIns="0" bIns="63500" rtlCol="0" anchor="ctr">
-                  <a:noAutofit/>
-                </a:bodyPr>
-                <a:lstStyle/>
-                <a:p>
-                  <a:pPr algn="ctr">
-                    <a:defRPr/>
-                  </a:pPr>
-                  <a:endParaRPr dirty="0"/>
-                </a:p>
-              </p:txBody>
-            </p:sp>
-            <p:sp>
-              <p:nvSpPr>
-                <p:cNvPr id="135" name="AutoShape 135"/>
-                <p:cNvSpPr/>
-                <p:nvPr/>
-              </p:nvSpPr>
-              <p:spPr>
-                <a:xfrm>
-                  <a:off x="4336996" y="2850262"/>
-                  <a:ext cx="127000" cy="190500"/>
-                </a:xfrm>
-                <a:prstGeom prst="rect">
-                  <a:avLst/>
-                </a:prstGeom>
+              <a:prstGeom prst="ellipse">
+                <a:avLst/>
+              </a:prstGeom>
+              <a:solidFill>
+                <a:srgbClr val="000000">
+                  <a:alpha val="100000"/>
+                </a:srgbClr>
+              </a:solidFill>
+              <a:ln w="25400">
                 <a:noFill/>
-                <a:ln w="12700">
-                  <a:noFill/>
-                  <a:prstDash val="solid"/>
-                </a:ln>
-              </p:spPr>
-              <p:txBody>
-                <a:bodyPr lIns="0" tIns="0" rIns="0" bIns="0" rtlCol="0" anchor="ctr">
-                  <a:noAutofit/>
-                </a:bodyPr>
-                <a:lstStyle/>
-                <a:p>
-                  <a:pPr>
-                    <a:lnSpc>
-                      <a:spcPct val="125000"/>
-                    </a:lnSpc>
-                    <a:defRPr/>
-                  </a:pPr>
-                  <a:r>
-                    <a:rPr lang="en-US" sz="1000" dirty="0">
-                      <a:solidFill>
-                        <a:srgbClr val="FFFFFF"/>
-                      </a:solidFill>
-                      <a:latin typeface="Times New Roman"/>
-                      <a:ea typeface="Times New Roman"/>
-                      <a:cs typeface="Times New Roman"/>
-                      <a:sym typeface="Times New Roman"/>
-                    </a:rPr>
-                    <a:t>2</a:t>
-                  </a:r>
-                  <a:endParaRPr lang="en-US" sz="1100" dirty="0"/>
-                </a:p>
-              </p:txBody>
-            </p:sp>
-          </p:grpSp>
+                <a:prstDash val="solid"/>
+              </a:ln>
+            </p:spPr>
+            <p:txBody>
+              <a:bodyPr lIns="63500" tIns="63500" rIns="0" bIns="63500" rtlCol="0" anchor="ctr">
+                <a:noAutofit/>
+              </a:bodyPr>
+              <a:lstStyle/>
+              <a:p>
+                <a:pPr algn="ctr">
+                  <a:defRPr/>
+                </a:pPr>
+                <a:endParaRPr dirty="0"/>
+              </a:p>
+            </p:txBody>
+          </p:sp>
+          <p:sp>
+            <p:nvSpPr>
+              <p:cNvPr id="135" name="AutoShape 135"/>
+              <p:cNvSpPr/>
+              <p:nvPr/>
+            </p:nvSpPr>
+            <p:spPr>
+              <a:xfrm>
+                <a:off x="4336996" y="2850262"/>
+                <a:ext cx="127000" cy="190500"/>
+              </a:xfrm>
+              <a:prstGeom prst="rect">
+                <a:avLst/>
+              </a:prstGeom>
+              <a:noFill/>
+              <a:ln w="12700">
+                <a:noFill/>
+                <a:prstDash val="solid"/>
+              </a:ln>
+            </p:spPr>
+            <p:txBody>
+              <a:bodyPr lIns="0" tIns="0" rIns="0" bIns="0" rtlCol="0" anchor="ctr">
+                <a:noAutofit/>
+              </a:bodyPr>
+              <a:lstStyle/>
+              <a:p>
+                <a:pPr>
+                  <a:lnSpc>
+                    <a:spcPct val="125000"/>
+                  </a:lnSpc>
+                  <a:defRPr/>
+                </a:pPr>
+                <a:r>
+                  <a:rPr lang="en-US" sz="1000" dirty="0">
+                    <a:solidFill>
+                      <a:srgbClr val="FFFFFF"/>
+                    </a:solidFill>
+                    <a:latin typeface="Times New Roman"/>
+                    <a:ea typeface="Times New Roman"/>
+                    <a:cs typeface="Times New Roman"/>
+                    <a:sym typeface="Times New Roman"/>
+                  </a:rPr>
+                  <a:t>2</a:t>
+                </a:r>
+                <a:endParaRPr lang="en-US" sz="1100" dirty="0"/>
+              </a:p>
+            </p:txBody>
+          </p:sp>
         </p:grpSp>
       </p:grpSp>
       <p:cxnSp>
@@ -13748,7 +12910,7 @@
                 <p:nvPr/>
               </p:nvPicPr>
               <p:blipFill>
-                <a:blip r:embed="rId7"/>
+                <a:blip r:embed="rId8"/>
                 <a:stretch>
                   <a:fillRect/>
                 </a:stretch>
@@ -13880,7 +13042,7 @@
                   <p:nvPr/>
                 </p:nvPicPr>
                 <p:blipFill>
-                  <a:blip r:embed="rId6"/>
+                  <a:blip r:embed="rId9"/>
                   <a:stretch>
                     <a:fillRect/>
                   </a:stretch>
@@ -13910,7 +13072,7 @@
                   <p:nvPr/>
                 </p:nvPicPr>
                 <p:blipFill>
-                  <a:blip r:embed="rId7"/>
+                  <a:blip r:embed="rId8"/>
                   <a:stretch>
                     <a:fillRect/>
                   </a:stretch>
@@ -14013,7 +13175,7 @@
                 <p:nvPr/>
               </p:nvPicPr>
               <p:blipFill>
-                <a:blip r:embed="rId11"/>
+                <a:blip r:embed="rId10"/>
                 <a:stretch>
                   <a:fillRect/>
                 </a:stretch>
@@ -14444,7 +13606,7 @@
               <p:nvPr/>
             </p:nvPicPr>
             <p:blipFill>
-              <a:blip r:embed="rId12"/>
+              <a:blip r:embed="rId11"/>
               <a:stretch>
                 <a:fillRect/>
               </a:stretch>
@@ -14486,7 +13648,7 @@
                 <p:nvPr/>
               </p:nvPicPr>
               <p:blipFill>
-                <a:blip r:embed="rId6"/>
+                <a:blip r:embed="rId9"/>
                 <a:stretch>
                   <a:fillRect/>
                 </a:stretch>
@@ -14516,7 +13678,7 @@
                 <p:nvPr/>
               </p:nvPicPr>
               <p:blipFill>
-                <a:blip r:embed="rId7"/>
+                <a:blip r:embed="rId8"/>
                 <a:stretch>
                   <a:fillRect/>
                 </a:stretch>
@@ -14546,7 +13708,7 @@
             <p:nvPr/>
           </p:nvPicPr>
           <p:blipFill>
-            <a:blip r:embed="rId13"/>
+            <a:blip r:embed="rId12"/>
             <a:stretch>
               <a:fillRect/>
             </a:stretch>
@@ -14588,7 +13750,7 @@
               <p:nvPr/>
             </p:nvPicPr>
             <p:blipFill>
-              <a:blip r:embed="rId12"/>
+              <a:blip r:embed="rId11"/>
               <a:stretch>
                 <a:fillRect/>
               </a:stretch>
@@ -14630,7 +13792,7 @@
                 <p:nvPr/>
               </p:nvPicPr>
               <p:blipFill>
-                <a:blip r:embed="rId6"/>
+                <a:blip r:embed="rId9"/>
                 <a:stretch>
                   <a:fillRect/>
                 </a:stretch>
@@ -14660,7 +13822,7 @@
                 <p:nvPr/>
               </p:nvPicPr>
               <p:blipFill>
-                <a:blip r:embed="rId7"/>
+                <a:blip r:embed="rId8"/>
                 <a:stretch>
                   <a:fillRect/>
                 </a:stretch>
@@ -14704,7 +13866,7 @@
               <p:nvPr/>
             </p:nvPicPr>
             <p:blipFill>
-              <a:blip r:embed="rId12"/>
+              <a:blip r:embed="rId11"/>
               <a:stretch>
                 <a:fillRect/>
               </a:stretch>
@@ -14746,7 +13908,7 @@
                 <p:nvPr/>
               </p:nvPicPr>
               <p:blipFill>
-                <a:blip r:embed="rId6"/>
+                <a:blip r:embed="rId9"/>
                 <a:stretch>
                   <a:fillRect/>
                 </a:stretch>
@@ -14776,7 +13938,7 @@
                 <p:nvPr/>
               </p:nvPicPr>
               <p:blipFill>
-                <a:blip r:embed="rId7"/>
+                <a:blip r:embed="rId8"/>
                 <a:stretch>
                   <a:fillRect/>
                 </a:stretch>
@@ -15272,7 +14434,7 @@
                 <p:nvPr/>
               </p:nvPicPr>
               <p:blipFill>
-                <a:blip r:embed="rId7"/>
+                <a:blip r:embed="rId8"/>
                 <a:stretch>
                   <a:fillRect/>
                 </a:stretch>
@@ -15431,7 +14593,7 @@
                   <p:nvPr/>
                 </p:nvPicPr>
                 <p:blipFill>
-                  <a:blip r:embed="rId6"/>
+                  <a:blip r:embed="rId9"/>
                   <a:stretch>
                     <a:fillRect/>
                   </a:stretch>
@@ -15461,7 +14623,7 @@
                   <p:nvPr/>
                 </p:nvPicPr>
                 <p:blipFill>
-                  <a:blip r:embed="rId7"/>
+                  <a:blip r:embed="rId8"/>
                   <a:stretch>
                     <a:fillRect/>
                   </a:stretch>
@@ -16144,7 +15306,7 @@
               <p:nvPr/>
             </p:nvPicPr>
             <p:blipFill>
-              <a:blip r:embed="rId14"/>
+              <a:blip r:embed="rId13"/>
               <a:srcRect/>
               <a:stretch>
                 <a:fillRect/>
@@ -16199,7 +15361,7 @@
                 <p:nvPr/>
               </p:nvPicPr>
               <p:blipFill>
-                <a:blip r:embed="rId15"/>
+                <a:blip r:embed="rId14"/>
                 <a:srcRect/>
                 <a:stretch>
                   <a:fillRect/>
@@ -16518,7 +15680,7 @@
               <p:nvPr/>
             </p:nvPicPr>
             <p:blipFill>
-              <a:blip r:embed="rId6"/>
+              <a:blip r:embed="rId9"/>
               <a:stretch>
                 <a:fillRect/>
               </a:stretch>
@@ -16554,7 +15716,7 @@
               <p:nvPr/>
             </p:nvPicPr>
             <p:blipFill>
-              <a:blip r:embed="rId7"/>
+              <a:blip r:embed="rId8"/>
               <a:stretch>
                 <a:fillRect/>
               </a:stretch>
@@ -16763,7 +15925,10 @@
             </a:avLst>
           </a:prstGeom>
           <a:noFill/>
-          <a:ln>
+          <a:ln w="31750">
+            <a:solidFill>
+              <a:srgbClr val="C00000"/>
+            </a:solidFill>
             <a:prstDash val="dash"/>
           </a:ln>
         </p:spPr>
@@ -16788,7 +15953,7 @@
           <a:lstStyle/>
           <a:p>
             <a:pPr algn="ctr"/>
-            <a:endParaRPr lang="zh-CN" altLang="en-US"/>
+            <a:endParaRPr lang="zh-CN" altLang="en-US" dirty="0"/>
           </a:p>
         </p:txBody>
       </p:sp>
@@ -17337,7 +16502,7 @@
                   <p:nvPr/>
                 </p:nvPicPr>
                 <p:blipFill>
-                  <a:blip r:embed="rId7"/>
+                  <a:blip r:embed="rId8"/>
                   <a:stretch>
                     <a:fillRect/>
                   </a:stretch>
@@ -17371,7 +16536,7 @@
                   <p:nvPr/>
                 </p:nvPicPr>
                 <p:blipFill>
-                  <a:blip r:embed="rId12"/>
+                  <a:blip r:embed="rId11"/>
                   <a:stretch>
                     <a:fillRect/>
                   </a:stretch>
@@ -17405,7 +16570,7 @@
                   <p:nvPr/>
                 </p:nvPicPr>
                 <p:blipFill>
-                  <a:blip r:embed="rId6"/>
+                  <a:blip r:embed="rId9"/>
                   <a:stretch>
                     <a:fillRect/>
                   </a:stretch>
@@ -17568,7 +16733,7 @@
                 <p:nvPr/>
               </p:nvPicPr>
               <p:blipFill>
-                <a:blip r:embed="rId13"/>
+                <a:blip r:embed="rId12"/>
                 <a:stretch>
                   <a:fillRect/>
                 </a:stretch>
@@ -17646,7 +16811,7 @@
             <p:nvPr/>
           </p:nvPicPr>
           <p:blipFill>
-            <a:blip r:embed="rId10"/>
+            <a:blip r:embed="rId15"/>
             <a:stretch>
               <a:fillRect/>
             </a:stretch>
@@ -17726,8 +16891,8 @@
         </p:nvSpPr>
         <p:spPr>
           <a:xfrm>
-            <a:off x="170696" y="3754852"/>
-            <a:ext cx="2055668" cy="3283018"/>
+            <a:off x="170696" y="2681909"/>
+            <a:ext cx="2055668" cy="4355962"/>
           </a:xfrm>
           <a:prstGeom prst="roundRect">
             <a:avLst>
@@ -17765,8 +16930,8 @@
         </p:nvSpPr>
         <p:spPr>
           <a:xfrm>
-            <a:off x="234293" y="3761906"/>
-            <a:ext cx="2446036" cy="335688"/>
+            <a:off x="253237" y="2702221"/>
+            <a:ext cx="1972605" cy="335688"/>
           </a:xfrm>
           <a:prstGeom prst="rect">
             <a:avLst/>
@@ -17812,10 +16977,10 @@
         </p:nvGrpSpPr>
         <p:grpSpPr>
           <a:xfrm>
-            <a:off x="315557" y="4128704"/>
-            <a:ext cx="2248671" cy="1609261"/>
-            <a:chOff x="2815839" y="5831928"/>
-            <a:chExt cx="2248671" cy="1609261"/>
+            <a:off x="586088" y="3119562"/>
+            <a:ext cx="1268118" cy="1130324"/>
+            <a:chOff x="2815837" y="5831928"/>
+            <a:chExt cx="1902614" cy="1609259"/>
           </a:xfrm>
         </p:grpSpPr>
         <p:sp>
@@ -17826,8 +16991,8 @@
           </p:nvSpPr>
           <p:spPr>
             <a:xfrm>
-              <a:off x="2815839" y="5850495"/>
-              <a:ext cx="1705621" cy="1590694"/>
+              <a:off x="2815837" y="5850493"/>
+              <a:ext cx="1830007" cy="1590694"/>
             </a:xfrm>
             <a:prstGeom prst="roundRect">
               <a:avLst>
@@ -17858,7 +17023,7 @@
               <a:pPr algn="ctr">
                 <a:defRPr/>
               </a:pPr>
-              <a:endParaRPr/>
+              <a:endParaRPr dirty="0"/>
             </a:p>
           </p:txBody>
         </p:sp>
@@ -17895,7 +17060,7 @@
                 <a:defRPr/>
               </a:pPr>
               <a:r>
-                <a:rPr lang="en-US" altLang="zh-CN" dirty="0">
+                <a:rPr lang="en-US" altLang="zh-CN" sz="900" dirty="0">
                   <a:solidFill>
                     <a:srgbClr val="1F2329"/>
                   </a:solidFill>
@@ -17903,14 +17068,14 @@
                 <a:t>Hierarchy</a:t>
               </a:r>
               <a:r>
-                <a:rPr lang="en-US" dirty="0">
+                <a:rPr lang="en-US" sz="900" dirty="0">
                   <a:solidFill>
                     <a:srgbClr val="1F2329"/>
                   </a:solidFill>
                 </a:rPr>
                 <a:t> Analysis</a:t>
               </a:r>
-              <a:endParaRPr lang="en-US" sz="1100" dirty="0"/>
+              <a:endParaRPr lang="en-US" sz="700" dirty="0"/>
             </a:p>
           </p:txBody>
         </p:sp>
@@ -17949,7 +17114,7 @@
               <p:nvPr/>
             </p:nvPicPr>
             <p:blipFill>
-              <a:blip r:embed="rId12"/>
+              <a:blip r:embed="rId11"/>
               <a:stretch>
                 <a:fillRect/>
               </a:stretch>
@@ -18080,7 +17245,7 @@
               <p:nvPr/>
             </p:nvPicPr>
             <p:blipFill>
-              <a:blip r:embed="rId12"/>
+              <a:blip r:embed="rId11"/>
               <a:stretch>
                 <a:fillRect/>
               </a:stretch>
@@ -18121,7 +17286,7 @@
               <p:nvPr/>
             </p:nvPicPr>
             <p:blipFill>
-              <a:blip r:embed="rId12"/>
+              <a:blip r:embed="rId11"/>
               <a:stretch>
                 <a:fillRect/>
               </a:stretch>
@@ -18162,7 +17327,7 @@
               <p:nvPr/>
             </p:nvPicPr>
             <p:blipFill>
-              <a:blip r:embed="rId12"/>
+              <a:blip r:embed="rId11"/>
               <a:stretch>
                 <a:fillRect/>
               </a:stretch>
@@ -18248,7 +17413,7 @@
               <p:nvPr/>
             </p:nvPicPr>
             <p:blipFill>
-              <a:blip r:embed="rId12"/>
+              <a:blip r:embed="rId11"/>
               <a:stretch>
                 <a:fillRect/>
               </a:stretch>
@@ -18334,8 +17499,8 @@
           </p:nvSpPr>
           <p:spPr>
             <a:xfrm>
-              <a:off x="3592305" y="6369054"/>
-              <a:ext cx="1155700" cy="215900"/>
+              <a:off x="3562751" y="6332845"/>
+              <a:ext cx="1155700" cy="215901"/>
             </a:xfrm>
             <a:prstGeom prst="rect">
               <a:avLst/>
@@ -18356,10 +17521,10 @@
                 <a:defRPr/>
               </a:pPr>
               <a:r>
-                <a:rPr lang="en-US" sz="1000" dirty="0"/>
+                <a:rPr lang="en-US" sz="800" dirty="0"/>
                 <a:t>Interactables</a:t>
               </a:r>
-              <a:endParaRPr lang="en-US" dirty="0"/>
+              <a:endParaRPr lang="en-US" sz="1100" dirty="0"/>
             </a:p>
           </p:txBody>
         </p:sp>
@@ -18399,10 +17564,10 @@
                 <a:defRPr/>
               </a:pPr>
               <a:r>
-                <a:rPr lang="en-US" sz="1000" dirty="0"/>
+                <a:rPr lang="en-US" sz="800" dirty="0"/>
                 <a:t>Environment</a:t>
               </a:r>
-              <a:endParaRPr lang="en-US" dirty="0"/>
+              <a:endParaRPr lang="en-US" sz="1100" dirty="0"/>
             </a:p>
           </p:txBody>
         </p:sp>
@@ -18420,8 +17585,8 @@
           </p:nvSpPr>
           <p:spPr>
             <a:xfrm>
-              <a:off x="3908810" y="6591131"/>
-              <a:ext cx="1155700" cy="215900"/>
+              <a:off x="3906675" y="6577666"/>
+              <a:ext cx="809641" cy="253127"/>
             </a:xfrm>
             <a:prstGeom prst="rect">
               <a:avLst/>
@@ -18442,10 +17607,10 @@
                 <a:defRPr/>
               </a:pPr>
               <a:r>
-                <a:rPr lang="en-US" sz="1000" dirty="0"/>
+                <a:rPr lang="en-US" sz="800" dirty="0"/>
                 <a:t>Box</a:t>
               </a:r>
-              <a:endParaRPr lang="en-US" dirty="0"/>
+              <a:endParaRPr lang="en-US" sz="1100" dirty="0"/>
             </a:p>
           </p:txBody>
         </p:sp>
@@ -18464,10 +17629,10 @@
         </p:nvGrpSpPr>
         <p:grpSpPr>
           <a:xfrm>
-            <a:off x="466351" y="5838510"/>
-            <a:ext cx="1650574" cy="1004565"/>
-            <a:chOff x="201782" y="7274076"/>
-            <a:chExt cx="1650574" cy="1004565"/>
+            <a:off x="466351" y="5828350"/>
+            <a:ext cx="1316730" cy="803785"/>
+            <a:chOff x="201783" y="7274076"/>
+            <a:chExt cx="1289044" cy="803785"/>
           </a:xfrm>
         </p:grpSpPr>
         <p:grpSp>
@@ -18484,10 +17649,10 @@
           </p:nvGrpSpPr>
           <p:grpSpPr>
             <a:xfrm>
-              <a:off x="201782" y="7326296"/>
-              <a:ext cx="1492944" cy="952345"/>
-              <a:chOff x="201782" y="7326296"/>
-              <a:chExt cx="1492944" cy="952345"/>
+              <a:off x="201783" y="7326297"/>
+              <a:ext cx="1289044" cy="751564"/>
+              <a:chOff x="201783" y="7326297"/>
+              <a:chExt cx="1289044" cy="751564"/>
             </a:xfrm>
           </p:grpSpPr>
           <p:sp>
@@ -18504,8 +17669,8 @@
             </p:nvSpPr>
             <p:spPr>
               <a:xfrm>
-                <a:off x="201782" y="7326296"/>
-                <a:ext cx="1492944" cy="952345"/>
+                <a:off x="201783" y="7326297"/>
+                <a:ext cx="1289044" cy="751564"/>
               </a:xfrm>
               <a:prstGeom prst="roundRect">
                 <a:avLst>
@@ -18554,10 +17719,10 @@
             </p:nvGrpSpPr>
             <p:grpSpPr>
               <a:xfrm>
-                <a:off x="296303" y="7726581"/>
-                <a:ext cx="531847" cy="464243"/>
-                <a:chOff x="963821" y="7322800"/>
-                <a:chExt cx="531847" cy="464243"/>
+                <a:off x="314949" y="7702810"/>
+                <a:ext cx="502496" cy="255942"/>
+                <a:chOff x="982467" y="7299029"/>
+                <a:chExt cx="502496" cy="255942"/>
               </a:xfrm>
             </p:grpSpPr>
             <p:pic>
@@ -18575,15 +17740,15 @@
                 <p:nvPr/>
               </p:nvPicPr>
               <p:blipFill>
-                <a:blip r:embed="rId6"/>
+                <a:blip r:embed="rId9"/>
                 <a:stretch>
                   <a:fillRect/>
                 </a:stretch>
               </p:blipFill>
               <p:spPr>
                 <a:xfrm>
-                  <a:off x="963821" y="7322800"/>
-                  <a:ext cx="406400" cy="383855"/>
+                  <a:off x="982467" y="7299029"/>
+                  <a:ext cx="253843" cy="239761"/>
                 </a:xfrm>
                 <a:prstGeom prst="roundRect">
                   <a:avLst>
@@ -18611,15 +17776,15 @@
                 <p:nvPr/>
               </p:nvPicPr>
               <p:blipFill>
-                <a:blip r:embed="rId6"/>
+                <a:blip r:embed="rId9"/>
                 <a:stretch>
                   <a:fillRect/>
                 </a:stretch>
               </p:blipFill>
               <p:spPr>
                 <a:xfrm>
-                  <a:off x="1089268" y="7403188"/>
-                  <a:ext cx="406400" cy="383855"/>
+                  <a:off x="1231120" y="7315210"/>
+                  <a:ext cx="253843" cy="239761"/>
                 </a:xfrm>
                 <a:prstGeom prst="roundRect">
                   <a:avLst>
@@ -18647,10 +17812,10 @@
             </p:nvGrpSpPr>
             <p:grpSpPr>
               <a:xfrm>
-                <a:off x="884989" y="7738893"/>
-                <a:ext cx="531697" cy="507046"/>
-                <a:chOff x="1572246" y="7279736"/>
-                <a:chExt cx="531697" cy="507046"/>
+                <a:off x="844195" y="7726466"/>
+                <a:ext cx="529272" cy="244752"/>
+                <a:chOff x="1531452" y="7267309"/>
+                <a:chExt cx="529272" cy="244752"/>
               </a:xfrm>
             </p:grpSpPr>
             <p:pic>
@@ -18668,15 +17833,15 @@
                 <p:nvPr/>
               </p:nvPicPr>
               <p:blipFill>
-                <a:blip r:embed="rId10"/>
+                <a:blip r:embed="rId15"/>
                 <a:stretch>
                   <a:fillRect/>
                 </a:stretch>
               </p:blipFill>
               <p:spPr>
                 <a:xfrm>
-                  <a:off x="1572246" y="7279736"/>
-                  <a:ext cx="406250" cy="383713"/>
+                  <a:off x="1531452" y="7267309"/>
+                  <a:ext cx="253749" cy="239672"/>
                 </a:xfrm>
                 <a:prstGeom prst="rect">
                   <a:avLst/>
@@ -18702,15 +17867,15 @@
                 <p:nvPr/>
               </p:nvPicPr>
               <p:blipFill>
-                <a:blip r:embed="rId10"/>
+                <a:blip r:embed="rId15"/>
                 <a:stretch>
                   <a:fillRect/>
                 </a:stretch>
               </p:blipFill>
               <p:spPr>
                 <a:xfrm>
-                  <a:off x="1697693" y="7403069"/>
-                  <a:ext cx="406250" cy="383713"/>
+                  <a:off x="1806975" y="7272389"/>
+                  <a:ext cx="253749" cy="239672"/>
                 </a:xfrm>
                 <a:prstGeom prst="rect">
                   <a:avLst/>
@@ -18737,8 +17902,8 @@
           </p:nvSpPr>
           <p:spPr>
             <a:xfrm>
-              <a:off x="299457" y="7274076"/>
-              <a:ext cx="1552899" cy="567045"/>
+              <a:off x="299458" y="7274076"/>
+              <a:ext cx="1112374" cy="567045"/>
             </a:xfrm>
             <a:prstGeom prst="rect">
               <a:avLst/>
@@ -18759,14 +17924,14 @@
                 <a:defRPr/>
               </a:pPr>
               <a:r>
-                <a:rPr lang="en-US" sz="1100" dirty="0">
+                <a:rPr lang="en-US" sz="900" dirty="0">
                   <a:solidFill>
                     <a:srgbClr val="1F2329"/>
                   </a:solidFill>
                 </a:rPr>
                 <a:t>Game Logic Code &amp; Third Plugin Analysis</a:t>
               </a:r>
-              <a:endParaRPr lang="en-US" sz="1100" dirty="0"/>
+              <a:endParaRPr lang="en-US" sz="900" dirty="0"/>
             </a:p>
           </p:txBody>
         </p:sp>
@@ -18832,7 +17997,7 @@
         </p:nvSpPr>
         <p:spPr>
           <a:xfrm>
-            <a:off x="2292894" y="4427923"/>
+            <a:off x="2292214" y="4407429"/>
             <a:ext cx="306223" cy="1477271"/>
           </a:xfrm>
           <a:prstGeom prst="rect">
@@ -20544,11 +19709,9 @@
               </a:avLst>
             </a:prstGeom>
             <a:noFill/>
-            <a:ln w="25400" cap="flat">
+            <a:ln w="31750" cap="flat" cmpd="sng">
               <a:solidFill>
-                <a:srgbClr val="000000">
-                  <a:alpha val="100000"/>
-                </a:srgbClr>
+                <a:srgbClr val="0CA410"/>
               </a:solidFill>
               <a:prstDash val="dash"/>
             </a:ln>
@@ -20562,7 +19725,7 @@
               <a:pPr algn="ctr">
                 <a:defRPr/>
               </a:pPr>
-              <a:endParaRPr/>
+              <a:endParaRPr dirty="0"/>
             </a:p>
           </p:txBody>
         </p:sp>
@@ -20633,8 +19796,8 @@
         </p:nvCxnSpPr>
         <p:spPr>
           <a:xfrm>
-            <a:off x="1371600" y="3511715"/>
-            <a:ext cx="0" cy="243137"/>
+            <a:off x="1227666" y="2429908"/>
+            <a:ext cx="0" cy="252000"/>
           </a:xfrm>
           <a:prstGeom prst="straightConnector1">
             <a:avLst/>
@@ -20699,6 +19862,902 @@
           </a:fontRef>
         </p:style>
       </p:cxnSp>
+      <p:grpSp>
+        <p:nvGrpSpPr>
+          <p:cNvPr id="75" name="组合 74">
+            <a:extLst>
+              <a:ext uri="{FF2B5EF4-FFF2-40B4-BE49-F238E27FC236}">
+                <a16:creationId xmlns:a16="http://schemas.microsoft.com/office/drawing/2014/main" id="{7B16C414-B707-5EC6-5D84-96E4B58FD574}"/>
+              </a:ext>
+            </a:extLst>
+          </p:cNvPr>
+          <p:cNvGrpSpPr/>
+          <p:nvPr/>
+        </p:nvGrpSpPr>
+        <p:grpSpPr>
+          <a:xfrm>
+            <a:off x="2735873" y="1864080"/>
+            <a:ext cx="3722489" cy="1358054"/>
+            <a:chOff x="2735873" y="1864080"/>
+            <a:chExt cx="3722489" cy="1358054"/>
+          </a:xfrm>
+        </p:grpSpPr>
+        <p:grpSp>
+          <p:nvGrpSpPr>
+            <p:cNvPr id="95" name="Group 95"/>
+            <p:cNvGrpSpPr/>
+            <p:nvPr/>
+          </p:nvGrpSpPr>
+          <p:grpSpPr>
+            <a:xfrm>
+              <a:off x="5134938" y="2241066"/>
+              <a:ext cx="1318745" cy="808609"/>
+              <a:chOff x="5129760" y="3197891"/>
+              <a:chExt cx="1318745" cy="808609"/>
+            </a:xfrm>
+          </p:grpSpPr>
+          <p:sp>
+            <p:nvSpPr>
+              <p:cNvPr id="96" name="AutoShape 96"/>
+              <p:cNvSpPr/>
+              <p:nvPr/>
+            </p:nvSpPr>
+            <p:spPr>
+              <a:xfrm>
+                <a:off x="5129760" y="3197891"/>
+                <a:ext cx="1231900" cy="791700"/>
+              </a:xfrm>
+              <a:prstGeom prst="roundRect">
+                <a:avLst>
+                  <a:gd name="adj" fmla="val 12833"/>
+                </a:avLst>
+              </a:prstGeom>
+              <a:solidFill>
+                <a:srgbClr val="FCB86B">
+                  <a:alpha val="70000"/>
+                </a:srgbClr>
+              </a:solidFill>
+              <a:ln w="25400" cap="flat" cmpd="sng">
+                <a:solidFill>
+                  <a:srgbClr val="2B2F36">
+                    <a:alpha val="70000"/>
+                  </a:srgbClr>
+                </a:solidFill>
+                <a:prstDash val="solid"/>
+                <a:round/>
+              </a:ln>
+            </p:spPr>
+            <p:txBody>
+              <a:bodyPr lIns="63500" tIns="63500" rIns="63500" bIns="63500" rtlCol="0" anchor="ctr">
+                <a:noAutofit/>
+              </a:bodyPr>
+              <a:lstStyle/>
+              <a:p>
+                <a:pPr algn="ctr">
+                  <a:defRPr/>
+                </a:pPr>
+                <a:endParaRPr/>
+              </a:p>
+            </p:txBody>
+          </p:sp>
+          <p:grpSp>
+            <p:nvGrpSpPr>
+              <p:cNvPr id="97" name="Group 97"/>
+              <p:cNvGrpSpPr/>
+              <p:nvPr/>
+            </p:nvGrpSpPr>
+            <p:grpSpPr>
+              <a:xfrm>
+                <a:off x="5315414" y="3279362"/>
+                <a:ext cx="432300" cy="456990"/>
+                <a:chOff x="5315414" y="3279362"/>
+                <a:chExt cx="432300" cy="456990"/>
+              </a:xfrm>
+            </p:grpSpPr>
+            <p:pic>
+              <p:nvPicPr>
+                <p:cNvPr id="98" name="Picture 98"/>
+                <p:cNvPicPr>
+                  <a:picLocks noChangeAspect="1"/>
+                </p:cNvPicPr>
+                <p:nvPr/>
+              </p:nvPicPr>
+              <p:blipFill>
+                <a:blip r:embed="rId9"/>
+                <a:stretch>
+                  <a:fillRect/>
+                </a:stretch>
+              </p:blipFill>
+              <p:spPr>
+                <a:xfrm>
+                  <a:off x="5315414" y="3279362"/>
+                  <a:ext cx="385930" cy="378504"/>
+                </a:xfrm>
+                <a:prstGeom prst="roundRect">
+                  <a:avLst>
+                    <a:gd name="adj" fmla="val 10920"/>
+                  </a:avLst>
+                </a:prstGeom>
+                <a:ln>
+                  <a:noFill/>
+                  <a:prstDash val="solid"/>
+                </a:ln>
+              </p:spPr>
+            </p:pic>
+            <p:pic>
+              <p:nvPicPr>
+                <p:cNvPr id="99" name="Picture 99"/>
+                <p:cNvPicPr>
+                  <a:picLocks noChangeAspect="1"/>
+                </p:cNvPicPr>
+                <p:nvPr/>
+              </p:nvPicPr>
+              <p:blipFill>
+                <a:blip r:embed="rId8"/>
+                <a:stretch>
+                  <a:fillRect/>
+                </a:stretch>
+              </p:blipFill>
+              <p:spPr>
+                <a:xfrm>
+                  <a:off x="5548991" y="3541452"/>
+                  <a:ext cx="198723" cy="194900"/>
+                </a:xfrm>
+                <a:prstGeom prst="rect">
+                  <a:avLst/>
+                </a:prstGeom>
+                <a:ln>
+                  <a:noFill/>
+                  <a:prstDash val="solid"/>
+                </a:ln>
+              </p:spPr>
+            </p:pic>
+          </p:grpSp>
+          <p:sp>
+            <p:nvSpPr>
+              <p:cNvPr id="100" name="AutoShape 100"/>
+              <p:cNvSpPr/>
+              <p:nvPr/>
+            </p:nvSpPr>
+            <p:spPr>
+              <a:xfrm>
+                <a:off x="5129760" y="3701700"/>
+                <a:ext cx="1318745" cy="304800"/>
+              </a:xfrm>
+              <a:prstGeom prst="rect">
+                <a:avLst/>
+              </a:prstGeom>
+              <a:noFill/>
+              <a:ln w="12700">
+                <a:noFill/>
+                <a:prstDash val="solid"/>
+              </a:ln>
+            </p:spPr>
+            <p:txBody>
+              <a:bodyPr lIns="91440" tIns="45720" rIns="91440" bIns="45720" rtlCol="0" anchor="t">
+                <a:noAutofit/>
+              </a:bodyPr>
+              <a:lstStyle/>
+              <a:p>
+                <a:pPr>
+                  <a:defRPr/>
+                </a:pPr>
+                <a:r>
+                  <a:rPr lang="en-US" sz="700"/>
+                  <a:t>Mono Scripts Implemented Entity Interface</a:t>
+                </a:r>
+                <a:endParaRPr lang="en-US" sz="1100"/>
+              </a:p>
+            </p:txBody>
+          </p:sp>
+          <p:grpSp>
+            <p:nvGrpSpPr>
+              <p:cNvPr id="101" name="Group 101"/>
+              <p:cNvGrpSpPr/>
+              <p:nvPr/>
+            </p:nvGrpSpPr>
+            <p:grpSpPr>
+              <a:xfrm>
+                <a:off x="5761861" y="3292477"/>
+                <a:ext cx="419164" cy="446593"/>
+                <a:chOff x="5761861" y="3292477"/>
+                <a:chExt cx="419164" cy="446593"/>
+              </a:xfrm>
+            </p:grpSpPr>
+            <p:pic>
+              <p:nvPicPr>
+                <p:cNvPr id="102" name="Picture 102"/>
+                <p:cNvPicPr>
+                  <a:picLocks noChangeAspect="1"/>
+                </p:cNvPicPr>
+                <p:nvPr/>
+              </p:nvPicPr>
+              <p:blipFill>
+                <a:blip r:embed="rId9"/>
+                <a:stretch>
+                  <a:fillRect/>
+                </a:stretch>
+              </p:blipFill>
+              <p:spPr>
+                <a:xfrm>
+                  <a:off x="5761861" y="3292477"/>
+                  <a:ext cx="385930" cy="378504"/>
+                </a:xfrm>
+                <a:prstGeom prst="roundRect">
+                  <a:avLst>
+                    <a:gd name="adj" fmla="val 10920"/>
+                  </a:avLst>
+                </a:prstGeom>
+                <a:ln>
+                  <a:noFill/>
+                  <a:prstDash val="solid"/>
+                </a:ln>
+              </p:spPr>
+            </p:pic>
+            <p:pic>
+              <p:nvPicPr>
+                <p:cNvPr id="103" name="Picture 103"/>
+                <p:cNvPicPr>
+                  <a:picLocks noChangeAspect="1"/>
+                </p:cNvPicPr>
+                <p:nvPr/>
+              </p:nvPicPr>
+              <p:blipFill>
+                <a:blip r:embed="rId8"/>
+                <a:stretch>
+                  <a:fillRect/>
+                </a:stretch>
+              </p:blipFill>
+              <p:spPr>
+                <a:xfrm>
+                  <a:off x="5982302" y="3544170"/>
+                  <a:ext cx="198723" cy="194900"/>
+                </a:xfrm>
+                <a:prstGeom prst="rect">
+                  <a:avLst/>
+                </a:prstGeom>
+                <a:ln>
+                  <a:noFill/>
+                  <a:prstDash val="solid"/>
+                </a:ln>
+              </p:spPr>
+            </p:pic>
+          </p:grpSp>
+        </p:grpSp>
+        <p:sp>
+          <p:nvSpPr>
+            <p:cNvPr id="111" name="AutoShape 111"/>
+            <p:cNvSpPr/>
+            <p:nvPr/>
+          </p:nvSpPr>
+          <p:spPr>
+            <a:xfrm>
+              <a:off x="4132475" y="2087674"/>
+              <a:ext cx="1108143" cy="660400"/>
+            </a:xfrm>
+            <a:prstGeom prst="rect">
+              <a:avLst/>
+            </a:prstGeom>
+            <a:noFill/>
+            <a:ln w="12700">
+              <a:noFill/>
+              <a:prstDash val="solid"/>
+            </a:ln>
+          </p:spPr>
+          <p:txBody>
+            <a:bodyPr lIns="91440" tIns="45720" rIns="91440" bIns="45720" rtlCol="0" anchor="t">
+              <a:noAutofit/>
+            </a:bodyPr>
+            <a:lstStyle/>
+            <a:p>
+              <a:pPr algn="ctr">
+                <a:lnSpc>
+                  <a:spcPct val="125000"/>
+                </a:lnSpc>
+                <a:defRPr/>
+              </a:pPr>
+              <a:r>
+                <a:rPr lang="en-US" sz="1000">
+                  <a:solidFill>
+                    <a:srgbClr val="2B2F36"/>
+                  </a:solidFill>
+                </a:rPr>
+                <a:t> Customizing Entity Interface Configuration</a:t>
+              </a:r>
+              <a:endParaRPr lang="en-US" sz="1100"/>
+            </a:p>
+          </p:txBody>
+        </p:sp>
+        <p:grpSp>
+          <p:nvGrpSpPr>
+            <p:cNvPr id="112" name="Group 112"/>
+            <p:cNvGrpSpPr/>
+            <p:nvPr/>
+          </p:nvGrpSpPr>
+          <p:grpSpPr>
+            <a:xfrm>
+              <a:off x="2805451" y="1922466"/>
+              <a:ext cx="1432022" cy="1239823"/>
+              <a:chOff x="2800273" y="2879291"/>
+              <a:chExt cx="1432022" cy="1239823"/>
+            </a:xfrm>
+          </p:grpSpPr>
+          <p:grpSp>
+            <p:nvGrpSpPr>
+              <p:cNvPr id="113" name="Group 113"/>
+              <p:cNvGrpSpPr/>
+              <p:nvPr/>
+            </p:nvGrpSpPr>
+            <p:grpSpPr>
+              <a:xfrm>
+                <a:off x="2800273" y="2879291"/>
+                <a:ext cx="1397000" cy="1197740"/>
+                <a:chOff x="2800273" y="2879291"/>
+                <a:chExt cx="1397000" cy="1197740"/>
+              </a:xfrm>
+            </p:grpSpPr>
+            <p:grpSp>
+              <p:nvGrpSpPr>
+                <p:cNvPr id="114" name="Group 114"/>
+                <p:cNvGrpSpPr/>
+                <p:nvPr/>
+              </p:nvGrpSpPr>
+              <p:grpSpPr>
+                <a:xfrm>
+                  <a:off x="2800273" y="2879291"/>
+                  <a:ext cx="1397000" cy="1197740"/>
+                  <a:chOff x="2800273" y="2879291"/>
+                  <a:chExt cx="1397000" cy="1197740"/>
+                </a:xfrm>
+              </p:grpSpPr>
+              <p:sp>
+                <p:nvSpPr>
+                  <p:cNvPr id="115" name="AutoShape 115"/>
+                  <p:cNvSpPr/>
+                  <p:nvPr/>
+                </p:nvSpPr>
+                <p:spPr>
+                  <a:xfrm>
+                    <a:off x="2800273" y="2879291"/>
+                    <a:ext cx="1397000" cy="1197740"/>
+                  </a:xfrm>
+                  <a:prstGeom prst="roundRect">
+                    <a:avLst>
+                      <a:gd name="adj" fmla="val 9090"/>
+                    </a:avLst>
+                  </a:prstGeom>
+                  <a:solidFill>
+                    <a:srgbClr val="DEE0E3">
+                      <a:alpha val="20000"/>
+                    </a:srgbClr>
+                  </a:solidFill>
+                  <a:ln w="25400" cap="flat" cmpd="sng">
+                    <a:solidFill>
+                      <a:srgbClr val="2B2F36">
+                        <a:alpha val="20000"/>
+                      </a:srgbClr>
+                    </a:solidFill>
+                    <a:prstDash val="solid"/>
+                    <a:round/>
+                  </a:ln>
+                </p:spPr>
+                <p:txBody>
+                  <a:bodyPr lIns="63500" tIns="63500" rIns="63500" bIns="63500" rtlCol="0" anchor="ctr">
+                    <a:noAutofit/>
+                  </a:bodyPr>
+                  <a:lstStyle/>
+                  <a:p>
+                    <a:pPr algn="ctr">
+                      <a:defRPr/>
+                    </a:pPr>
+                    <a:endParaRPr dirty="0"/>
+                  </a:p>
+                </p:txBody>
+              </p:sp>
+              <p:sp>
+                <p:nvSpPr>
+                  <p:cNvPr id="116" name="AutoShape 116"/>
+                  <p:cNvSpPr/>
+                  <p:nvPr/>
+                </p:nvSpPr>
+                <p:spPr>
+                  <a:xfrm>
+                    <a:off x="2912541" y="3377764"/>
+                    <a:ext cx="1114207" cy="538652"/>
+                  </a:xfrm>
+                  <a:prstGeom prst="roundRect">
+                    <a:avLst>
+                      <a:gd name="adj" fmla="val 17647"/>
+                    </a:avLst>
+                  </a:prstGeom>
+                  <a:solidFill>
+                    <a:srgbClr val="FAD355">
+                      <a:alpha val="70000"/>
+                    </a:srgbClr>
+                  </a:solidFill>
+                  <a:ln w="25400" cap="flat" cmpd="sng">
+                    <a:solidFill>
+                      <a:srgbClr val="2B2F36">
+                        <a:alpha val="70000"/>
+                      </a:srgbClr>
+                    </a:solidFill>
+                    <a:prstDash val="solid"/>
+                    <a:round/>
+                  </a:ln>
+                </p:spPr>
+                <p:txBody>
+                  <a:bodyPr lIns="63500" tIns="63500" rIns="63500" bIns="63500" rtlCol="0" anchor="ctr">
+                    <a:noAutofit/>
+                  </a:bodyPr>
+                  <a:lstStyle/>
+                  <a:p>
+                    <a:pPr algn="ctr">
+                      <a:defRPr/>
+                    </a:pPr>
+                    <a:endParaRPr dirty="0"/>
+                  </a:p>
+                </p:txBody>
+              </p:sp>
+              <p:pic>
+                <p:nvPicPr>
+                  <p:cNvPr id="117" name="Picture 117"/>
+                  <p:cNvPicPr>
+                    <a:picLocks noChangeAspect="1"/>
+                  </p:cNvPicPr>
+                  <p:nvPr/>
+                </p:nvPicPr>
+                <p:blipFill>
+                  <a:blip r:embed="rId9"/>
+                  <a:stretch>
+                    <a:fillRect/>
+                  </a:stretch>
+                </p:blipFill>
+                <p:spPr>
+                  <a:xfrm>
+                    <a:off x="3146111" y="3432758"/>
+                    <a:ext cx="324396" cy="306400"/>
+                  </a:xfrm>
+                  <a:prstGeom prst="roundRect">
+                    <a:avLst>
+                      <a:gd name="adj" fmla="val 10768"/>
+                    </a:avLst>
+                  </a:prstGeom>
+                  <a:ln>
+                    <a:noFill/>
+                    <a:prstDash val="solid"/>
+                  </a:ln>
+                </p:spPr>
+              </p:pic>
+              <p:pic>
+                <p:nvPicPr>
+                  <p:cNvPr id="118" name="Picture 118"/>
+                  <p:cNvPicPr>
+                    <a:picLocks noChangeAspect="1"/>
+                  </p:cNvPicPr>
+                  <p:nvPr/>
+                </p:nvPicPr>
+                <p:blipFill>
+                  <a:blip r:embed="rId15"/>
+                  <a:stretch>
+                    <a:fillRect/>
+                  </a:stretch>
+                </p:blipFill>
+                <p:spPr>
+                  <a:xfrm>
+                    <a:off x="3010586" y="2923175"/>
+                    <a:ext cx="282023" cy="266378"/>
+                  </a:xfrm>
+                  <a:prstGeom prst="rect">
+                    <a:avLst/>
+                  </a:prstGeom>
+                  <a:ln>
+                    <a:noFill/>
+                    <a:prstDash val="solid"/>
+                  </a:ln>
+                </p:spPr>
+              </p:pic>
+              <p:sp>
+                <p:nvSpPr>
+                  <p:cNvPr id="119" name="AutoShape 119"/>
+                  <p:cNvSpPr/>
+                  <p:nvPr/>
+                </p:nvSpPr>
+                <p:spPr>
+                  <a:xfrm>
+                    <a:off x="3034896" y="3700515"/>
+                    <a:ext cx="1155700" cy="215900"/>
+                  </a:xfrm>
+                  <a:prstGeom prst="rect">
+                    <a:avLst/>
+                  </a:prstGeom>
+                  <a:noFill/>
+                  <a:ln w="12700">
+                    <a:noFill/>
+                    <a:prstDash val="solid"/>
+                  </a:ln>
+                </p:spPr>
+                <p:txBody>
+                  <a:bodyPr lIns="91440" tIns="45720" rIns="91440" bIns="45720" rtlCol="0" anchor="t">
+                    <a:noAutofit/>
+                  </a:bodyPr>
+                  <a:lstStyle/>
+                  <a:p>
+                    <a:pPr>
+                      <a:defRPr/>
+                    </a:pPr>
+                    <a:r>
+                      <a:rPr lang="en-US" sz="800" dirty="0"/>
+                      <a:t>Core C# Scripts</a:t>
+                    </a:r>
+                    <a:endParaRPr lang="en-US" sz="1100" dirty="0"/>
+                  </a:p>
+                </p:txBody>
+              </p:sp>
+              <p:sp>
+                <p:nvSpPr>
+                  <p:cNvPr id="120" name="AutoShape 120"/>
+                  <p:cNvSpPr/>
+                  <p:nvPr/>
+                </p:nvSpPr>
+                <p:spPr>
+                  <a:xfrm>
+                    <a:off x="3006362" y="3171118"/>
+                    <a:ext cx="923531" cy="215900"/>
+                  </a:xfrm>
+                  <a:prstGeom prst="rect">
+                    <a:avLst/>
+                  </a:prstGeom>
+                  <a:noFill/>
+                  <a:ln w="12700">
+                    <a:noFill/>
+                    <a:prstDash val="solid"/>
+                  </a:ln>
+                </p:spPr>
+                <p:txBody>
+                  <a:bodyPr lIns="91440" tIns="45720" rIns="91440" bIns="45720" rtlCol="0" anchor="t">
+                    <a:noAutofit/>
+                  </a:bodyPr>
+                  <a:lstStyle/>
+                  <a:p>
+                    <a:pPr>
+                      <a:defRPr/>
+                    </a:pPr>
+                    <a:r>
+                      <a:rPr lang="en-US" sz="800" dirty="0">
+                        <a:solidFill>
+                          <a:srgbClr val="1F2329"/>
+                        </a:solidFill>
+                        <a:latin typeface="Noto Sans SC"/>
+                        <a:ea typeface="Noto Sans SC"/>
+                        <a:cs typeface="Noto Sans SC"/>
+                        <a:sym typeface="Noto Sans SC"/>
+                      </a:rPr>
+                      <a:t>Plugins/Tools/.dll</a:t>
+                    </a:r>
+                    <a:endParaRPr lang="en-US" sz="1100" dirty="0"/>
+                  </a:p>
+                </p:txBody>
+              </p:sp>
+              <p:pic>
+                <p:nvPicPr>
+                  <p:cNvPr id="121" name="Picture 121"/>
+                  <p:cNvPicPr>
+                    <a:picLocks noChangeAspect="1"/>
+                  </p:cNvPicPr>
+                  <p:nvPr/>
+                </p:nvPicPr>
+                <p:blipFill>
+                  <a:blip r:embed="rId15"/>
+                  <a:stretch>
+                    <a:fillRect/>
+                  </a:stretch>
+                </p:blipFill>
+                <p:spPr>
+                  <a:xfrm>
+                    <a:off x="3316504" y="2928529"/>
+                    <a:ext cx="282023" cy="266378"/>
+                  </a:xfrm>
+                  <a:prstGeom prst="rect">
+                    <a:avLst/>
+                  </a:prstGeom>
+                  <a:ln>
+                    <a:noFill/>
+                    <a:prstDash val="solid"/>
+                  </a:ln>
+                </p:spPr>
+              </p:pic>
+              <p:pic>
+                <p:nvPicPr>
+                  <p:cNvPr id="122" name="Picture 122"/>
+                  <p:cNvPicPr>
+                    <a:picLocks noChangeAspect="1"/>
+                  </p:cNvPicPr>
+                  <p:nvPr/>
+                </p:nvPicPr>
+                <p:blipFill>
+                  <a:blip r:embed="rId15"/>
+                  <a:stretch>
+                    <a:fillRect/>
+                  </a:stretch>
+                </p:blipFill>
+                <p:spPr>
+                  <a:xfrm>
+                    <a:off x="3639851" y="2928529"/>
+                    <a:ext cx="282023" cy="266378"/>
+                  </a:xfrm>
+                  <a:prstGeom prst="rect">
+                    <a:avLst/>
+                  </a:prstGeom>
+                  <a:ln>
+                    <a:noFill/>
+                    <a:prstDash val="solid"/>
+                  </a:ln>
+                </p:spPr>
+              </p:pic>
+            </p:grpSp>
+            <p:pic>
+              <p:nvPicPr>
+                <p:cNvPr id="123" name="Picture 123"/>
+                <p:cNvPicPr>
+                  <a:picLocks noChangeAspect="1"/>
+                </p:cNvPicPr>
+                <p:nvPr/>
+              </p:nvPicPr>
+              <p:blipFill>
+                <a:blip r:embed="rId9"/>
+                <a:stretch>
+                  <a:fillRect/>
+                </a:stretch>
+              </p:blipFill>
+              <p:spPr>
+                <a:xfrm>
+                  <a:off x="3461944" y="3437514"/>
+                  <a:ext cx="324396" cy="306400"/>
+                </a:xfrm>
+                <a:prstGeom prst="roundRect">
+                  <a:avLst>
+                    <a:gd name="adj" fmla="val 10768"/>
+                  </a:avLst>
+                </a:prstGeom>
+                <a:ln>
+                  <a:noFill/>
+                  <a:prstDash val="solid"/>
+                </a:ln>
+              </p:spPr>
+            </p:pic>
+          </p:grpSp>
+          <p:sp>
+            <p:nvSpPr>
+              <p:cNvPr id="124" name="AutoShape 124"/>
+              <p:cNvSpPr/>
+              <p:nvPr/>
+            </p:nvSpPr>
+            <p:spPr>
+              <a:xfrm>
+                <a:off x="3076595" y="3890514"/>
+                <a:ext cx="1155700" cy="228600"/>
+              </a:xfrm>
+              <a:prstGeom prst="rect">
+                <a:avLst/>
+              </a:prstGeom>
+              <a:noFill/>
+              <a:ln w="12700">
+                <a:noFill/>
+                <a:prstDash val="solid"/>
+              </a:ln>
+            </p:spPr>
+            <p:txBody>
+              <a:bodyPr lIns="91440" tIns="45720" rIns="91440" bIns="45720" rtlCol="0" anchor="t">
+                <a:noAutofit/>
+              </a:bodyPr>
+              <a:lstStyle/>
+              <a:p>
+                <a:pPr>
+                  <a:defRPr/>
+                </a:pPr>
+                <a:r>
+                  <a:rPr lang="en-US" sz="900" dirty="0">
+                    <a:solidFill>
+                      <a:srgbClr val="1F2329"/>
+                    </a:solidFill>
+                    <a:latin typeface="Noto Sans SC"/>
+                    <a:ea typeface="Noto Sans SC"/>
+                    <a:cs typeface="Noto Sans SC"/>
+                    <a:sym typeface="Noto Sans SC"/>
+                  </a:rPr>
+                  <a:t>Original Code</a:t>
+                </a:r>
+                <a:endParaRPr lang="en-US" sz="1100" dirty="0"/>
+              </a:p>
+            </p:txBody>
+          </p:sp>
+        </p:grpSp>
+        <p:sp>
+          <p:nvSpPr>
+            <p:cNvPr id="130" name="AutoShape 130"/>
+            <p:cNvSpPr/>
+            <p:nvPr/>
+          </p:nvSpPr>
+          <p:spPr>
+            <a:xfrm rot="16200000">
+              <a:off x="4587167" y="2372666"/>
+              <a:ext cx="177109" cy="806095"/>
+            </a:xfrm>
+            <a:prstGeom prst="downArrow">
+              <a:avLst>
+                <a:gd name="adj1" fmla="val 50000"/>
+                <a:gd name="adj2" fmla="val 50000"/>
+              </a:avLst>
+            </a:prstGeom>
+            <a:ln w="6350"/>
+          </p:spPr>
+          <p:style>
+            <a:lnRef idx="1">
+              <a:schemeClr val="dk1"/>
+            </a:lnRef>
+            <a:fillRef idx="2">
+              <a:schemeClr val="dk1"/>
+            </a:fillRef>
+            <a:effectRef idx="1">
+              <a:schemeClr val="dk1"/>
+            </a:effectRef>
+            <a:fontRef idx="minor">
+              <a:schemeClr val="dk1"/>
+            </a:fontRef>
+          </p:style>
+          <p:txBody>
+            <a:bodyPr lIns="91440" tIns="45720" rIns="0" bIns="45720" rtlCol="0" anchor="ctr">
+              <a:noAutofit/>
+            </a:bodyPr>
+            <a:lstStyle/>
+            <a:p>
+              <a:pPr algn="ctr">
+                <a:defRPr/>
+              </a:pPr>
+              <a:endParaRPr dirty="0"/>
+            </a:p>
+          </p:txBody>
+        </p:sp>
+        <p:sp>
+          <p:nvSpPr>
+            <p:cNvPr id="32" name="AutoShape 94">
+              <a:extLst>
+                <a:ext uri="{FF2B5EF4-FFF2-40B4-BE49-F238E27FC236}">
+                  <a16:creationId xmlns:a16="http://schemas.microsoft.com/office/drawing/2014/main" id="{B7394011-2C04-1308-54A3-0E18E1C87A1B}"/>
+                </a:ext>
+              </a:extLst>
+            </p:cNvPr>
+            <p:cNvSpPr/>
+            <p:nvPr/>
+          </p:nvSpPr>
+          <p:spPr>
+            <a:xfrm>
+              <a:off x="2735873" y="1864080"/>
+              <a:ext cx="3722489" cy="1358054"/>
+            </a:xfrm>
+            <a:prstGeom prst="roundRect">
+              <a:avLst>
+                <a:gd name="adj" fmla="val 1335"/>
+              </a:avLst>
+            </a:prstGeom>
+            <a:noFill/>
+            <a:ln w="12700" cap="flat" cmpd="sng">
+              <a:solidFill>
+                <a:schemeClr val="tx1"/>
+              </a:solidFill>
+              <a:prstDash val="solid"/>
+              <a:round/>
+            </a:ln>
+          </p:spPr>
+          <p:txBody>
+            <a:bodyPr lIns="63500" tIns="63500" rIns="63500" bIns="63500" rtlCol="0" anchor="ctr">
+              <a:noAutofit/>
+            </a:bodyPr>
+            <a:lstStyle/>
+            <a:p>
+              <a:pPr algn="ctr">
+                <a:defRPr/>
+              </a:pPr>
+              <a:endParaRPr dirty="0"/>
+            </a:p>
+          </p:txBody>
+        </p:sp>
+      </p:grpSp>
+      <p:sp>
+        <p:nvSpPr>
+          <p:cNvPr id="26" name="AutoShape 26"/>
+          <p:cNvSpPr/>
+          <p:nvPr/>
+        </p:nvSpPr>
+        <p:spPr>
+          <a:xfrm>
+            <a:off x="381647" y="1523666"/>
+            <a:ext cx="1324096" cy="393700"/>
+          </a:xfrm>
+          <a:prstGeom prst="rect">
+            <a:avLst/>
+          </a:prstGeom>
+          <a:noFill/>
+          <a:ln w="12700">
+            <a:noFill/>
+            <a:prstDash val="solid"/>
+          </a:ln>
+        </p:spPr>
+        <p:txBody>
+          <a:bodyPr lIns="91440" tIns="45720" rIns="91440" bIns="45720" rtlCol="0" anchor="t">
+            <a:noAutofit/>
+          </a:bodyPr>
+          <a:lstStyle/>
+          <a:p>
+            <a:pPr algn="ctr">
+              <a:defRPr/>
+            </a:pPr>
+            <a:r>
+              <a:rPr lang="en-US" sz="800" dirty="0"/>
+              <a:t>Manifest Validation </a:t>
+            </a:r>
+          </a:p>
+          <a:p>
+            <a:pPr algn="ctr"/>
+            <a:r>
+              <a:rPr lang="en-US" sz="800" dirty="0"/>
+              <a:t>&amp; Manual Check</a:t>
+            </a:r>
+          </a:p>
+        </p:txBody>
+      </p:sp>
+      <p:sp>
+        <p:nvSpPr>
+          <p:cNvPr id="151" name="AutoShape 14">
+            <a:extLst>
+              <a:ext uri="{FF2B5EF4-FFF2-40B4-BE49-F238E27FC236}">
+                <a16:creationId xmlns:a16="http://schemas.microsoft.com/office/drawing/2014/main" id="{89C2273E-930C-30A8-E16A-F7FC10547CA0}"/>
+              </a:ext>
+            </a:extLst>
+          </p:cNvPr>
+          <p:cNvSpPr/>
+          <p:nvPr/>
+        </p:nvSpPr>
+        <p:spPr>
+          <a:xfrm>
+            <a:off x="1563503" y="1565632"/>
+            <a:ext cx="204600" cy="236351"/>
+          </a:xfrm>
+          <a:prstGeom prst="downArrow">
+            <a:avLst>
+              <a:gd name="adj1" fmla="val 50000"/>
+              <a:gd name="adj2" fmla="val 50000"/>
+            </a:avLst>
+          </a:prstGeom>
+          <a:ln/>
+        </p:spPr>
+        <p:style>
+          <a:lnRef idx="1">
+            <a:schemeClr val="dk1"/>
+          </a:lnRef>
+          <a:fillRef idx="2">
+            <a:schemeClr val="dk1"/>
+          </a:fillRef>
+          <a:effectRef idx="1">
+            <a:schemeClr val="dk1"/>
+          </a:effectRef>
+          <a:fontRef idx="minor">
+            <a:schemeClr val="dk1"/>
+          </a:fontRef>
+        </p:style>
+        <p:txBody>
+          <a:bodyPr lIns="91440" tIns="45720" rIns="35560" bIns="45720" rtlCol="0" anchor="ctr">
+            <a:noAutofit/>
+          </a:bodyPr>
+          <a:lstStyle/>
+          <a:p>
+            <a:pPr algn="ctr">
+              <a:defRPr/>
+            </a:pPr>
+            <a:endParaRPr/>
+          </a:p>
+        </p:txBody>
+      </p:sp>
     </p:spTree>
   </p:cSld>
   <p:clrMapOvr>

</xml_diff>

<commit_message>
upd: Size of overview fig
</commit_message>
<xml_diff>
--- a/Paper Reading/____Writing/Fig_Overview.pptx
+++ b/Paper Reading/____Writing/Fig_Overview.pptx
@@ -10,7 +10,7 @@
   <p:sldIdLst>
     <p:sldId id="256" r:id="rId2"/>
   </p:sldIdLst>
-  <p:sldSz cx="12384088" cy="7199313"/>
+  <p:sldSz cx="12312650" cy="6696075"/>
   <p:notesSz cx="6858000" cy="9144000"/>
   <p:defaultTextStyle>
     <a:defPPr marR="0" lvl="0" algn="l" rtl="0">
@@ -38,7 +38,7 @@
         <a:srgbClr val="000000"/>
       </a:buClr>
       <a:buFont typeface="Arial"/>
-      <a:defRPr sz="1329" b="0" i="0" u="none" strike="noStrike" cap="none">
+      <a:defRPr sz="1314" b="0" i="0" u="none" strike="noStrike" cap="none">
         <a:solidFill>
           <a:srgbClr val="000000"/>
         </a:solidFill>
@@ -62,7 +62,7 @@
         <a:srgbClr val="000000"/>
       </a:buClr>
       <a:buFont typeface="Arial"/>
-      <a:defRPr sz="1329" b="0" i="0" u="none" strike="noStrike" cap="none">
+      <a:defRPr sz="1314" b="0" i="0" u="none" strike="noStrike" cap="none">
         <a:solidFill>
           <a:srgbClr val="000000"/>
         </a:solidFill>
@@ -86,7 +86,7 @@
         <a:srgbClr val="000000"/>
       </a:buClr>
       <a:buFont typeface="Arial"/>
-      <a:defRPr sz="1329" b="0" i="0" u="none" strike="noStrike" cap="none">
+      <a:defRPr sz="1314" b="0" i="0" u="none" strike="noStrike" cap="none">
         <a:solidFill>
           <a:srgbClr val="000000"/>
         </a:solidFill>
@@ -110,7 +110,7 @@
         <a:srgbClr val="000000"/>
       </a:buClr>
       <a:buFont typeface="Arial"/>
-      <a:defRPr sz="1329" b="0" i="0" u="none" strike="noStrike" cap="none">
+      <a:defRPr sz="1314" b="0" i="0" u="none" strike="noStrike" cap="none">
         <a:solidFill>
           <a:srgbClr val="000000"/>
         </a:solidFill>
@@ -134,7 +134,7 @@
         <a:srgbClr val="000000"/>
       </a:buClr>
       <a:buFont typeface="Arial"/>
-      <a:defRPr sz="1329" b="0" i="0" u="none" strike="noStrike" cap="none">
+      <a:defRPr sz="1314" b="0" i="0" u="none" strike="noStrike" cap="none">
         <a:solidFill>
           <a:srgbClr val="000000"/>
         </a:solidFill>
@@ -158,7 +158,7 @@
         <a:srgbClr val="000000"/>
       </a:buClr>
       <a:buFont typeface="Arial"/>
-      <a:defRPr sz="1329" b="0" i="0" u="none" strike="noStrike" cap="none">
+      <a:defRPr sz="1314" b="0" i="0" u="none" strike="noStrike" cap="none">
         <a:solidFill>
           <a:srgbClr val="000000"/>
         </a:solidFill>
@@ -182,7 +182,7 @@
         <a:srgbClr val="000000"/>
       </a:buClr>
       <a:buFont typeface="Arial"/>
-      <a:defRPr sz="1329" b="0" i="0" u="none" strike="noStrike" cap="none">
+      <a:defRPr sz="1314" b="0" i="0" u="none" strike="noStrike" cap="none">
         <a:solidFill>
           <a:srgbClr val="000000"/>
         </a:solidFill>
@@ -206,7 +206,7 @@
         <a:srgbClr val="000000"/>
       </a:buClr>
       <a:buFont typeface="Arial"/>
-      <a:defRPr sz="1329" b="0" i="0" u="none" strike="noStrike" cap="none">
+      <a:defRPr sz="1314" b="0" i="0" u="none" strike="noStrike" cap="none">
         <a:solidFill>
           <a:srgbClr val="000000"/>
         </a:solidFill>
@@ -230,7 +230,7 @@
         <a:srgbClr val="000000"/>
       </a:buClr>
       <a:buFont typeface="Arial"/>
-      <a:defRPr sz="1329" b="0" i="0" u="none" strike="noStrike" cap="none">
+      <a:defRPr sz="1314" b="0" i="0" u="none" strike="noStrike" cap="none">
         <a:solidFill>
           <a:srgbClr val="000000"/>
         </a:solidFill>
@@ -244,12 +244,12 @@
   <p:extLst>
     <p:ext uri="{EFAFB233-063F-42B5-8137-9DF3F51BA10A}">
       <p15:sldGuideLst xmlns:p15="http://schemas.microsoft.com/office/powerpoint/2012/main">
-        <p15:guide id="1" orient="horz" pos="1312" userDrawn="1">
+        <p15:guide id="1" orient="horz" pos="1221" userDrawn="1">
           <p15:clr>
             <a:srgbClr val="747775"/>
           </p15:clr>
         </p15:guide>
-        <p15:guide id="2" pos="2925" userDrawn="1">
+        <p15:guide id="2" pos="2908" userDrawn="1">
           <p15:clr>
             <a:srgbClr val="747775"/>
           </p15:clr>
@@ -360,8 +360,8 @@
         </p:nvSpPr>
         <p:spPr>
           <a:xfrm>
-            <a:off x="2365375" y="512763"/>
-            <a:ext cx="4413250" cy="2566987"/>
+            <a:off x="2212975" y="512763"/>
+            <a:ext cx="4718050" cy="2566987"/>
           </a:xfrm>
           <a:prstGeom prst="rect">
             <a:avLst/>
@@ -516,8 +516,8 @@
   </p:cSld>
   <p:clrMap bg1="lt1" tx1="dk1" bg2="lt2" tx2="dk2" accent1="accent1" accent2="accent2" accent3="accent3" accent4="accent4" accent5="accent5" accent6="accent6" hlink="hlink" folHlink="folHlink"/>
   <p:notesStyle>
-    <a:lvl1pPr marL="0" algn="l" defTabSz="868131" rtl="0" eaLnBrk="1" latinLnBrk="0" hangingPunct="1">
-      <a:defRPr sz="1139" kern="1200">
+    <a:lvl1pPr marL="0" algn="l" defTabSz="858321" rtl="0" eaLnBrk="1" latinLnBrk="0" hangingPunct="1">
+      <a:defRPr sz="1126" kern="1200">
         <a:solidFill>
           <a:schemeClr val="tx1"/>
         </a:solidFill>
@@ -526,8 +526,8 @@
         <a:cs typeface="+mn-cs"/>
       </a:defRPr>
     </a:lvl1pPr>
-    <a:lvl2pPr marL="434066" algn="l" defTabSz="868131" rtl="0" eaLnBrk="1" latinLnBrk="0" hangingPunct="1">
-      <a:defRPr sz="1139" kern="1200">
+    <a:lvl2pPr marL="429161" algn="l" defTabSz="858321" rtl="0" eaLnBrk="1" latinLnBrk="0" hangingPunct="1">
+      <a:defRPr sz="1126" kern="1200">
         <a:solidFill>
           <a:schemeClr val="tx1"/>
         </a:solidFill>
@@ -536,8 +536,8 @@
         <a:cs typeface="+mn-cs"/>
       </a:defRPr>
     </a:lvl2pPr>
-    <a:lvl3pPr marL="868131" algn="l" defTabSz="868131" rtl="0" eaLnBrk="1" latinLnBrk="0" hangingPunct="1">
-      <a:defRPr sz="1139" kern="1200">
+    <a:lvl3pPr marL="858321" algn="l" defTabSz="858321" rtl="0" eaLnBrk="1" latinLnBrk="0" hangingPunct="1">
+      <a:defRPr sz="1126" kern="1200">
         <a:solidFill>
           <a:schemeClr val="tx1"/>
         </a:solidFill>
@@ -546,8 +546,8 @@
         <a:cs typeface="+mn-cs"/>
       </a:defRPr>
     </a:lvl3pPr>
-    <a:lvl4pPr marL="1302197" algn="l" defTabSz="868131" rtl="0" eaLnBrk="1" latinLnBrk="0" hangingPunct="1">
-      <a:defRPr sz="1139" kern="1200">
+    <a:lvl4pPr marL="1287482" algn="l" defTabSz="858321" rtl="0" eaLnBrk="1" latinLnBrk="0" hangingPunct="1">
+      <a:defRPr sz="1126" kern="1200">
         <a:solidFill>
           <a:schemeClr val="tx1"/>
         </a:solidFill>
@@ -556,8 +556,8 @@
         <a:cs typeface="+mn-cs"/>
       </a:defRPr>
     </a:lvl4pPr>
-    <a:lvl5pPr marL="1736263" algn="l" defTabSz="868131" rtl="0" eaLnBrk="1" latinLnBrk="0" hangingPunct="1">
-      <a:defRPr sz="1139" kern="1200">
+    <a:lvl5pPr marL="1716643" algn="l" defTabSz="858321" rtl="0" eaLnBrk="1" latinLnBrk="0" hangingPunct="1">
+      <a:defRPr sz="1126" kern="1200">
         <a:solidFill>
           <a:schemeClr val="tx1"/>
         </a:solidFill>
@@ -566,8 +566,8 @@
         <a:cs typeface="+mn-cs"/>
       </a:defRPr>
     </a:lvl5pPr>
-    <a:lvl6pPr marL="2170328" algn="l" defTabSz="868131" rtl="0" eaLnBrk="1" latinLnBrk="0" hangingPunct="1">
-      <a:defRPr sz="1139" kern="1200">
+    <a:lvl6pPr marL="2145803" algn="l" defTabSz="858321" rtl="0" eaLnBrk="1" latinLnBrk="0" hangingPunct="1">
+      <a:defRPr sz="1126" kern="1200">
         <a:solidFill>
           <a:schemeClr val="tx1"/>
         </a:solidFill>
@@ -576,8 +576,8 @@
         <a:cs typeface="+mn-cs"/>
       </a:defRPr>
     </a:lvl6pPr>
-    <a:lvl7pPr marL="2604394" algn="l" defTabSz="868131" rtl="0" eaLnBrk="1" latinLnBrk="0" hangingPunct="1">
-      <a:defRPr sz="1139" kern="1200">
+    <a:lvl7pPr marL="2574964" algn="l" defTabSz="858321" rtl="0" eaLnBrk="1" latinLnBrk="0" hangingPunct="1">
+      <a:defRPr sz="1126" kern="1200">
         <a:solidFill>
           <a:schemeClr val="tx1"/>
         </a:solidFill>
@@ -586,8 +586,8 @@
         <a:cs typeface="+mn-cs"/>
       </a:defRPr>
     </a:lvl7pPr>
-    <a:lvl8pPr marL="3038460" algn="l" defTabSz="868131" rtl="0" eaLnBrk="1" latinLnBrk="0" hangingPunct="1">
-      <a:defRPr sz="1139" kern="1200">
+    <a:lvl8pPr marL="3004125" algn="l" defTabSz="858321" rtl="0" eaLnBrk="1" latinLnBrk="0" hangingPunct="1">
+      <a:defRPr sz="1126" kern="1200">
         <a:solidFill>
           <a:schemeClr val="tx1"/>
         </a:solidFill>
@@ -596,8 +596,8 @@
         <a:cs typeface="+mn-cs"/>
       </a:defRPr>
     </a:lvl8pPr>
-    <a:lvl9pPr marL="3472525" algn="l" defTabSz="868131" rtl="0" eaLnBrk="1" latinLnBrk="0" hangingPunct="1">
-      <a:defRPr sz="1139" kern="1200">
+    <a:lvl9pPr marL="3433285" algn="l" defTabSz="858321" rtl="0" eaLnBrk="1" latinLnBrk="0" hangingPunct="1">
+      <a:defRPr sz="1126" kern="1200">
         <a:solidFill>
           <a:schemeClr val="tx1"/>
         </a:solidFill>
@@ -704,8 +704,8 @@
         </p:nvSpPr>
         <p:spPr>
           <a:xfrm>
-            <a:off x="2365375" y="512763"/>
-            <a:ext cx="4413250" cy="2566987"/>
+            <a:off x="2212975" y="512763"/>
+            <a:ext cx="4718050" cy="2566987"/>
           </a:xfrm>
           <a:prstGeom prst="rect">
             <a:avLst/>
@@ -888,8 +888,8 @@
         </p:nvSpPr>
         <p:spPr>
           <a:xfrm>
-            <a:off x="1161009" y="681685"/>
-            <a:ext cx="6966049" cy="1450148"/>
+            <a:off x="1154317" y="634035"/>
+            <a:ext cx="6925865" cy="1348781"/>
           </a:xfrm>
           <a:prstGeom prst="rect">
             <a:avLst/>
@@ -1028,8 +1028,8 @@
         </p:nvSpPr>
         <p:spPr>
           <a:xfrm>
-            <a:off x="1161009" y="2187758"/>
-            <a:ext cx="6966049" cy="1005654"/>
+            <a:off x="1154317" y="2034833"/>
+            <a:ext cx="6925865" cy="935358"/>
           </a:xfrm>
           <a:prstGeom prst="rect">
             <a:avLst/>
@@ -1066,7 +1066,7 @@
                 <a:spcPct val="90000"/>
               </a:lnSpc>
               <a:spcBef>
-                <a:spcPts val="400"/>
+                <a:spcPts val="399"/>
               </a:spcBef>
               <a:spcAft>
                 <a:spcPts val="0"/>
@@ -1083,7 +1083,7 @@
                 <a:spcPct val="90000"/>
               </a:lnSpc>
               <a:spcBef>
-                <a:spcPts val="400"/>
+                <a:spcPts val="399"/>
               </a:spcBef>
               <a:spcAft>
                 <a:spcPts val="0"/>
@@ -1100,7 +1100,7 @@
                 <a:spcPct val="90000"/>
               </a:lnSpc>
               <a:spcBef>
-                <a:spcPts val="400"/>
+                <a:spcPts val="399"/>
               </a:spcBef>
               <a:spcAft>
                 <a:spcPts val="0"/>
@@ -1117,7 +1117,7 @@
                 <a:spcPct val="90000"/>
               </a:lnSpc>
               <a:spcBef>
-                <a:spcPts val="400"/>
+                <a:spcPts val="399"/>
               </a:spcBef>
               <a:spcAft>
                 <a:spcPts val="0"/>
@@ -1134,7 +1134,7 @@
                 <a:spcPct val="90000"/>
               </a:lnSpc>
               <a:spcBef>
-                <a:spcPts val="400"/>
+                <a:spcPts val="399"/>
               </a:spcBef>
               <a:spcAft>
                 <a:spcPts val="0"/>
@@ -1151,7 +1151,7 @@
                 <a:spcPct val="90000"/>
               </a:lnSpc>
               <a:spcBef>
-                <a:spcPts val="400"/>
+                <a:spcPts val="399"/>
               </a:spcBef>
               <a:spcAft>
                 <a:spcPts val="0"/>
@@ -1168,7 +1168,7 @@
                 <a:spcPct val="90000"/>
               </a:lnSpc>
               <a:spcBef>
-                <a:spcPts val="400"/>
+                <a:spcPts val="399"/>
               </a:spcBef>
               <a:spcAft>
                 <a:spcPts val="0"/>
@@ -1185,7 +1185,7 @@
                 <a:spcPct val="90000"/>
               </a:lnSpc>
               <a:spcBef>
-                <a:spcPts val="400"/>
+                <a:spcPts val="399"/>
               </a:spcBef>
               <a:spcAft>
                 <a:spcPts val="0"/>
@@ -1215,8 +1215,8 @@
         </p:nvSpPr>
         <p:spPr>
           <a:xfrm>
-            <a:off x="638556" y="3860633"/>
-            <a:ext cx="2089814" cy="221764"/>
+            <a:off x="634872" y="3590772"/>
+            <a:ext cx="2077759" cy="206262"/>
           </a:xfrm>
           <a:prstGeom prst="rect">
             <a:avLst/>
@@ -1348,8 +1348,8 @@
         </p:nvSpPr>
         <p:spPr>
           <a:xfrm>
-            <a:off x="3076673" y="3860633"/>
-            <a:ext cx="3134722" cy="221764"/>
+            <a:off x="3058925" y="3590772"/>
+            <a:ext cx="3116639" cy="206262"/>
           </a:xfrm>
           <a:prstGeom prst="rect">
             <a:avLst/>
@@ -1481,8 +1481,8 @@
         </p:nvSpPr>
         <p:spPr>
           <a:xfrm>
-            <a:off x="6559697" y="3860633"/>
-            <a:ext cx="2089814" cy="221764"/>
+            <a:off x="6521857" y="3590772"/>
+            <a:ext cx="2077759" cy="206262"/>
           </a:xfrm>
           <a:prstGeom prst="rect">
             <a:avLst/>
@@ -1608,8 +1608,8 @@
         </p:nvSpPr>
         <p:spPr>
           <a:xfrm>
-            <a:off x="638555" y="221764"/>
-            <a:ext cx="8010957" cy="805102"/>
+            <a:off x="634877" y="206263"/>
+            <a:ext cx="7964746" cy="748825"/>
           </a:xfrm>
           <a:prstGeom prst="rect">
             <a:avLst/>
@@ -1747,8 +1747,8 @@
         </p:nvSpPr>
         <p:spPr>
           <a:xfrm rot="5400000">
-            <a:off x="3322607" y="-1575228"/>
-            <a:ext cx="2642855" cy="8010957"/>
+            <a:off x="3388191" y="-1721997"/>
+            <a:ext cx="2458117" cy="7964746"/>
           </a:xfrm>
           <a:prstGeom prst="rect">
             <a:avLst/>
@@ -1763,7 +1763,7 @@
             <a:normAutofit/>
           </a:bodyPr>
           <a:lstStyle>
-            <a:lvl1pPr marL="457192" lvl="0" indent="-317494" algn="l">
+            <a:lvl1pPr marL="457220" lvl="0" indent="-317514" algn="l">
               <a:lnSpc>
                 <a:spcPct val="90000"/>
               </a:lnSpc>
@@ -1780,12 +1780,12 @@
               <a:buChar char="•"/>
               <a:defRPr/>
             </a:lvl1pPr>
-            <a:lvl2pPr marL="914383" lvl="1" indent="-317494" algn="l">
+            <a:lvl2pPr marL="914439" lvl="1" indent="-317514" algn="l">
               <a:lnSpc>
                 <a:spcPct val="90000"/>
               </a:lnSpc>
               <a:spcBef>
-                <a:spcPts val="400"/>
+                <a:spcPts val="399"/>
               </a:spcBef>
               <a:spcAft>
                 <a:spcPts val="0"/>
@@ -1797,12 +1797,12 @@
               <a:buChar char="•"/>
               <a:defRPr/>
             </a:lvl2pPr>
-            <a:lvl3pPr marL="1371576" lvl="2" indent="-317494" algn="l">
+            <a:lvl3pPr marL="1371660" lvl="2" indent="-317514" algn="l">
               <a:lnSpc>
                 <a:spcPct val="90000"/>
               </a:lnSpc>
               <a:spcBef>
-                <a:spcPts val="400"/>
+                <a:spcPts val="399"/>
               </a:spcBef>
               <a:spcAft>
                 <a:spcPts val="0"/>
@@ -1814,12 +1814,12 @@
               <a:buChar char="•"/>
               <a:defRPr/>
             </a:lvl3pPr>
-            <a:lvl4pPr marL="1828768" lvl="3" indent="-317494" algn="l">
+            <a:lvl4pPr marL="1828881" lvl="3" indent="-317514" algn="l">
               <a:lnSpc>
                 <a:spcPct val="90000"/>
               </a:lnSpc>
               <a:spcBef>
-                <a:spcPts val="400"/>
+                <a:spcPts val="399"/>
               </a:spcBef>
               <a:spcAft>
                 <a:spcPts val="0"/>
@@ -1831,12 +1831,12 @@
               <a:buChar char="•"/>
               <a:defRPr/>
             </a:lvl4pPr>
-            <a:lvl5pPr marL="2285959" lvl="4" indent="-317494" algn="l">
+            <a:lvl5pPr marL="2286100" lvl="4" indent="-317514" algn="l">
               <a:lnSpc>
                 <a:spcPct val="90000"/>
               </a:lnSpc>
               <a:spcBef>
-                <a:spcPts val="400"/>
+                <a:spcPts val="399"/>
               </a:spcBef>
               <a:spcAft>
                 <a:spcPts val="0"/>
@@ -1848,12 +1848,12 @@
               <a:buChar char="•"/>
               <a:defRPr/>
             </a:lvl5pPr>
-            <a:lvl6pPr marL="2743151" lvl="5" indent="-317494" algn="l">
+            <a:lvl6pPr marL="2743320" lvl="5" indent="-317514" algn="l">
               <a:lnSpc>
                 <a:spcPct val="90000"/>
               </a:lnSpc>
               <a:spcBef>
-                <a:spcPts val="400"/>
+                <a:spcPts val="399"/>
               </a:spcBef>
               <a:spcAft>
                 <a:spcPts val="0"/>
@@ -1865,12 +1865,12 @@
               <a:buChar char="•"/>
               <a:defRPr/>
             </a:lvl6pPr>
-            <a:lvl7pPr marL="3200344" lvl="6" indent="-317494" algn="l">
+            <a:lvl7pPr marL="3200541" lvl="6" indent="-317514" algn="l">
               <a:lnSpc>
                 <a:spcPct val="90000"/>
               </a:lnSpc>
               <a:spcBef>
-                <a:spcPts val="400"/>
+                <a:spcPts val="399"/>
               </a:spcBef>
               <a:spcAft>
                 <a:spcPts val="0"/>
@@ -1882,12 +1882,12 @@
               <a:buChar char="•"/>
               <a:defRPr/>
             </a:lvl7pPr>
-            <a:lvl8pPr marL="3657535" lvl="7" indent="-317494" algn="l">
+            <a:lvl8pPr marL="3657761" lvl="7" indent="-317514" algn="l">
               <a:lnSpc>
                 <a:spcPct val="90000"/>
               </a:lnSpc>
               <a:spcBef>
-                <a:spcPts val="400"/>
+                <a:spcPts val="399"/>
               </a:spcBef>
               <a:spcAft>
                 <a:spcPts val="0"/>
@@ -1899,12 +1899,12 @@
               <a:buChar char="•"/>
               <a:defRPr/>
             </a:lvl8pPr>
-            <a:lvl9pPr marL="4114727" lvl="8" indent="-317494" algn="l">
+            <a:lvl9pPr marL="4114981" lvl="8" indent="-317514" algn="l">
               <a:lnSpc>
                 <a:spcPct val="90000"/>
               </a:lnSpc>
               <a:spcBef>
-                <a:spcPts val="400"/>
+                <a:spcPts val="399"/>
               </a:spcBef>
               <a:spcAft>
                 <a:spcPts val="0"/>
@@ -1934,8 +1934,8 @@
         </p:nvSpPr>
         <p:spPr>
           <a:xfrm>
-            <a:off x="638556" y="3860633"/>
-            <a:ext cx="2089814" cy="221764"/>
+            <a:off x="634872" y="3590772"/>
+            <a:ext cx="2077759" cy="206262"/>
           </a:xfrm>
           <a:prstGeom prst="rect">
             <a:avLst/>
@@ -2067,8 +2067,8 @@
         </p:nvSpPr>
         <p:spPr>
           <a:xfrm>
-            <a:off x="3076673" y="3860633"/>
-            <a:ext cx="3134722" cy="221764"/>
+            <a:off x="3058925" y="3590772"/>
+            <a:ext cx="3116639" cy="206262"/>
           </a:xfrm>
           <a:prstGeom prst="rect">
             <a:avLst/>
@@ -2200,8 +2200,8 @@
         </p:nvSpPr>
         <p:spPr>
           <a:xfrm>
-            <a:off x="6559697" y="3860633"/>
-            <a:ext cx="2089814" cy="221764"/>
+            <a:off x="6521857" y="3590772"/>
+            <a:ext cx="2077759" cy="206262"/>
           </a:xfrm>
           <a:prstGeom prst="rect">
             <a:avLst/>
@@ -2327,8 +2327,8 @@
         </p:nvSpPr>
         <p:spPr>
           <a:xfrm rot="5400000">
-            <a:off x="5883186" y="985354"/>
-            <a:ext cx="3529914" cy="2002739"/>
+            <a:off x="5962439" y="852263"/>
+            <a:ext cx="3283170" cy="1991186"/>
           </a:xfrm>
           <a:prstGeom prst="rect">
             <a:avLst/>
@@ -2466,8 +2466,8 @@
         </p:nvSpPr>
         <p:spPr>
           <a:xfrm rot="5400000">
-            <a:off x="1819659" y="-959336"/>
-            <a:ext cx="3529914" cy="5892116"/>
+            <a:off x="1922353" y="-1081215"/>
+            <a:ext cx="3283170" cy="5858127"/>
           </a:xfrm>
           <a:prstGeom prst="rect">
             <a:avLst/>
@@ -2482,7 +2482,7 @@
             <a:normAutofit/>
           </a:bodyPr>
           <a:lstStyle>
-            <a:lvl1pPr marL="457192" lvl="0" indent="-317494" algn="l">
+            <a:lvl1pPr marL="457220" lvl="0" indent="-317514" algn="l">
               <a:lnSpc>
                 <a:spcPct val="90000"/>
               </a:lnSpc>
@@ -2499,12 +2499,12 @@
               <a:buChar char="•"/>
               <a:defRPr/>
             </a:lvl1pPr>
-            <a:lvl2pPr marL="914383" lvl="1" indent="-317494" algn="l">
+            <a:lvl2pPr marL="914439" lvl="1" indent="-317514" algn="l">
               <a:lnSpc>
                 <a:spcPct val="90000"/>
               </a:lnSpc>
               <a:spcBef>
-                <a:spcPts val="400"/>
+                <a:spcPts val="399"/>
               </a:spcBef>
               <a:spcAft>
                 <a:spcPts val="0"/>
@@ -2516,12 +2516,12 @@
               <a:buChar char="•"/>
               <a:defRPr/>
             </a:lvl2pPr>
-            <a:lvl3pPr marL="1371576" lvl="2" indent="-317494" algn="l">
+            <a:lvl3pPr marL="1371660" lvl="2" indent="-317514" algn="l">
               <a:lnSpc>
                 <a:spcPct val="90000"/>
               </a:lnSpc>
               <a:spcBef>
-                <a:spcPts val="400"/>
+                <a:spcPts val="399"/>
               </a:spcBef>
               <a:spcAft>
                 <a:spcPts val="0"/>
@@ -2533,12 +2533,12 @@
               <a:buChar char="•"/>
               <a:defRPr/>
             </a:lvl3pPr>
-            <a:lvl4pPr marL="1828768" lvl="3" indent="-317494" algn="l">
+            <a:lvl4pPr marL="1828881" lvl="3" indent="-317514" algn="l">
               <a:lnSpc>
                 <a:spcPct val="90000"/>
               </a:lnSpc>
               <a:spcBef>
-                <a:spcPts val="400"/>
+                <a:spcPts val="399"/>
               </a:spcBef>
               <a:spcAft>
                 <a:spcPts val="0"/>
@@ -2550,12 +2550,12 @@
               <a:buChar char="•"/>
               <a:defRPr/>
             </a:lvl4pPr>
-            <a:lvl5pPr marL="2285959" lvl="4" indent="-317494" algn="l">
+            <a:lvl5pPr marL="2286100" lvl="4" indent="-317514" algn="l">
               <a:lnSpc>
                 <a:spcPct val="90000"/>
               </a:lnSpc>
               <a:spcBef>
-                <a:spcPts val="400"/>
+                <a:spcPts val="399"/>
               </a:spcBef>
               <a:spcAft>
                 <a:spcPts val="0"/>
@@ -2567,12 +2567,12 @@
               <a:buChar char="•"/>
               <a:defRPr/>
             </a:lvl5pPr>
-            <a:lvl6pPr marL="2743151" lvl="5" indent="-317494" algn="l">
+            <a:lvl6pPr marL="2743320" lvl="5" indent="-317514" algn="l">
               <a:lnSpc>
                 <a:spcPct val="90000"/>
               </a:lnSpc>
               <a:spcBef>
-                <a:spcPts val="400"/>
+                <a:spcPts val="399"/>
               </a:spcBef>
               <a:spcAft>
                 <a:spcPts val="0"/>
@@ -2584,12 +2584,12 @@
               <a:buChar char="•"/>
               <a:defRPr/>
             </a:lvl6pPr>
-            <a:lvl7pPr marL="3200344" lvl="6" indent="-317494" algn="l">
+            <a:lvl7pPr marL="3200541" lvl="6" indent="-317514" algn="l">
               <a:lnSpc>
                 <a:spcPct val="90000"/>
               </a:lnSpc>
               <a:spcBef>
-                <a:spcPts val="400"/>
+                <a:spcPts val="399"/>
               </a:spcBef>
               <a:spcAft>
                 <a:spcPts val="0"/>
@@ -2601,12 +2601,12 @@
               <a:buChar char="•"/>
               <a:defRPr/>
             </a:lvl7pPr>
-            <a:lvl8pPr marL="3657535" lvl="7" indent="-317494" algn="l">
+            <a:lvl8pPr marL="3657761" lvl="7" indent="-317514" algn="l">
               <a:lnSpc>
                 <a:spcPct val="90000"/>
               </a:lnSpc>
               <a:spcBef>
-                <a:spcPts val="400"/>
+                <a:spcPts val="399"/>
               </a:spcBef>
               <a:spcAft>
                 <a:spcPts val="0"/>
@@ -2618,12 +2618,12 @@
               <a:buChar char="•"/>
               <a:defRPr/>
             </a:lvl8pPr>
-            <a:lvl9pPr marL="4114727" lvl="8" indent="-317494" algn="l">
+            <a:lvl9pPr marL="4114981" lvl="8" indent="-317514" algn="l">
               <a:lnSpc>
                 <a:spcPct val="90000"/>
               </a:lnSpc>
               <a:spcBef>
-                <a:spcPts val="400"/>
+                <a:spcPts val="399"/>
               </a:spcBef>
               <a:spcAft>
                 <a:spcPts val="0"/>
@@ -2653,8 +2653,8 @@
         </p:nvSpPr>
         <p:spPr>
           <a:xfrm>
-            <a:off x="638556" y="3860633"/>
-            <a:ext cx="2089814" cy="221764"/>
+            <a:off x="634872" y="3590772"/>
+            <a:ext cx="2077759" cy="206262"/>
           </a:xfrm>
           <a:prstGeom prst="rect">
             <a:avLst/>
@@ -2786,8 +2786,8 @@
         </p:nvSpPr>
         <p:spPr>
           <a:xfrm>
-            <a:off x="3076673" y="3860633"/>
-            <a:ext cx="3134722" cy="221764"/>
+            <a:off x="3058925" y="3590772"/>
+            <a:ext cx="3116639" cy="206262"/>
           </a:xfrm>
           <a:prstGeom prst="rect">
             <a:avLst/>
@@ -2919,8 +2919,8 @@
         </p:nvSpPr>
         <p:spPr>
           <a:xfrm>
-            <a:off x="6559697" y="3860633"/>
-            <a:ext cx="2089814" cy="221764"/>
+            <a:off x="6521857" y="3590772"/>
+            <a:ext cx="2077759" cy="206262"/>
           </a:xfrm>
           <a:prstGeom prst="rect">
             <a:avLst/>
@@ -3046,8 +3046,8 @@
         </p:nvSpPr>
         <p:spPr>
           <a:xfrm>
-            <a:off x="1217691" y="1563280"/>
-            <a:ext cx="9953588" cy="2081565"/>
+            <a:off x="1210667" y="1454012"/>
+            <a:ext cx="9896170" cy="1936062"/>
           </a:xfrm>
           <a:prstGeom prst="rect">
             <a:avLst/>
@@ -3110,8 +3110,8 @@
         </p:nvSpPr>
         <p:spPr>
           <a:xfrm>
-            <a:off x="1217691" y="3706067"/>
-            <a:ext cx="9953588" cy="1192382"/>
+            <a:off x="1210667" y="3447010"/>
+            <a:ext cx="9896170" cy="1109033"/>
           </a:xfrm>
           <a:prstGeom prst="rect">
             <a:avLst/>
@@ -3174,8 +3174,8 @@
         </p:nvSpPr>
         <p:spPr>
           <a:xfrm>
-            <a:off x="621641" y="5936316"/>
-            <a:ext cx="2742540" cy="195410"/>
+            <a:off x="618055" y="5521364"/>
+            <a:ext cx="2726720" cy="181750"/>
           </a:xfrm>
           <a:prstGeom prst="rect">
             <a:avLst/>
@@ -3238,8 +3238,8 @@
         </p:nvSpPr>
         <p:spPr>
           <a:xfrm>
-            <a:off x="4180852" y="5936316"/>
-            <a:ext cx="4022391" cy="195410"/>
+            <a:off x="4156738" y="5521364"/>
+            <a:ext cx="3999188" cy="181750"/>
           </a:xfrm>
           <a:prstGeom prst="rect">
             <a:avLst/>
@@ -3302,8 +3302,8 @@
         </p:nvSpPr>
         <p:spPr>
           <a:xfrm>
-            <a:off x="9017468" y="5936316"/>
-            <a:ext cx="2742540" cy="195410"/>
+            <a:off x="8965452" y="5521364"/>
+            <a:ext cx="2726720" cy="181750"/>
           </a:xfrm>
           <a:prstGeom prst="rect">
             <a:avLst/>
@@ -3396,8 +3396,8 @@
         </p:nvSpPr>
         <p:spPr>
           <a:xfrm>
-            <a:off x="638555" y="221764"/>
-            <a:ext cx="8010957" cy="805102"/>
+            <a:off x="634877" y="206263"/>
+            <a:ext cx="7964746" cy="748825"/>
           </a:xfrm>
           <a:prstGeom prst="rect">
             <a:avLst/>
@@ -3535,8 +3535,8 @@
         </p:nvSpPr>
         <p:spPr>
           <a:xfrm>
-            <a:off x="638555" y="1108824"/>
-            <a:ext cx="8010957" cy="2642855"/>
+            <a:off x="634877" y="1031322"/>
+            <a:ext cx="7964746" cy="2458117"/>
           </a:xfrm>
           <a:prstGeom prst="rect">
             <a:avLst/>
@@ -3551,7 +3551,7 @@
             <a:normAutofit/>
           </a:bodyPr>
           <a:lstStyle>
-            <a:lvl1pPr marL="457192" lvl="0" indent="-317494" algn="l">
+            <a:lvl1pPr marL="457220" lvl="0" indent="-317514" algn="l">
               <a:lnSpc>
                 <a:spcPct val="90000"/>
               </a:lnSpc>
@@ -3568,12 +3568,12 @@
               <a:buChar char="•"/>
               <a:defRPr/>
             </a:lvl1pPr>
-            <a:lvl2pPr marL="914383" lvl="1" indent="-317494" algn="l">
+            <a:lvl2pPr marL="914439" lvl="1" indent="-317514" algn="l">
               <a:lnSpc>
                 <a:spcPct val="90000"/>
               </a:lnSpc>
               <a:spcBef>
-                <a:spcPts val="400"/>
+                <a:spcPts val="399"/>
               </a:spcBef>
               <a:spcAft>
                 <a:spcPts val="0"/>
@@ -3585,12 +3585,12 @@
               <a:buChar char="•"/>
               <a:defRPr/>
             </a:lvl2pPr>
-            <a:lvl3pPr marL="1371576" lvl="2" indent="-317494" algn="l">
+            <a:lvl3pPr marL="1371660" lvl="2" indent="-317514" algn="l">
               <a:lnSpc>
                 <a:spcPct val="90000"/>
               </a:lnSpc>
               <a:spcBef>
-                <a:spcPts val="400"/>
+                <a:spcPts val="399"/>
               </a:spcBef>
               <a:spcAft>
                 <a:spcPts val="0"/>
@@ -3602,12 +3602,12 @@
               <a:buChar char="•"/>
               <a:defRPr/>
             </a:lvl3pPr>
-            <a:lvl4pPr marL="1828768" lvl="3" indent="-317494" algn="l">
+            <a:lvl4pPr marL="1828881" lvl="3" indent="-317514" algn="l">
               <a:lnSpc>
                 <a:spcPct val="90000"/>
               </a:lnSpc>
               <a:spcBef>
-                <a:spcPts val="400"/>
+                <a:spcPts val="399"/>
               </a:spcBef>
               <a:spcAft>
                 <a:spcPts val="0"/>
@@ -3619,12 +3619,12 @@
               <a:buChar char="•"/>
               <a:defRPr/>
             </a:lvl4pPr>
-            <a:lvl5pPr marL="2285959" lvl="4" indent="-317494" algn="l">
+            <a:lvl5pPr marL="2286100" lvl="4" indent="-317514" algn="l">
               <a:lnSpc>
                 <a:spcPct val="90000"/>
               </a:lnSpc>
               <a:spcBef>
-                <a:spcPts val="400"/>
+                <a:spcPts val="399"/>
               </a:spcBef>
               <a:spcAft>
                 <a:spcPts val="0"/>
@@ -3636,12 +3636,12 @@
               <a:buChar char="•"/>
               <a:defRPr/>
             </a:lvl5pPr>
-            <a:lvl6pPr marL="2743151" lvl="5" indent="-317494" algn="l">
+            <a:lvl6pPr marL="2743320" lvl="5" indent="-317514" algn="l">
               <a:lnSpc>
                 <a:spcPct val="90000"/>
               </a:lnSpc>
               <a:spcBef>
-                <a:spcPts val="400"/>
+                <a:spcPts val="399"/>
               </a:spcBef>
               <a:spcAft>
                 <a:spcPts val="0"/>
@@ -3653,12 +3653,12 @@
               <a:buChar char="•"/>
               <a:defRPr/>
             </a:lvl6pPr>
-            <a:lvl7pPr marL="3200344" lvl="6" indent="-317494" algn="l">
+            <a:lvl7pPr marL="3200541" lvl="6" indent="-317514" algn="l">
               <a:lnSpc>
                 <a:spcPct val="90000"/>
               </a:lnSpc>
               <a:spcBef>
-                <a:spcPts val="400"/>
+                <a:spcPts val="399"/>
               </a:spcBef>
               <a:spcAft>
                 <a:spcPts val="0"/>
@@ -3670,12 +3670,12 @@
               <a:buChar char="•"/>
               <a:defRPr/>
             </a:lvl7pPr>
-            <a:lvl8pPr marL="3657535" lvl="7" indent="-317494" algn="l">
+            <a:lvl8pPr marL="3657761" lvl="7" indent="-317514" algn="l">
               <a:lnSpc>
                 <a:spcPct val="90000"/>
               </a:lnSpc>
               <a:spcBef>
-                <a:spcPts val="400"/>
+                <a:spcPts val="399"/>
               </a:spcBef>
               <a:spcAft>
                 <a:spcPts val="0"/>
@@ -3687,12 +3687,12 @@
               <a:buChar char="•"/>
               <a:defRPr/>
             </a:lvl8pPr>
-            <a:lvl9pPr marL="4114727" lvl="8" indent="-317494" algn="l">
+            <a:lvl9pPr marL="4114981" lvl="8" indent="-317514" algn="l">
               <a:lnSpc>
                 <a:spcPct val="90000"/>
               </a:lnSpc>
               <a:spcBef>
-                <a:spcPts val="400"/>
+                <a:spcPts val="399"/>
               </a:spcBef>
               <a:spcAft>
                 <a:spcPts val="0"/>
@@ -3722,8 +3722,8 @@
         </p:nvSpPr>
         <p:spPr>
           <a:xfrm>
-            <a:off x="638556" y="3860633"/>
-            <a:ext cx="2089814" cy="221764"/>
+            <a:off x="634872" y="3590772"/>
+            <a:ext cx="2077759" cy="206262"/>
           </a:xfrm>
           <a:prstGeom prst="rect">
             <a:avLst/>
@@ -3855,8 +3855,8 @@
         </p:nvSpPr>
         <p:spPr>
           <a:xfrm>
-            <a:off x="3076673" y="3860633"/>
-            <a:ext cx="3134722" cy="221764"/>
+            <a:off x="3058925" y="3590772"/>
+            <a:ext cx="3116639" cy="206262"/>
           </a:xfrm>
           <a:prstGeom prst="rect">
             <a:avLst/>
@@ -3988,8 +3988,8 @@
         </p:nvSpPr>
         <p:spPr>
           <a:xfrm>
-            <a:off x="6559697" y="3860633"/>
-            <a:ext cx="2089814" cy="221764"/>
+            <a:off x="6521857" y="3590772"/>
+            <a:ext cx="2077759" cy="206262"/>
           </a:xfrm>
           <a:prstGeom prst="rect">
             <a:avLst/>
@@ -4115,8 +4115,8 @@
         </p:nvSpPr>
         <p:spPr>
           <a:xfrm>
-            <a:off x="633718" y="1038441"/>
-            <a:ext cx="8010957" cy="1732656"/>
+            <a:off x="630068" y="965853"/>
+            <a:ext cx="7964746" cy="1611542"/>
           </a:xfrm>
           <a:prstGeom prst="rect">
             <a:avLst/>
@@ -4255,8 +4255,8 @@
         </p:nvSpPr>
         <p:spPr>
           <a:xfrm>
-            <a:off x="633718" y="2787485"/>
-            <a:ext cx="8010957" cy="911163"/>
+            <a:off x="630068" y="2592643"/>
+            <a:ext cx="7964746" cy="847472"/>
           </a:xfrm>
           <a:prstGeom prst="rect">
             <a:avLst/>
@@ -4271,7 +4271,7 @@
             <a:normAutofit/>
           </a:bodyPr>
           <a:lstStyle>
-            <a:lvl1pPr marL="457192" lvl="0" indent="-228596" algn="l">
+            <a:lvl1pPr marL="457220" lvl="0" indent="-228610" algn="l">
               <a:lnSpc>
                 <a:spcPct val="90000"/>
               </a:lnSpc>
@@ -4292,12 +4292,12 @@
                 </a:solidFill>
               </a:defRPr>
             </a:lvl1pPr>
-            <a:lvl2pPr marL="914383" lvl="1" indent="-228596" algn="l">
+            <a:lvl2pPr marL="914439" lvl="1" indent="-228610" algn="l">
               <a:lnSpc>
                 <a:spcPct val="90000"/>
               </a:lnSpc>
               <a:spcBef>
-                <a:spcPts val="400"/>
+                <a:spcPts val="399"/>
               </a:spcBef>
               <a:spcAft>
                 <a:spcPts val="0"/>
@@ -4313,12 +4313,12 @@
                 </a:solidFill>
               </a:defRPr>
             </a:lvl2pPr>
-            <a:lvl3pPr marL="1371576" lvl="2" indent="-228596" algn="l">
+            <a:lvl3pPr marL="1371660" lvl="2" indent="-228610" algn="l">
               <a:lnSpc>
                 <a:spcPct val="90000"/>
               </a:lnSpc>
               <a:spcBef>
-                <a:spcPts val="400"/>
+                <a:spcPts val="399"/>
               </a:spcBef>
               <a:spcAft>
                 <a:spcPts val="0"/>
@@ -4334,12 +4334,12 @@
                 </a:solidFill>
               </a:defRPr>
             </a:lvl3pPr>
-            <a:lvl4pPr marL="1828768" lvl="3" indent="-228596" algn="l">
+            <a:lvl4pPr marL="1828881" lvl="3" indent="-228610" algn="l">
               <a:lnSpc>
                 <a:spcPct val="90000"/>
               </a:lnSpc>
               <a:spcBef>
-                <a:spcPts val="400"/>
+                <a:spcPts val="399"/>
               </a:spcBef>
               <a:spcAft>
                 <a:spcPts val="0"/>
@@ -4355,12 +4355,12 @@
                 </a:solidFill>
               </a:defRPr>
             </a:lvl4pPr>
-            <a:lvl5pPr marL="2285959" lvl="4" indent="-228596" algn="l">
+            <a:lvl5pPr marL="2286100" lvl="4" indent="-228610" algn="l">
               <a:lnSpc>
                 <a:spcPct val="90000"/>
               </a:lnSpc>
               <a:spcBef>
-                <a:spcPts val="400"/>
+                <a:spcPts val="399"/>
               </a:spcBef>
               <a:spcAft>
                 <a:spcPts val="0"/>
@@ -4376,12 +4376,12 @@
                 </a:solidFill>
               </a:defRPr>
             </a:lvl5pPr>
-            <a:lvl6pPr marL="2743151" lvl="5" indent="-228596" algn="l">
+            <a:lvl6pPr marL="2743320" lvl="5" indent="-228610" algn="l">
               <a:lnSpc>
                 <a:spcPct val="90000"/>
               </a:lnSpc>
               <a:spcBef>
-                <a:spcPts val="400"/>
+                <a:spcPts val="399"/>
               </a:spcBef>
               <a:spcAft>
                 <a:spcPts val="0"/>
@@ -4397,12 +4397,12 @@
                 </a:solidFill>
               </a:defRPr>
             </a:lvl6pPr>
-            <a:lvl7pPr marL="3200344" lvl="6" indent="-228596" algn="l">
+            <a:lvl7pPr marL="3200541" lvl="6" indent="-228610" algn="l">
               <a:lnSpc>
                 <a:spcPct val="90000"/>
               </a:lnSpc>
               <a:spcBef>
-                <a:spcPts val="400"/>
+                <a:spcPts val="399"/>
               </a:spcBef>
               <a:spcAft>
                 <a:spcPts val="0"/>
@@ -4418,12 +4418,12 @@
                 </a:solidFill>
               </a:defRPr>
             </a:lvl7pPr>
-            <a:lvl8pPr marL="3657535" lvl="7" indent="-228596" algn="l">
+            <a:lvl8pPr marL="3657761" lvl="7" indent="-228610" algn="l">
               <a:lnSpc>
                 <a:spcPct val="90000"/>
               </a:lnSpc>
               <a:spcBef>
-                <a:spcPts val="400"/>
+                <a:spcPts val="399"/>
               </a:spcBef>
               <a:spcAft>
                 <a:spcPts val="0"/>
@@ -4439,12 +4439,12 @@
                 </a:solidFill>
               </a:defRPr>
             </a:lvl8pPr>
-            <a:lvl9pPr marL="4114727" lvl="8" indent="-228596" algn="l">
+            <a:lvl9pPr marL="4114981" lvl="8" indent="-228610" algn="l">
               <a:lnSpc>
                 <a:spcPct val="90000"/>
               </a:lnSpc>
               <a:spcBef>
-                <a:spcPts val="400"/>
+                <a:spcPts val="399"/>
               </a:spcBef>
               <a:spcAft>
                 <a:spcPts val="0"/>
@@ -4478,8 +4478,8 @@
         </p:nvSpPr>
         <p:spPr>
           <a:xfrm>
-            <a:off x="638556" y="3860633"/>
-            <a:ext cx="2089814" cy="221764"/>
+            <a:off x="634872" y="3590772"/>
+            <a:ext cx="2077759" cy="206262"/>
           </a:xfrm>
           <a:prstGeom prst="rect">
             <a:avLst/>
@@ -4611,8 +4611,8 @@
         </p:nvSpPr>
         <p:spPr>
           <a:xfrm>
-            <a:off x="3076673" y="3860633"/>
-            <a:ext cx="3134722" cy="221764"/>
+            <a:off x="3058925" y="3590772"/>
+            <a:ext cx="3116639" cy="206262"/>
           </a:xfrm>
           <a:prstGeom prst="rect">
             <a:avLst/>
@@ -4744,8 +4744,8 @@
         </p:nvSpPr>
         <p:spPr>
           <a:xfrm>
-            <a:off x="6559697" y="3860633"/>
-            <a:ext cx="2089814" cy="221764"/>
+            <a:off x="6521857" y="3590772"/>
+            <a:ext cx="2077759" cy="206262"/>
           </a:xfrm>
           <a:prstGeom prst="rect">
             <a:avLst/>
@@ -4871,8 +4871,8 @@
         </p:nvSpPr>
         <p:spPr>
           <a:xfrm>
-            <a:off x="638555" y="221764"/>
-            <a:ext cx="8010957" cy="805102"/>
+            <a:off x="634877" y="206263"/>
+            <a:ext cx="7964746" cy="748825"/>
           </a:xfrm>
           <a:prstGeom prst="rect">
             <a:avLst/>
@@ -5010,8 +5010,8 @@
         </p:nvSpPr>
         <p:spPr>
           <a:xfrm>
-            <a:off x="638557" y="1108824"/>
-            <a:ext cx="3947428" cy="2642855"/>
+            <a:off x="634874" y="1031322"/>
+            <a:ext cx="3924657" cy="2458117"/>
           </a:xfrm>
           <a:prstGeom prst="rect">
             <a:avLst/>
@@ -5026,7 +5026,7 @@
             <a:normAutofit/>
           </a:bodyPr>
           <a:lstStyle>
-            <a:lvl1pPr marL="457192" lvl="0" indent="-317494" algn="l">
+            <a:lvl1pPr marL="457220" lvl="0" indent="-317514" algn="l">
               <a:lnSpc>
                 <a:spcPct val="90000"/>
               </a:lnSpc>
@@ -5043,12 +5043,12 @@
               <a:buChar char="•"/>
               <a:defRPr/>
             </a:lvl1pPr>
-            <a:lvl2pPr marL="914383" lvl="1" indent="-317494" algn="l">
+            <a:lvl2pPr marL="914439" lvl="1" indent="-317514" algn="l">
               <a:lnSpc>
                 <a:spcPct val="90000"/>
               </a:lnSpc>
               <a:spcBef>
-                <a:spcPts val="400"/>
+                <a:spcPts val="399"/>
               </a:spcBef>
               <a:spcAft>
                 <a:spcPts val="0"/>
@@ -5060,12 +5060,12 @@
               <a:buChar char="•"/>
               <a:defRPr/>
             </a:lvl2pPr>
-            <a:lvl3pPr marL="1371576" lvl="2" indent="-317494" algn="l">
+            <a:lvl3pPr marL="1371660" lvl="2" indent="-317514" algn="l">
               <a:lnSpc>
                 <a:spcPct val="90000"/>
               </a:lnSpc>
               <a:spcBef>
-                <a:spcPts val="400"/>
+                <a:spcPts val="399"/>
               </a:spcBef>
               <a:spcAft>
                 <a:spcPts val="0"/>
@@ -5077,12 +5077,12 @@
               <a:buChar char="•"/>
               <a:defRPr/>
             </a:lvl3pPr>
-            <a:lvl4pPr marL="1828768" lvl="3" indent="-317494" algn="l">
+            <a:lvl4pPr marL="1828881" lvl="3" indent="-317514" algn="l">
               <a:lnSpc>
                 <a:spcPct val="90000"/>
               </a:lnSpc>
               <a:spcBef>
-                <a:spcPts val="400"/>
+                <a:spcPts val="399"/>
               </a:spcBef>
               <a:spcAft>
                 <a:spcPts val="0"/>
@@ -5094,12 +5094,12 @@
               <a:buChar char="•"/>
               <a:defRPr/>
             </a:lvl4pPr>
-            <a:lvl5pPr marL="2285959" lvl="4" indent="-317494" algn="l">
+            <a:lvl5pPr marL="2286100" lvl="4" indent="-317514" algn="l">
               <a:lnSpc>
                 <a:spcPct val="90000"/>
               </a:lnSpc>
               <a:spcBef>
-                <a:spcPts val="400"/>
+                <a:spcPts val="399"/>
               </a:spcBef>
               <a:spcAft>
                 <a:spcPts val="0"/>
@@ -5111,12 +5111,12 @@
               <a:buChar char="•"/>
               <a:defRPr/>
             </a:lvl5pPr>
-            <a:lvl6pPr marL="2743151" lvl="5" indent="-317494" algn="l">
+            <a:lvl6pPr marL="2743320" lvl="5" indent="-317514" algn="l">
               <a:lnSpc>
                 <a:spcPct val="90000"/>
               </a:lnSpc>
               <a:spcBef>
-                <a:spcPts val="400"/>
+                <a:spcPts val="399"/>
               </a:spcBef>
               <a:spcAft>
                 <a:spcPts val="0"/>
@@ -5128,12 +5128,12 @@
               <a:buChar char="•"/>
               <a:defRPr/>
             </a:lvl6pPr>
-            <a:lvl7pPr marL="3200344" lvl="6" indent="-317494" algn="l">
+            <a:lvl7pPr marL="3200541" lvl="6" indent="-317514" algn="l">
               <a:lnSpc>
                 <a:spcPct val="90000"/>
               </a:lnSpc>
               <a:spcBef>
-                <a:spcPts val="400"/>
+                <a:spcPts val="399"/>
               </a:spcBef>
               <a:spcAft>
                 <a:spcPts val="0"/>
@@ -5145,12 +5145,12 @@
               <a:buChar char="•"/>
               <a:defRPr/>
             </a:lvl7pPr>
-            <a:lvl8pPr marL="3657535" lvl="7" indent="-317494" algn="l">
+            <a:lvl8pPr marL="3657761" lvl="7" indent="-317514" algn="l">
               <a:lnSpc>
                 <a:spcPct val="90000"/>
               </a:lnSpc>
               <a:spcBef>
-                <a:spcPts val="400"/>
+                <a:spcPts val="399"/>
               </a:spcBef>
               <a:spcAft>
                 <a:spcPts val="0"/>
@@ -5162,12 +5162,12 @@
               <a:buChar char="•"/>
               <a:defRPr/>
             </a:lvl8pPr>
-            <a:lvl9pPr marL="4114727" lvl="8" indent="-317494" algn="l">
+            <a:lvl9pPr marL="4114981" lvl="8" indent="-317514" algn="l">
               <a:lnSpc>
                 <a:spcPct val="90000"/>
               </a:lnSpc>
               <a:spcBef>
-                <a:spcPts val="400"/>
+                <a:spcPts val="399"/>
               </a:spcBef>
               <a:spcAft>
                 <a:spcPts val="0"/>
@@ -5197,8 +5197,8 @@
         </p:nvSpPr>
         <p:spPr>
           <a:xfrm>
-            <a:off x="4702086" y="1108824"/>
-            <a:ext cx="3947428" cy="2642855"/>
+            <a:off x="4674962" y="1031322"/>
+            <a:ext cx="3924657" cy="2458117"/>
           </a:xfrm>
           <a:prstGeom prst="rect">
             <a:avLst/>
@@ -5213,7 +5213,7 @@
             <a:normAutofit/>
           </a:bodyPr>
           <a:lstStyle>
-            <a:lvl1pPr marL="457192" lvl="0" indent="-317494" algn="l">
+            <a:lvl1pPr marL="457220" lvl="0" indent="-317514" algn="l">
               <a:lnSpc>
                 <a:spcPct val="90000"/>
               </a:lnSpc>
@@ -5230,12 +5230,12 @@
               <a:buChar char="•"/>
               <a:defRPr/>
             </a:lvl1pPr>
-            <a:lvl2pPr marL="914383" lvl="1" indent="-317494" algn="l">
+            <a:lvl2pPr marL="914439" lvl="1" indent="-317514" algn="l">
               <a:lnSpc>
                 <a:spcPct val="90000"/>
               </a:lnSpc>
               <a:spcBef>
-                <a:spcPts val="400"/>
+                <a:spcPts val="399"/>
               </a:spcBef>
               <a:spcAft>
                 <a:spcPts val="0"/>
@@ -5247,12 +5247,12 @@
               <a:buChar char="•"/>
               <a:defRPr/>
             </a:lvl2pPr>
-            <a:lvl3pPr marL="1371576" lvl="2" indent="-317494" algn="l">
+            <a:lvl3pPr marL="1371660" lvl="2" indent="-317514" algn="l">
               <a:lnSpc>
                 <a:spcPct val="90000"/>
               </a:lnSpc>
               <a:spcBef>
-                <a:spcPts val="400"/>
+                <a:spcPts val="399"/>
               </a:spcBef>
               <a:spcAft>
                 <a:spcPts val="0"/>
@@ -5264,12 +5264,12 @@
               <a:buChar char="•"/>
               <a:defRPr/>
             </a:lvl3pPr>
-            <a:lvl4pPr marL="1828768" lvl="3" indent="-317494" algn="l">
+            <a:lvl4pPr marL="1828881" lvl="3" indent="-317514" algn="l">
               <a:lnSpc>
                 <a:spcPct val="90000"/>
               </a:lnSpc>
               <a:spcBef>
-                <a:spcPts val="400"/>
+                <a:spcPts val="399"/>
               </a:spcBef>
               <a:spcAft>
                 <a:spcPts val="0"/>
@@ -5281,12 +5281,12 @@
               <a:buChar char="•"/>
               <a:defRPr/>
             </a:lvl4pPr>
-            <a:lvl5pPr marL="2285959" lvl="4" indent="-317494" algn="l">
+            <a:lvl5pPr marL="2286100" lvl="4" indent="-317514" algn="l">
               <a:lnSpc>
                 <a:spcPct val="90000"/>
               </a:lnSpc>
               <a:spcBef>
-                <a:spcPts val="400"/>
+                <a:spcPts val="399"/>
               </a:spcBef>
               <a:spcAft>
                 <a:spcPts val="0"/>
@@ -5298,12 +5298,12 @@
               <a:buChar char="•"/>
               <a:defRPr/>
             </a:lvl5pPr>
-            <a:lvl6pPr marL="2743151" lvl="5" indent="-317494" algn="l">
+            <a:lvl6pPr marL="2743320" lvl="5" indent="-317514" algn="l">
               <a:lnSpc>
                 <a:spcPct val="90000"/>
               </a:lnSpc>
               <a:spcBef>
-                <a:spcPts val="400"/>
+                <a:spcPts val="399"/>
               </a:spcBef>
               <a:spcAft>
                 <a:spcPts val="0"/>
@@ -5315,12 +5315,12 @@
               <a:buChar char="•"/>
               <a:defRPr/>
             </a:lvl6pPr>
-            <a:lvl7pPr marL="3200344" lvl="6" indent="-317494" algn="l">
+            <a:lvl7pPr marL="3200541" lvl="6" indent="-317514" algn="l">
               <a:lnSpc>
                 <a:spcPct val="90000"/>
               </a:lnSpc>
               <a:spcBef>
-                <a:spcPts val="400"/>
+                <a:spcPts val="399"/>
               </a:spcBef>
               <a:spcAft>
                 <a:spcPts val="0"/>
@@ -5332,12 +5332,12 @@
               <a:buChar char="•"/>
               <a:defRPr/>
             </a:lvl7pPr>
-            <a:lvl8pPr marL="3657535" lvl="7" indent="-317494" algn="l">
+            <a:lvl8pPr marL="3657761" lvl="7" indent="-317514" algn="l">
               <a:lnSpc>
                 <a:spcPct val="90000"/>
               </a:lnSpc>
               <a:spcBef>
-                <a:spcPts val="400"/>
+                <a:spcPts val="399"/>
               </a:spcBef>
               <a:spcAft>
                 <a:spcPts val="0"/>
@@ -5349,12 +5349,12 @@
               <a:buChar char="•"/>
               <a:defRPr/>
             </a:lvl8pPr>
-            <a:lvl9pPr marL="4114727" lvl="8" indent="-317494" algn="l">
+            <a:lvl9pPr marL="4114981" lvl="8" indent="-317514" algn="l">
               <a:lnSpc>
                 <a:spcPct val="90000"/>
               </a:lnSpc>
               <a:spcBef>
-                <a:spcPts val="400"/>
+                <a:spcPts val="399"/>
               </a:spcBef>
               <a:spcAft>
                 <a:spcPts val="0"/>
@@ -5384,8 +5384,8 @@
         </p:nvSpPr>
         <p:spPr>
           <a:xfrm>
-            <a:off x="638556" y="3860633"/>
-            <a:ext cx="2089814" cy="221764"/>
+            <a:off x="634872" y="3590772"/>
+            <a:ext cx="2077759" cy="206262"/>
           </a:xfrm>
           <a:prstGeom prst="rect">
             <a:avLst/>
@@ -5517,8 +5517,8 @@
         </p:nvSpPr>
         <p:spPr>
           <a:xfrm>
-            <a:off x="3076673" y="3860633"/>
-            <a:ext cx="3134722" cy="221764"/>
+            <a:off x="3058925" y="3590772"/>
+            <a:ext cx="3116639" cy="206262"/>
           </a:xfrm>
           <a:prstGeom prst="rect">
             <a:avLst/>
@@ -5650,8 +5650,8 @@
         </p:nvSpPr>
         <p:spPr>
           <a:xfrm>
-            <a:off x="6559697" y="3860633"/>
-            <a:ext cx="2089814" cy="221764"/>
+            <a:off x="6521857" y="3590772"/>
+            <a:ext cx="2077759" cy="206262"/>
           </a:xfrm>
           <a:prstGeom prst="rect">
             <a:avLst/>
@@ -5777,8 +5777,8 @@
         </p:nvSpPr>
         <p:spPr>
           <a:xfrm>
-            <a:off x="639764" y="221764"/>
-            <a:ext cx="8010957" cy="805102"/>
+            <a:off x="636077" y="206263"/>
+            <a:ext cx="7964746" cy="748825"/>
           </a:xfrm>
           <a:prstGeom prst="rect">
             <a:avLst/>
@@ -5916,8 +5916,8 @@
         </p:nvSpPr>
         <p:spPr>
           <a:xfrm>
-            <a:off x="639765" y="1021081"/>
-            <a:ext cx="3929287" cy="500416"/>
+            <a:off x="636078" y="949707"/>
+            <a:ext cx="3906621" cy="465438"/>
           </a:xfrm>
           <a:prstGeom prst="rect">
             <a:avLst/>
@@ -5932,7 +5932,7 @@
             <a:normAutofit/>
           </a:bodyPr>
           <a:lstStyle>
-            <a:lvl1pPr marL="457192" lvl="0" indent="-228596" algn="l">
+            <a:lvl1pPr marL="457220" lvl="0" indent="-228610" algn="l">
               <a:lnSpc>
                 <a:spcPct val="90000"/>
               </a:lnSpc>
@@ -5949,12 +5949,12 @@
               <a:buNone/>
               <a:defRPr sz="1800" b="1"/>
             </a:lvl1pPr>
-            <a:lvl2pPr marL="914383" lvl="1" indent="-228596" algn="l">
+            <a:lvl2pPr marL="914439" lvl="1" indent="-228610" algn="l">
               <a:lnSpc>
                 <a:spcPct val="90000"/>
               </a:lnSpc>
               <a:spcBef>
-                <a:spcPts val="400"/>
+                <a:spcPts val="399"/>
               </a:spcBef>
               <a:spcAft>
                 <a:spcPts val="0"/>
@@ -5966,12 +5966,12 @@
               <a:buNone/>
               <a:defRPr sz="1500" b="1"/>
             </a:lvl2pPr>
-            <a:lvl3pPr marL="1371576" lvl="2" indent="-228596" algn="l">
+            <a:lvl3pPr marL="1371660" lvl="2" indent="-228610" algn="l">
               <a:lnSpc>
                 <a:spcPct val="90000"/>
               </a:lnSpc>
               <a:spcBef>
-                <a:spcPts val="400"/>
+                <a:spcPts val="399"/>
               </a:spcBef>
               <a:spcAft>
                 <a:spcPts val="0"/>
@@ -5983,12 +5983,12 @@
               <a:buNone/>
               <a:defRPr sz="1400" b="1"/>
             </a:lvl3pPr>
-            <a:lvl4pPr marL="1828768" lvl="3" indent="-228596" algn="l">
+            <a:lvl4pPr marL="1828881" lvl="3" indent="-228610" algn="l">
               <a:lnSpc>
                 <a:spcPct val="90000"/>
               </a:lnSpc>
               <a:spcBef>
-                <a:spcPts val="400"/>
+                <a:spcPts val="399"/>
               </a:spcBef>
               <a:spcAft>
                 <a:spcPts val="0"/>
@@ -6000,12 +6000,12 @@
               <a:buNone/>
               <a:defRPr sz="1200" b="1"/>
             </a:lvl4pPr>
-            <a:lvl5pPr marL="2285959" lvl="4" indent="-228596" algn="l">
+            <a:lvl5pPr marL="2286100" lvl="4" indent="-228610" algn="l">
               <a:lnSpc>
                 <a:spcPct val="90000"/>
               </a:lnSpc>
               <a:spcBef>
-                <a:spcPts val="400"/>
+                <a:spcPts val="399"/>
               </a:spcBef>
               <a:spcAft>
                 <a:spcPts val="0"/>
@@ -6017,12 +6017,12 @@
               <a:buNone/>
               <a:defRPr sz="1200" b="1"/>
             </a:lvl5pPr>
-            <a:lvl6pPr marL="2743151" lvl="5" indent="-228596" algn="l">
+            <a:lvl6pPr marL="2743320" lvl="5" indent="-228610" algn="l">
               <a:lnSpc>
                 <a:spcPct val="90000"/>
               </a:lnSpc>
               <a:spcBef>
-                <a:spcPts val="400"/>
+                <a:spcPts val="399"/>
               </a:spcBef>
               <a:spcAft>
                 <a:spcPts val="0"/>
@@ -6034,12 +6034,12 @@
               <a:buNone/>
               <a:defRPr sz="1200" b="1"/>
             </a:lvl6pPr>
-            <a:lvl7pPr marL="3200344" lvl="6" indent="-228596" algn="l">
+            <a:lvl7pPr marL="3200541" lvl="6" indent="-228610" algn="l">
               <a:lnSpc>
                 <a:spcPct val="90000"/>
               </a:lnSpc>
               <a:spcBef>
-                <a:spcPts val="400"/>
+                <a:spcPts val="399"/>
               </a:spcBef>
               <a:spcAft>
                 <a:spcPts val="0"/>
@@ -6051,12 +6051,12 @@
               <a:buNone/>
               <a:defRPr sz="1200" b="1"/>
             </a:lvl7pPr>
-            <a:lvl8pPr marL="3657535" lvl="7" indent="-228596" algn="l">
+            <a:lvl8pPr marL="3657761" lvl="7" indent="-228610" algn="l">
               <a:lnSpc>
                 <a:spcPct val="90000"/>
               </a:lnSpc>
               <a:spcBef>
-                <a:spcPts val="400"/>
+                <a:spcPts val="399"/>
               </a:spcBef>
               <a:spcAft>
                 <a:spcPts val="0"/>
@@ -6068,12 +6068,12 @@
               <a:buNone/>
               <a:defRPr sz="1200" b="1"/>
             </a:lvl8pPr>
-            <a:lvl9pPr marL="4114727" lvl="8" indent="-228596" algn="l">
+            <a:lvl9pPr marL="4114981" lvl="8" indent="-228610" algn="l">
               <a:lnSpc>
                 <a:spcPct val="90000"/>
               </a:lnSpc>
               <a:spcBef>
-                <a:spcPts val="400"/>
+                <a:spcPts val="399"/>
               </a:spcBef>
               <a:spcAft>
                 <a:spcPts val="0"/>
@@ -6103,8 +6103,8 @@
         </p:nvSpPr>
         <p:spPr>
           <a:xfrm>
-            <a:off x="639765" y="1521500"/>
-            <a:ext cx="3929287" cy="2237894"/>
+            <a:off x="636078" y="1415147"/>
+            <a:ext cx="3906621" cy="2081463"/>
           </a:xfrm>
           <a:prstGeom prst="rect">
             <a:avLst/>
@@ -6119,7 +6119,7 @@
             <a:normAutofit/>
           </a:bodyPr>
           <a:lstStyle>
-            <a:lvl1pPr marL="457192" lvl="0" indent="-317494" algn="l">
+            <a:lvl1pPr marL="457220" lvl="0" indent="-317514" algn="l">
               <a:lnSpc>
                 <a:spcPct val="90000"/>
               </a:lnSpc>
@@ -6136,12 +6136,12 @@
               <a:buChar char="•"/>
               <a:defRPr/>
             </a:lvl1pPr>
-            <a:lvl2pPr marL="914383" lvl="1" indent="-317494" algn="l">
+            <a:lvl2pPr marL="914439" lvl="1" indent="-317514" algn="l">
               <a:lnSpc>
                 <a:spcPct val="90000"/>
               </a:lnSpc>
               <a:spcBef>
-                <a:spcPts val="400"/>
+                <a:spcPts val="399"/>
               </a:spcBef>
               <a:spcAft>
                 <a:spcPts val="0"/>
@@ -6153,12 +6153,12 @@
               <a:buChar char="•"/>
               <a:defRPr/>
             </a:lvl2pPr>
-            <a:lvl3pPr marL="1371576" lvl="2" indent="-317494" algn="l">
+            <a:lvl3pPr marL="1371660" lvl="2" indent="-317514" algn="l">
               <a:lnSpc>
                 <a:spcPct val="90000"/>
               </a:lnSpc>
               <a:spcBef>
-                <a:spcPts val="400"/>
+                <a:spcPts val="399"/>
               </a:spcBef>
               <a:spcAft>
                 <a:spcPts val="0"/>
@@ -6170,12 +6170,12 @@
               <a:buChar char="•"/>
               <a:defRPr/>
             </a:lvl3pPr>
-            <a:lvl4pPr marL="1828768" lvl="3" indent="-317494" algn="l">
+            <a:lvl4pPr marL="1828881" lvl="3" indent="-317514" algn="l">
               <a:lnSpc>
                 <a:spcPct val="90000"/>
               </a:lnSpc>
               <a:spcBef>
-                <a:spcPts val="400"/>
+                <a:spcPts val="399"/>
               </a:spcBef>
               <a:spcAft>
                 <a:spcPts val="0"/>
@@ -6187,12 +6187,12 @@
               <a:buChar char="•"/>
               <a:defRPr/>
             </a:lvl4pPr>
-            <a:lvl5pPr marL="2285959" lvl="4" indent="-317494" algn="l">
+            <a:lvl5pPr marL="2286100" lvl="4" indent="-317514" algn="l">
               <a:lnSpc>
                 <a:spcPct val="90000"/>
               </a:lnSpc>
               <a:spcBef>
-                <a:spcPts val="400"/>
+                <a:spcPts val="399"/>
               </a:spcBef>
               <a:spcAft>
                 <a:spcPts val="0"/>
@@ -6204,12 +6204,12 @@
               <a:buChar char="•"/>
               <a:defRPr/>
             </a:lvl5pPr>
-            <a:lvl6pPr marL="2743151" lvl="5" indent="-317494" algn="l">
+            <a:lvl6pPr marL="2743320" lvl="5" indent="-317514" algn="l">
               <a:lnSpc>
                 <a:spcPct val="90000"/>
               </a:lnSpc>
               <a:spcBef>
-                <a:spcPts val="400"/>
+                <a:spcPts val="399"/>
               </a:spcBef>
               <a:spcAft>
                 <a:spcPts val="0"/>
@@ -6221,12 +6221,12 @@
               <a:buChar char="•"/>
               <a:defRPr/>
             </a:lvl6pPr>
-            <a:lvl7pPr marL="3200344" lvl="6" indent="-317494" algn="l">
+            <a:lvl7pPr marL="3200541" lvl="6" indent="-317514" algn="l">
               <a:lnSpc>
                 <a:spcPct val="90000"/>
               </a:lnSpc>
               <a:spcBef>
-                <a:spcPts val="400"/>
+                <a:spcPts val="399"/>
               </a:spcBef>
               <a:spcAft>
                 <a:spcPts val="0"/>
@@ -6238,12 +6238,12 @@
               <a:buChar char="•"/>
               <a:defRPr/>
             </a:lvl7pPr>
-            <a:lvl8pPr marL="3657535" lvl="7" indent="-317494" algn="l">
+            <a:lvl8pPr marL="3657761" lvl="7" indent="-317514" algn="l">
               <a:lnSpc>
                 <a:spcPct val="90000"/>
               </a:lnSpc>
               <a:spcBef>
-                <a:spcPts val="400"/>
+                <a:spcPts val="399"/>
               </a:spcBef>
               <a:spcAft>
                 <a:spcPts val="0"/>
@@ -6255,12 +6255,12 @@
               <a:buChar char="•"/>
               <a:defRPr/>
             </a:lvl8pPr>
-            <a:lvl9pPr marL="4114727" lvl="8" indent="-317494" algn="l">
+            <a:lvl9pPr marL="4114981" lvl="8" indent="-317514" algn="l">
               <a:lnSpc>
                 <a:spcPct val="90000"/>
               </a:lnSpc>
               <a:spcBef>
-                <a:spcPts val="400"/>
+                <a:spcPts val="399"/>
               </a:spcBef>
               <a:spcAft>
                 <a:spcPts val="0"/>
@@ -6290,8 +6290,8 @@
         </p:nvSpPr>
         <p:spPr>
           <a:xfrm>
-            <a:off x="4702084" y="1021081"/>
-            <a:ext cx="3948638" cy="500416"/>
+            <a:off x="4674960" y="949707"/>
+            <a:ext cx="3925860" cy="465438"/>
           </a:xfrm>
           <a:prstGeom prst="rect">
             <a:avLst/>
@@ -6306,7 +6306,7 @@
             <a:normAutofit/>
           </a:bodyPr>
           <a:lstStyle>
-            <a:lvl1pPr marL="457192" lvl="0" indent="-228596" algn="l">
+            <a:lvl1pPr marL="457220" lvl="0" indent="-228610" algn="l">
               <a:lnSpc>
                 <a:spcPct val="90000"/>
               </a:lnSpc>
@@ -6323,12 +6323,12 @@
               <a:buNone/>
               <a:defRPr sz="1800" b="1"/>
             </a:lvl1pPr>
-            <a:lvl2pPr marL="914383" lvl="1" indent="-228596" algn="l">
+            <a:lvl2pPr marL="914439" lvl="1" indent="-228610" algn="l">
               <a:lnSpc>
                 <a:spcPct val="90000"/>
               </a:lnSpc>
               <a:spcBef>
-                <a:spcPts val="400"/>
+                <a:spcPts val="399"/>
               </a:spcBef>
               <a:spcAft>
                 <a:spcPts val="0"/>
@@ -6340,12 +6340,12 @@
               <a:buNone/>
               <a:defRPr sz="1500" b="1"/>
             </a:lvl2pPr>
-            <a:lvl3pPr marL="1371576" lvl="2" indent="-228596" algn="l">
+            <a:lvl3pPr marL="1371660" lvl="2" indent="-228610" algn="l">
               <a:lnSpc>
                 <a:spcPct val="90000"/>
               </a:lnSpc>
               <a:spcBef>
-                <a:spcPts val="400"/>
+                <a:spcPts val="399"/>
               </a:spcBef>
               <a:spcAft>
                 <a:spcPts val="0"/>
@@ -6357,12 +6357,12 @@
               <a:buNone/>
               <a:defRPr sz="1400" b="1"/>
             </a:lvl3pPr>
-            <a:lvl4pPr marL="1828768" lvl="3" indent="-228596" algn="l">
+            <a:lvl4pPr marL="1828881" lvl="3" indent="-228610" algn="l">
               <a:lnSpc>
                 <a:spcPct val="90000"/>
               </a:lnSpc>
               <a:spcBef>
-                <a:spcPts val="400"/>
+                <a:spcPts val="399"/>
               </a:spcBef>
               <a:spcAft>
                 <a:spcPts val="0"/>
@@ -6374,12 +6374,12 @@
               <a:buNone/>
               <a:defRPr sz="1200" b="1"/>
             </a:lvl4pPr>
-            <a:lvl5pPr marL="2285959" lvl="4" indent="-228596" algn="l">
+            <a:lvl5pPr marL="2286100" lvl="4" indent="-228610" algn="l">
               <a:lnSpc>
                 <a:spcPct val="90000"/>
               </a:lnSpc>
               <a:spcBef>
-                <a:spcPts val="400"/>
+                <a:spcPts val="399"/>
               </a:spcBef>
               <a:spcAft>
                 <a:spcPts val="0"/>
@@ -6391,12 +6391,12 @@
               <a:buNone/>
               <a:defRPr sz="1200" b="1"/>
             </a:lvl5pPr>
-            <a:lvl6pPr marL="2743151" lvl="5" indent="-228596" algn="l">
+            <a:lvl6pPr marL="2743320" lvl="5" indent="-228610" algn="l">
               <a:lnSpc>
                 <a:spcPct val="90000"/>
               </a:lnSpc>
               <a:spcBef>
-                <a:spcPts val="400"/>
+                <a:spcPts val="399"/>
               </a:spcBef>
               <a:spcAft>
                 <a:spcPts val="0"/>
@@ -6408,12 +6408,12 @@
               <a:buNone/>
               <a:defRPr sz="1200" b="1"/>
             </a:lvl6pPr>
-            <a:lvl7pPr marL="3200344" lvl="6" indent="-228596" algn="l">
+            <a:lvl7pPr marL="3200541" lvl="6" indent="-228610" algn="l">
               <a:lnSpc>
                 <a:spcPct val="90000"/>
               </a:lnSpc>
               <a:spcBef>
-                <a:spcPts val="400"/>
+                <a:spcPts val="399"/>
               </a:spcBef>
               <a:spcAft>
                 <a:spcPts val="0"/>
@@ -6425,12 +6425,12 @@
               <a:buNone/>
               <a:defRPr sz="1200" b="1"/>
             </a:lvl7pPr>
-            <a:lvl8pPr marL="3657535" lvl="7" indent="-228596" algn="l">
+            <a:lvl8pPr marL="3657761" lvl="7" indent="-228610" algn="l">
               <a:lnSpc>
                 <a:spcPct val="90000"/>
               </a:lnSpc>
               <a:spcBef>
-                <a:spcPts val="400"/>
+                <a:spcPts val="399"/>
               </a:spcBef>
               <a:spcAft>
                 <a:spcPts val="0"/>
@@ -6442,12 +6442,12 @@
               <a:buNone/>
               <a:defRPr sz="1200" b="1"/>
             </a:lvl8pPr>
-            <a:lvl9pPr marL="4114727" lvl="8" indent="-228596" algn="l">
+            <a:lvl9pPr marL="4114981" lvl="8" indent="-228610" algn="l">
               <a:lnSpc>
                 <a:spcPct val="90000"/>
               </a:lnSpc>
               <a:spcBef>
-                <a:spcPts val="400"/>
+                <a:spcPts val="399"/>
               </a:spcBef>
               <a:spcAft>
                 <a:spcPts val="0"/>
@@ -6477,8 +6477,8 @@
         </p:nvSpPr>
         <p:spPr>
           <a:xfrm>
-            <a:off x="4702084" y="1521500"/>
-            <a:ext cx="3948638" cy="2237894"/>
+            <a:off x="4674960" y="1415147"/>
+            <a:ext cx="3925860" cy="2081463"/>
           </a:xfrm>
           <a:prstGeom prst="rect">
             <a:avLst/>
@@ -6493,7 +6493,7 @@
             <a:normAutofit/>
           </a:bodyPr>
           <a:lstStyle>
-            <a:lvl1pPr marL="457192" lvl="0" indent="-317494" algn="l">
+            <a:lvl1pPr marL="457220" lvl="0" indent="-317514" algn="l">
               <a:lnSpc>
                 <a:spcPct val="90000"/>
               </a:lnSpc>
@@ -6510,12 +6510,12 @@
               <a:buChar char="•"/>
               <a:defRPr/>
             </a:lvl1pPr>
-            <a:lvl2pPr marL="914383" lvl="1" indent="-317494" algn="l">
+            <a:lvl2pPr marL="914439" lvl="1" indent="-317514" algn="l">
               <a:lnSpc>
                 <a:spcPct val="90000"/>
               </a:lnSpc>
               <a:spcBef>
-                <a:spcPts val="400"/>
+                <a:spcPts val="399"/>
               </a:spcBef>
               <a:spcAft>
                 <a:spcPts val="0"/>
@@ -6527,12 +6527,12 @@
               <a:buChar char="•"/>
               <a:defRPr/>
             </a:lvl2pPr>
-            <a:lvl3pPr marL="1371576" lvl="2" indent="-317494" algn="l">
+            <a:lvl3pPr marL="1371660" lvl="2" indent="-317514" algn="l">
               <a:lnSpc>
                 <a:spcPct val="90000"/>
               </a:lnSpc>
               <a:spcBef>
-                <a:spcPts val="400"/>
+                <a:spcPts val="399"/>
               </a:spcBef>
               <a:spcAft>
                 <a:spcPts val="0"/>
@@ -6544,12 +6544,12 @@
               <a:buChar char="•"/>
               <a:defRPr/>
             </a:lvl3pPr>
-            <a:lvl4pPr marL="1828768" lvl="3" indent="-317494" algn="l">
+            <a:lvl4pPr marL="1828881" lvl="3" indent="-317514" algn="l">
               <a:lnSpc>
                 <a:spcPct val="90000"/>
               </a:lnSpc>
               <a:spcBef>
-                <a:spcPts val="400"/>
+                <a:spcPts val="399"/>
               </a:spcBef>
               <a:spcAft>
                 <a:spcPts val="0"/>
@@ -6561,12 +6561,12 @@
               <a:buChar char="•"/>
               <a:defRPr/>
             </a:lvl4pPr>
-            <a:lvl5pPr marL="2285959" lvl="4" indent="-317494" algn="l">
+            <a:lvl5pPr marL="2286100" lvl="4" indent="-317514" algn="l">
               <a:lnSpc>
                 <a:spcPct val="90000"/>
               </a:lnSpc>
               <a:spcBef>
-                <a:spcPts val="400"/>
+                <a:spcPts val="399"/>
               </a:spcBef>
               <a:spcAft>
                 <a:spcPts val="0"/>
@@ -6578,12 +6578,12 @@
               <a:buChar char="•"/>
               <a:defRPr/>
             </a:lvl5pPr>
-            <a:lvl6pPr marL="2743151" lvl="5" indent="-317494" algn="l">
+            <a:lvl6pPr marL="2743320" lvl="5" indent="-317514" algn="l">
               <a:lnSpc>
                 <a:spcPct val="90000"/>
               </a:lnSpc>
               <a:spcBef>
-                <a:spcPts val="400"/>
+                <a:spcPts val="399"/>
               </a:spcBef>
               <a:spcAft>
                 <a:spcPts val="0"/>
@@ -6595,12 +6595,12 @@
               <a:buChar char="•"/>
               <a:defRPr/>
             </a:lvl6pPr>
-            <a:lvl7pPr marL="3200344" lvl="6" indent="-317494" algn="l">
+            <a:lvl7pPr marL="3200541" lvl="6" indent="-317514" algn="l">
               <a:lnSpc>
                 <a:spcPct val="90000"/>
               </a:lnSpc>
               <a:spcBef>
-                <a:spcPts val="400"/>
+                <a:spcPts val="399"/>
               </a:spcBef>
               <a:spcAft>
                 <a:spcPts val="0"/>
@@ -6612,12 +6612,12 @@
               <a:buChar char="•"/>
               <a:defRPr/>
             </a:lvl7pPr>
-            <a:lvl8pPr marL="3657535" lvl="7" indent="-317494" algn="l">
+            <a:lvl8pPr marL="3657761" lvl="7" indent="-317514" algn="l">
               <a:lnSpc>
                 <a:spcPct val="90000"/>
               </a:lnSpc>
               <a:spcBef>
-                <a:spcPts val="400"/>
+                <a:spcPts val="399"/>
               </a:spcBef>
               <a:spcAft>
                 <a:spcPts val="0"/>
@@ -6629,12 +6629,12 @@
               <a:buChar char="•"/>
               <a:defRPr/>
             </a:lvl8pPr>
-            <a:lvl9pPr marL="4114727" lvl="8" indent="-317494" algn="l">
+            <a:lvl9pPr marL="4114981" lvl="8" indent="-317514" algn="l">
               <a:lnSpc>
                 <a:spcPct val="90000"/>
               </a:lnSpc>
               <a:spcBef>
-                <a:spcPts val="400"/>
+                <a:spcPts val="399"/>
               </a:spcBef>
               <a:spcAft>
                 <a:spcPts val="0"/>
@@ -6664,8 +6664,8 @@
         </p:nvSpPr>
         <p:spPr>
           <a:xfrm>
-            <a:off x="638556" y="3860633"/>
-            <a:ext cx="2089814" cy="221764"/>
+            <a:off x="634872" y="3590772"/>
+            <a:ext cx="2077759" cy="206262"/>
           </a:xfrm>
           <a:prstGeom prst="rect">
             <a:avLst/>
@@ -6797,8 +6797,8 @@
         </p:nvSpPr>
         <p:spPr>
           <a:xfrm>
-            <a:off x="3076673" y="3860633"/>
-            <a:ext cx="3134722" cy="221764"/>
+            <a:off x="3058925" y="3590772"/>
+            <a:ext cx="3116639" cy="206262"/>
           </a:xfrm>
           <a:prstGeom prst="rect">
             <a:avLst/>
@@ -6930,8 +6930,8 @@
         </p:nvSpPr>
         <p:spPr>
           <a:xfrm>
-            <a:off x="6559697" y="3860633"/>
-            <a:ext cx="2089814" cy="221764"/>
+            <a:off x="6521857" y="3590772"/>
+            <a:ext cx="2077759" cy="206262"/>
           </a:xfrm>
           <a:prstGeom prst="rect">
             <a:avLst/>
@@ -7057,8 +7057,8 @@
         </p:nvSpPr>
         <p:spPr>
           <a:xfrm>
-            <a:off x="638555" y="221764"/>
-            <a:ext cx="8010957" cy="805102"/>
+            <a:off x="634877" y="206263"/>
+            <a:ext cx="7964746" cy="748825"/>
           </a:xfrm>
           <a:prstGeom prst="rect">
             <a:avLst/>
@@ -7196,8 +7196,8 @@
         </p:nvSpPr>
         <p:spPr>
           <a:xfrm>
-            <a:off x="638556" y="3860633"/>
-            <a:ext cx="2089814" cy="221764"/>
+            <a:off x="634872" y="3590772"/>
+            <a:ext cx="2077759" cy="206262"/>
           </a:xfrm>
           <a:prstGeom prst="rect">
             <a:avLst/>
@@ -7329,8 +7329,8 @@
         </p:nvSpPr>
         <p:spPr>
           <a:xfrm>
-            <a:off x="3076673" y="3860633"/>
-            <a:ext cx="3134722" cy="221764"/>
+            <a:off x="3058925" y="3590772"/>
+            <a:ext cx="3116639" cy="206262"/>
           </a:xfrm>
           <a:prstGeom prst="rect">
             <a:avLst/>
@@ -7462,8 +7462,8 @@
         </p:nvSpPr>
         <p:spPr>
           <a:xfrm>
-            <a:off x="6559697" y="3860633"/>
-            <a:ext cx="2089814" cy="221764"/>
+            <a:off x="6521857" y="3590772"/>
+            <a:ext cx="2077759" cy="206262"/>
           </a:xfrm>
           <a:prstGeom prst="rect">
             <a:avLst/>
@@ -7589,8 +7589,8 @@
         </p:nvSpPr>
         <p:spPr>
           <a:xfrm>
-            <a:off x="638556" y="3860633"/>
-            <a:ext cx="2089814" cy="221764"/>
+            <a:off x="634872" y="3590772"/>
+            <a:ext cx="2077759" cy="206262"/>
           </a:xfrm>
           <a:prstGeom prst="rect">
             <a:avLst/>
@@ -7722,8 +7722,8 @@
         </p:nvSpPr>
         <p:spPr>
           <a:xfrm>
-            <a:off x="3076673" y="3860633"/>
-            <a:ext cx="3134722" cy="221764"/>
+            <a:off x="3058925" y="3590772"/>
+            <a:ext cx="3116639" cy="206262"/>
           </a:xfrm>
           <a:prstGeom prst="rect">
             <a:avLst/>
@@ -7855,8 +7855,8 @@
         </p:nvSpPr>
         <p:spPr>
           <a:xfrm>
-            <a:off x="6559697" y="3860633"/>
-            <a:ext cx="2089814" cy="221764"/>
+            <a:off x="6521857" y="3590772"/>
+            <a:ext cx="2077759" cy="206262"/>
           </a:xfrm>
           <a:prstGeom prst="rect">
             <a:avLst/>
@@ -7982,8 +7982,8 @@
         </p:nvSpPr>
         <p:spPr>
           <a:xfrm>
-            <a:off x="639766" y="277689"/>
-            <a:ext cx="2995642" cy="971907"/>
+            <a:off x="636075" y="258282"/>
+            <a:ext cx="2978362" cy="903970"/>
           </a:xfrm>
           <a:prstGeom prst="rect">
             <a:avLst/>
@@ -8122,8 +8122,8 @@
         </p:nvSpPr>
         <p:spPr>
           <a:xfrm>
-            <a:off x="3948638" y="599732"/>
-            <a:ext cx="4702084" cy="2960075"/>
+            <a:off x="3925862" y="557813"/>
+            <a:ext cx="4674959" cy="2753163"/>
           </a:xfrm>
           <a:prstGeom prst="rect">
             <a:avLst/>
@@ -8138,7 +8138,7 @@
             <a:normAutofit/>
           </a:bodyPr>
           <a:lstStyle>
-            <a:lvl1pPr marL="457192" lvl="0" indent="-380993" algn="l">
+            <a:lvl1pPr marL="457220" lvl="0" indent="-381017" algn="l">
               <a:lnSpc>
                 <a:spcPct val="90000"/>
               </a:lnSpc>
@@ -8155,12 +8155,12 @@
               <a:buChar char="•"/>
               <a:defRPr sz="2400"/>
             </a:lvl1pPr>
-            <a:lvl2pPr marL="914383" lvl="1" indent="-361944" algn="l">
+            <a:lvl2pPr marL="914439" lvl="1" indent="-361966" algn="l">
               <a:lnSpc>
                 <a:spcPct val="90000"/>
               </a:lnSpc>
               <a:spcBef>
-                <a:spcPts val="400"/>
+                <a:spcPts val="399"/>
               </a:spcBef>
               <a:spcAft>
                 <a:spcPts val="0"/>
@@ -8170,14 +8170,14 @@
               </a:buClr>
               <a:buSzPts val="2100"/>
               <a:buChar char="•"/>
-              <a:defRPr sz="2100"/>
+              <a:defRPr sz="2101"/>
             </a:lvl2pPr>
-            <a:lvl3pPr marL="1371576" lvl="2" indent="-342894" algn="l">
+            <a:lvl3pPr marL="1371660" lvl="2" indent="-342915" algn="l">
               <a:lnSpc>
                 <a:spcPct val="90000"/>
               </a:lnSpc>
               <a:spcBef>
-                <a:spcPts val="400"/>
+                <a:spcPts val="399"/>
               </a:spcBef>
               <a:spcAft>
                 <a:spcPts val="0"/>
@@ -8189,12 +8189,12 @@
               <a:buChar char="•"/>
               <a:defRPr sz="1800"/>
             </a:lvl3pPr>
-            <a:lvl4pPr marL="1828768" lvl="3" indent="-323844" algn="l">
+            <a:lvl4pPr marL="1828881" lvl="3" indent="-323864" algn="l">
               <a:lnSpc>
                 <a:spcPct val="90000"/>
               </a:lnSpc>
               <a:spcBef>
-                <a:spcPts val="400"/>
+                <a:spcPts val="399"/>
               </a:spcBef>
               <a:spcAft>
                 <a:spcPts val="0"/>
@@ -8206,12 +8206,12 @@
               <a:buChar char="•"/>
               <a:defRPr sz="1500"/>
             </a:lvl4pPr>
-            <a:lvl5pPr marL="2285959" lvl="4" indent="-323844" algn="l">
+            <a:lvl5pPr marL="2286100" lvl="4" indent="-323864" algn="l">
               <a:lnSpc>
                 <a:spcPct val="90000"/>
               </a:lnSpc>
               <a:spcBef>
-                <a:spcPts val="400"/>
+                <a:spcPts val="399"/>
               </a:spcBef>
               <a:spcAft>
                 <a:spcPts val="0"/>
@@ -8223,12 +8223,12 @@
               <a:buChar char="•"/>
               <a:defRPr sz="1500"/>
             </a:lvl5pPr>
-            <a:lvl6pPr marL="2743151" lvl="5" indent="-323844" algn="l">
+            <a:lvl6pPr marL="2743320" lvl="5" indent="-323864" algn="l">
               <a:lnSpc>
                 <a:spcPct val="90000"/>
               </a:lnSpc>
               <a:spcBef>
-                <a:spcPts val="400"/>
+                <a:spcPts val="399"/>
               </a:spcBef>
               <a:spcAft>
                 <a:spcPts val="0"/>
@@ -8240,12 +8240,12 @@
               <a:buChar char="•"/>
               <a:defRPr sz="1500"/>
             </a:lvl6pPr>
-            <a:lvl7pPr marL="3200344" lvl="6" indent="-323844" algn="l">
+            <a:lvl7pPr marL="3200541" lvl="6" indent="-323864" algn="l">
               <a:lnSpc>
                 <a:spcPct val="90000"/>
               </a:lnSpc>
               <a:spcBef>
-                <a:spcPts val="400"/>
+                <a:spcPts val="399"/>
               </a:spcBef>
               <a:spcAft>
                 <a:spcPts val="0"/>
@@ -8257,12 +8257,12 @@
               <a:buChar char="•"/>
               <a:defRPr sz="1500"/>
             </a:lvl7pPr>
-            <a:lvl8pPr marL="3657535" lvl="7" indent="-323844" algn="l">
+            <a:lvl8pPr marL="3657761" lvl="7" indent="-323864" algn="l">
               <a:lnSpc>
                 <a:spcPct val="90000"/>
               </a:lnSpc>
               <a:spcBef>
-                <a:spcPts val="400"/>
+                <a:spcPts val="399"/>
               </a:spcBef>
               <a:spcAft>
                 <a:spcPts val="0"/>
@@ -8274,12 +8274,12 @@
               <a:buChar char="•"/>
               <a:defRPr sz="1500"/>
             </a:lvl8pPr>
-            <a:lvl9pPr marL="4114727" lvl="8" indent="-323844" algn="l">
+            <a:lvl9pPr marL="4114981" lvl="8" indent="-323864" algn="l">
               <a:lnSpc>
                 <a:spcPct val="90000"/>
               </a:lnSpc>
               <a:spcBef>
-                <a:spcPts val="400"/>
+                <a:spcPts val="399"/>
               </a:spcBef>
               <a:spcAft>
                 <a:spcPts val="0"/>
@@ -8309,8 +8309,8 @@
         </p:nvSpPr>
         <p:spPr>
           <a:xfrm>
-            <a:off x="639766" y="1249598"/>
-            <a:ext cx="2995642" cy="2315030"/>
+            <a:off x="636075" y="1162251"/>
+            <a:ext cx="2978362" cy="2153207"/>
           </a:xfrm>
           <a:prstGeom prst="rect">
             <a:avLst/>
@@ -8325,7 +8325,7 @@
             <a:normAutofit/>
           </a:bodyPr>
           <a:lstStyle>
-            <a:lvl1pPr marL="457192" lvl="0" indent="-228596" algn="l">
+            <a:lvl1pPr marL="457220" lvl="0" indent="-228610" algn="l">
               <a:lnSpc>
                 <a:spcPct val="90000"/>
               </a:lnSpc>
@@ -8342,12 +8342,12 @@
               <a:buNone/>
               <a:defRPr sz="1200"/>
             </a:lvl1pPr>
-            <a:lvl2pPr marL="914383" lvl="1" indent="-228596" algn="l">
+            <a:lvl2pPr marL="914439" lvl="1" indent="-228610" algn="l">
               <a:lnSpc>
                 <a:spcPct val="90000"/>
               </a:lnSpc>
               <a:spcBef>
-                <a:spcPts val="400"/>
+                <a:spcPts val="399"/>
               </a:spcBef>
               <a:spcAft>
                 <a:spcPts val="0"/>
@@ -8359,12 +8359,12 @@
               <a:buNone/>
               <a:defRPr sz="1100"/>
             </a:lvl2pPr>
-            <a:lvl3pPr marL="1371576" lvl="2" indent="-228596" algn="l">
+            <a:lvl3pPr marL="1371660" lvl="2" indent="-228610" algn="l">
               <a:lnSpc>
                 <a:spcPct val="90000"/>
               </a:lnSpc>
               <a:spcBef>
-                <a:spcPts val="400"/>
+                <a:spcPts val="399"/>
               </a:spcBef>
               <a:spcAft>
                 <a:spcPts val="0"/>
@@ -8376,12 +8376,12 @@
               <a:buNone/>
               <a:defRPr sz="900"/>
             </a:lvl3pPr>
-            <a:lvl4pPr marL="1828768" lvl="3" indent="-228596" algn="l">
+            <a:lvl4pPr marL="1828881" lvl="3" indent="-228610" algn="l">
               <a:lnSpc>
                 <a:spcPct val="90000"/>
               </a:lnSpc>
               <a:spcBef>
-                <a:spcPts val="400"/>
+                <a:spcPts val="399"/>
               </a:spcBef>
               <a:spcAft>
                 <a:spcPts val="0"/>
@@ -8393,12 +8393,12 @@
               <a:buNone/>
               <a:defRPr sz="800"/>
             </a:lvl4pPr>
-            <a:lvl5pPr marL="2285959" lvl="4" indent="-228596" algn="l">
+            <a:lvl5pPr marL="2286100" lvl="4" indent="-228610" algn="l">
               <a:lnSpc>
                 <a:spcPct val="90000"/>
               </a:lnSpc>
               <a:spcBef>
-                <a:spcPts val="400"/>
+                <a:spcPts val="399"/>
               </a:spcBef>
               <a:spcAft>
                 <a:spcPts val="0"/>
@@ -8410,12 +8410,12 @@
               <a:buNone/>
               <a:defRPr sz="800"/>
             </a:lvl5pPr>
-            <a:lvl6pPr marL="2743151" lvl="5" indent="-228596" algn="l">
+            <a:lvl6pPr marL="2743320" lvl="5" indent="-228610" algn="l">
               <a:lnSpc>
                 <a:spcPct val="90000"/>
               </a:lnSpc>
               <a:spcBef>
-                <a:spcPts val="400"/>
+                <a:spcPts val="399"/>
               </a:spcBef>
               <a:spcAft>
                 <a:spcPts val="0"/>
@@ -8427,12 +8427,12 @@
               <a:buNone/>
               <a:defRPr sz="800"/>
             </a:lvl6pPr>
-            <a:lvl7pPr marL="3200344" lvl="6" indent="-228596" algn="l">
+            <a:lvl7pPr marL="3200541" lvl="6" indent="-228610" algn="l">
               <a:lnSpc>
                 <a:spcPct val="90000"/>
               </a:lnSpc>
               <a:spcBef>
-                <a:spcPts val="400"/>
+                <a:spcPts val="399"/>
               </a:spcBef>
               <a:spcAft>
                 <a:spcPts val="0"/>
@@ -8444,12 +8444,12 @@
               <a:buNone/>
               <a:defRPr sz="800"/>
             </a:lvl7pPr>
-            <a:lvl8pPr marL="3657535" lvl="7" indent="-228596" algn="l">
+            <a:lvl8pPr marL="3657761" lvl="7" indent="-228610" algn="l">
               <a:lnSpc>
                 <a:spcPct val="90000"/>
               </a:lnSpc>
               <a:spcBef>
-                <a:spcPts val="400"/>
+                <a:spcPts val="399"/>
               </a:spcBef>
               <a:spcAft>
                 <a:spcPts val="0"/>
@@ -8461,12 +8461,12 @@
               <a:buNone/>
               <a:defRPr sz="800"/>
             </a:lvl8pPr>
-            <a:lvl9pPr marL="4114727" lvl="8" indent="-228596" algn="l">
+            <a:lvl9pPr marL="4114981" lvl="8" indent="-228610" algn="l">
               <a:lnSpc>
                 <a:spcPct val="90000"/>
               </a:lnSpc>
               <a:spcBef>
-                <a:spcPts val="400"/>
+                <a:spcPts val="399"/>
               </a:spcBef>
               <a:spcAft>
                 <a:spcPts val="0"/>
@@ -8496,8 +8496,8 @@
         </p:nvSpPr>
         <p:spPr>
           <a:xfrm>
-            <a:off x="638556" y="3860633"/>
-            <a:ext cx="2089814" cy="221764"/>
+            <a:off x="634872" y="3590772"/>
+            <a:ext cx="2077759" cy="206262"/>
           </a:xfrm>
           <a:prstGeom prst="rect">
             <a:avLst/>
@@ -8629,8 +8629,8 @@
         </p:nvSpPr>
         <p:spPr>
           <a:xfrm>
-            <a:off x="3076673" y="3860633"/>
-            <a:ext cx="3134722" cy="221764"/>
+            <a:off x="3058925" y="3590772"/>
+            <a:ext cx="3116639" cy="206262"/>
           </a:xfrm>
           <a:prstGeom prst="rect">
             <a:avLst/>
@@ -8762,8 +8762,8 @@
         </p:nvSpPr>
         <p:spPr>
           <a:xfrm>
-            <a:off x="6559697" y="3860633"/>
-            <a:ext cx="2089814" cy="221764"/>
+            <a:off x="6521857" y="3590772"/>
+            <a:ext cx="2077759" cy="206262"/>
           </a:xfrm>
           <a:prstGeom prst="rect">
             <a:avLst/>
@@ -8889,8 +8889,8 @@
         </p:nvSpPr>
         <p:spPr>
           <a:xfrm>
-            <a:off x="639766" y="277689"/>
-            <a:ext cx="2995642" cy="971907"/>
+            <a:off x="636075" y="258282"/>
+            <a:ext cx="2978362" cy="903970"/>
           </a:xfrm>
           <a:prstGeom prst="rect">
             <a:avLst/>
@@ -9029,8 +9029,8 @@
         </p:nvSpPr>
         <p:spPr>
           <a:xfrm>
-            <a:off x="3948638" y="599732"/>
-            <a:ext cx="4702084" cy="2960075"/>
+            <a:off x="3925862" y="557813"/>
+            <a:ext cx="4674959" cy="2753163"/>
           </a:xfrm>
           <a:prstGeom prst="rect">
             <a:avLst/>
@@ -9053,8 +9053,8 @@
         </p:nvSpPr>
         <p:spPr>
           <a:xfrm>
-            <a:off x="639766" y="1249598"/>
-            <a:ext cx="2995642" cy="2315030"/>
+            <a:off x="636075" y="1162251"/>
+            <a:ext cx="2978362" cy="2153207"/>
           </a:xfrm>
           <a:prstGeom prst="rect">
             <a:avLst/>
@@ -9069,7 +9069,7 @@
             <a:normAutofit/>
           </a:bodyPr>
           <a:lstStyle>
-            <a:lvl1pPr marL="457192" lvl="0" indent="-228596" algn="l">
+            <a:lvl1pPr marL="457220" lvl="0" indent="-228610" algn="l">
               <a:lnSpc>
                 <a:spcPct val="90000"/>
               </a:lnSpc>
@@ -9086,12 +9086,12 @@
               <a:buNone/>
               <a:defRPr sz="1200"/>
             </a:lvl1pPr>
-            <a:lvl2pPr marL="914383" lvl="1" indent="-228596" algn="l">
+            <a:lvl2pPr marL="914439" lvl="1" indent="-228610" algn="l">
               <a:lnSpc>
                 <a:spcPct val="90000"/>
               </a:lnSpc>
               <a:spcBef>
-                <a:spcPts val="400"/>
+                <a:spcPts val="399"/>
               </a:spcBef>
               <a:spcAft>
                 <a:spcPts val="0"/>
@@ -9103,12 +9103,12 @@
               <a:buNone/>
               <a:defRPr sz="1100"/>
             </a:lvl2pPr>
-            <a:lvl3pPr marL="1371576" lvl="2" indent="-228596" algn="l">
+            <a:lvl3pPr marL="1371660" lvl="2" indent="-228610" algn="l">
               <a:lnSpc>
                 <a:spcPct val="90000"/>
               </a:lnSpc>
               <a:spcBef>
-                <a:spcPts val="400"/>
+                <a:spcPts val="399"/>
               </a:spcBef>
               <a:spcAft>
                 <a:spcPts val="0"/>
@@ -9120,12 +9120,12 @@
               <a:buNone/>
               <a:defRPr sz="900"/>
             </a:lvl3pPr>
-            <a:lvl4pPr marL="1828768" lvl="3" indent="-228596" algn="l">
+            <a:lvl4pPr marL="1828881" lvl="3" indent="-228610" algn="l">
               <a:lnSpc>
                 <a:spcPct val="90000"/>
               </a:lnSpc>
               <a:spcBef>
-                <a:spcPts val="400"/>
+                <a:spcPts val="399"/>
               </a:spcBef>
               <a:spcAft>
                 <a:spcPts val="0"/>
@@ -9137,12 +9137,12 @@
               <a:buNone/>
               <a:defRPr sz="800"/>
             </a:lvl4pPr>
-            <a:lvl5pPr marL="2285959" lvl="4" indent="-228596" algn="l">
+            <a:lvl5pPr marL="2286100" lvl="4" indent="-228610" algn="l">
               <a:lnSpc>
                 <a:spcPct val="90000"/>
               </a:lnSpc>
               <a:spcBef>
-                <a:spcPts val="400"/>
+                <a:spcPts val="399"/>
               </a:spcBef>
               <a:spcAft>
                 <a:spcPts val="0"/>
@@ -9154,12 +9154,12 @@
               <a:buNone/>
               <a:defRPr sz="800"/>
             </a:lvl5pPr>
-            <a:lvl6pPr marL="2743151" lvl="5" indent="-228596" algn="l">
+            <a:lvl6pPr marL="2743320" lvl="5" indent="-228610" algn="l">
               <a:lnSpc>
                 <a:spcPct val="90000"/>
               </a:lnSpc>
               <a:spcBef>
-                <a:spcPts val="400"/>
+                <a:spcPts val="399"/>
               </a:spcBef>
               <a:spcAft>
                 <a:spcPts val="0"/>
@@ -9171,12 +9171,12 @@
               <a:buNone/>
               <a:defRPr sz="800"/>
             </a:lvl6pPr>
-            <a:lvl7pPr marL="3200344" lvl="6" indent="-228596" algn="l">
+            <a:lvl7pPr marL="3200541" lvl="6" indent="-228610" algn="l">
               <a:lnSpc>
                 <a:spcPct val="90000"/>
               </a:lnSpc>
               <a:spcBef>
-                <a:spcPts val="400"/>
+                <a:spcPts val="399"/>
               </a:spcBef>
               <a:spcAft>
                 <a:spcPts val="0"/>
@@ -9188,12 +9188,12 @@
               <a:buNone/>
               <a:defRPr sz="800"/>
             </a:lvl7pPr>
-            <a:lvl8pPr marL="3657535" lvl="7" indent="-228596" algn="l">
+            <a:lvl8pPr marL="3657761" lvl="7" indent="-228610" algn="l">
               <a:lnSpc>
                 <a:spcPct val="90000"/>
               </a:lnSpc>
               <a:spcBef>
-                <a:spcPts val="400"/>
+                <a:spcPts val="399"/>
               </a:spcBef>
               <a:spcAft>
                 <a:spcPts val="0"/>
@@ -9205,12 +9205,12 @@
               <a:buNone/>
               <a:defRPr sz="800"/>
             </a:lvl8pPr>
-            <a:lvl9pPr marL="4114727" lvl="8" indent="-228596" algn="l">
+            <a:lvl9pPr marL="4114981" lvl="8" indent="-228610" algn="l">
               <a:lnSpc>
                 <a:spcPct val="90000"/>
               </a:lnSpc>
               <a:spcBef>
-                <a:spcPts val="400"/>
+                <a:spcPts val="399"/>
               </a:spcBef>
               <a:spcAft>
                 <a:spcPts val="0"/>
@@ -9240,8 +9240,8 @@
         </p:nvSpPr>
         <p:spPr>
           <a:xfrm>
-            <a:off x="638556" y="3860633"/>
-            <a:ext cx="2089814" cy="221764"/>
+            <a:off x="634872" y="3590772"/>
+            <a:ext cx="2077759" cy="206262"/>
           </a:xfrm>
           <a:prstGeom prst="rect">
             <a:avLst/>
@@ -9373,8 +9373,8 @@
         </p:nvSpPr>
         <p:spPr>
           <a:xfrm>
-            <a:off x="3076673" y="3860633"/>
-            <a:ext cx="3134722" cy="221764"/>
+            <a:off x="3058925" y="3590772"/>
+            <a:ext cx="3116639" cy="206262"/>
           </a:xfrm>
           <a:prstGeom prst="rect">
             <a:avLst/>
@@ -9506,8 +9506,8 @@
         </p:nvSpPr>
         <p:spPr>
           <a:xfrm>
-            <a:off x="6559697" y="3860633"/>
-            <a:ext cx="2089814" cy="221764"/>
+            <a:off x="6521857" y="3590772"/>
+            <a:ext cx="2077759" cy="206262"/>
           </a:xfrm>
           <a:prstGeom prst="rect">
             <a:avLst/>
@@ -9641,8 +9641,8 @@
         </p:nvSpPr>
         <p:spPr>
           <a:xfrm>
-            <a:off x="638555" y="221764"/>
-            <a:ext cx="8010957" cy="805102"/>
+            <a:off x="634877" y="206263"/>
+            <a:ext cx="7964746" cy="748825"/>
           </a:xfrm>
           <a:prstGeom prst="rect">
             <a:avLst/>
@@ -9789,8 +9789,8 @@
         </p:nvSpPr>
         <p:spPr>
           <a:xfrm>
-            <a:off x="638555" y="1108824"/>
-            <a:ext cx="8010957" cy="2642855"/>
+            <a:off x="634877" y="1031322"/>
+            <a:ext cx="7964746" cy="2458117"/>
           </a:xfrm>
           <a:prstGeom prst="rect">
             <a:avLst/>
@@ -10057,8 +10057,8 @@
         </p:nvSpPr>
         <p:spPr>
           <a:xfrm>
-            <a:off x="638556" y="3860633"/>
-            <a:ext cx="2089814" cy="221764"/>
+            <a:off x="634872" y="3590772"/>
+            <a:ext cx="2077759" cy="206262"/>
           </a:xfrm>
           <a:prstGeom prst="rect">
             <a:avLst/>
@@ -10262,8 +10262,8 @@
         </p:nvSpPr>
         <p:spPr>
           <a:xfrm>
-            <a:off x="3076673" y="3860633"/>
-            <a:ext cx="3134722" cy="221764"/>
+            <a:off x="3058925" y="3590772"/>
+            <a:ext cx="3116639" cy="206262"/>
           </a:xfrm>
           <a:prstGeom prst="rect">
             <a:avLst/>
@@ -10467,8 +10467,8 @@
         </p:nvSpPr>
         <p:spPr>
           <a:xfrm>
-            <a:off x="6559697" y="3860633"/>
-            <a:ext cx="2089814" cy="221764"/>
+            <a:off x="6521857" y="3590772"/>
+            <a:ext cx="2077759" cy="206262"/>
           </a:xfrm>
           <a:prstGeom prst="rect">
             <a:avLst/>
@@ -11364,7 +11364,7 @@
         </p:nvSpPr>
         <p:spPr>
           <a:xfrm>
-            <a:off x="3578186" y="29327"/>
+            <a:off x="3481810" y="88635"/>
             <a:ext cx="2029832" cy="435794"/>
           </a:xfrm>
           <a:prstGeom prst="rect">
@@ -11414,10 +11414,10 @@
         </p:nvGrpSpPr>
         <p:grpSpPr>
           <a:xfrm>
-            <a:off x="7690869" y="5138082"/>
-            <a:ext cx="4106341" cy="1454030"/>
+            <a:off x="7594499" y="5197396"/>
+            <a:ext cx="4106341" cy="1423323"/>
             <a:chOff x="7929365" y="6685782"/>
-            <a:chExt cx="4106341" cy="1454030"/>
+            <a:chExt cx="4106341" cy="1423323"/>
           </a:xfrm>
         </p:grpSpPr>
         <p:grpSp>
@@ -11435,9 +11435,9 @@
           <p:grpSpPr>
             <a:xfrm>
               <a:off x="7929365" y="6685782"/>
-              <a:ext cx="4030508" cy="1454030"/>
+              <a:ext cx="4030508" cy="1423323"/>
               <a:chOff x="9171994" y="5410123"/>
-              <a:chExt cx="4030508" cy="1454030"/>
+              <a:chExt cx="4030508" cy="1423323"/>
             </a:xfrm>
           </p:grpSpPr>
           <p:sp>
@@ -11455,7 +11455,7 @@
             <p:spPr>
               <a:xfrm>
                 <a:off x="9171994" y="5410123"/>
-                <a:ext cx="4030508" cy="1454030"/>
+                <a:ext cx="4030508" cy="1423323"/>
               </a:xfrm>
               <a:prstGeom prst="roundRect">
                 <a:avLst>
@@ -12340,7 +12340,7 @@
         </p:nvGrpSpPr>
         <p:grpSpPr>
           <a:xfrm>
-            <a:off x="3735097" y="4462621"/>
+            <a:off x="3639219" y="4459943"/>
             <a:ext cx="3614433" cy="2051161"/>
             <a:chOff x="4222921" y="3385174"/>
             <a:chExt cx="3614433" cy="2051161"/>
@@ -12380,7 +12380,7 @@
             <a:bodyPr rtlCol="0" anchor="ctr"/>
             <a:lstStyle/>
             <a:p>
-              <a:pPr algn="ctr" defTabSz="914357">
+              <a:pPr algn="ctr" defTabSz="914414">
                 <a:buClrTx/>
                 <a:defRPr/>
               </a:pPr>
@@ -12429,7 +12429,7 @@
             <a:bodyPr rtlCol="0" anchor="ctr"/>
             <a:lstStyle/>
             <a:p>
-              <a:pPr algn="ctr" defTabSz="914357">
+              <a:pPr algn="ctr" defTabSz="914414">
                 <a:buClrTx/>
                 <a:defRPr/>
               </a:pPr>
@@ -12478,7 +12478,7 @@
             <a:bodyPr rtlCol="0" anchor="ctr"/>
             <a:lstStyle/>
             <a:p>
-              <a:pPr algn="ctr" defTabSz="914357">
+              <a:pPr algn="ctr" defTabSz="914414">
                 <a:buClrTx/>
                 <a:defRPr/>
               </a:pPr>
@@ -12565,7 +12565,7 @@
               <a:bodyPr rtlCol="0" anchor="ctr"/>
               <a:lstStyle/>
               <a:p>
-                <a:pPr algn="ctr" defTabSz="914357">
+                <a:pPr algn="ctr" defTabSz="914414">
                   <a:buClrTx/>
                   <a:defRPr/>
                 </a:pPr>
@@ -12643,7 +12643,7 @@
               <a:bodyPr rtlCol="0" anchor="ctr"/>
               <a:lstStyle/>
               <a:p>
-                <a:pPr algn="ctr" defTabSz="914357">
+                <a:pPr algn="ctr" defTabSz="914414">
                   <a:buClrTx/>
                   <a:defRPr/>
                 </a:pPr>
@@ -12721,7 +12721,7 @@
               <a:bodyPr rtlCol="0" anchor="ctr"/>
               <a:lstStyle/>
               <a:p>
-                <a:pPr algn="ctr" defTabSz="914357">
+                <a:pPr algn="ctr" defTabSz="914414">
                   <a:buClrTx/>
                   <a:defRPr/>
                 </a:pPr>
@@ -12761,8 +12761,8 @@
             </p:nvSpPr>
             <p:spPr>
               <a:xfrm>
-                <a:off x="4227895" y="1781397"/>
-                <a:ext cx="825866" cy="339646"/>
+                <a:off x="4227896" y="1781397"/>
+                <a:ext cx="825867" cy="329657"/>
               </a:xfrm>
               <a:prstGeom prst="rect">
                 <a:avLst/>
@@ -12775,7 +12775,7 @@
               </a:bodyPr>
               <a:lstStyle/>
               <a:p>
-                <a:pPr defTabSz="914357">
+                <a:pPr defTabSz="914414">
                   <a:buClrTx/>
                   <a:defRPr/>
                 </a:pPr>
@@ -12925,7 +12925,7 @@
               <a:bodyPr rtlCol="0" anchor="ctr"/>
               <a:lstStyle/>
               <a:p>
-                <a:pPr algn="ctr" defTabSz="914357">
+                <a:pPr algn="ctr" defTabSz="914414">
                   <a:buClrTx/>
                   <a:defRPr/>
                 </a:pPr>
@@ -13003,7 +13003,7 @@
               <a:bodyPr rtlCol="0" anchor="ctr"/>
               <a:lstStyle/>
               <a:p>
-                <a:pPr algn="ctr" defTabSz="914357">
+                <a:pPr algn="ctr" defTabSz="914414">
                   <a:buClrTx/>
                   <a:defRPr/>
                 </a:pPr>
@@ -13081,7 +13081,7 @@
               <a:bodyPr rtlCol="0" anchor="ctr"/>
               <a:lstStyle/>
               <a:p>
-                <a:pPr algn="ctr" defTabSz="914357">
+                <a:pPr algn="ctr" defTabSz="914414">
                   <a:buClrTx/>
                   <a:defRPr/>
                 </a:pPr>
@@ -13122,7 +13122,7 @@
             <p:spPr>
               <a:xfrm>
                 <a:off x="4254903" y="2792245"/>
-                <a:ext cx="825866" cy="339644"/>
+                <a:ext cx="825867" cy="329657"/>
               </a:xfrm>
               <a:prstGeom prst="rect">
                 <a:avLst/>
@@ -13135,7 +13135,7 @@
               </a:bodyPr>
               <a:lstStyle/>
               <a:p>
-                <a:pPr defTabSz="914357">
+                <a:pPr defTabSz="914414">
                   <a:buClrTx/>
                   <a:defRPr/>
                 </a:pPr>
@@ -13285,7 +13285,7 @@
               <a:bodyPr rtlCol="0" anchor="ctr"/>
               <a:lstStyle/>
               <a:p>
-                <a:pPr algn="ctr" defTabSz="914357">
+                <a:pPr algn="ctr" defTabSz="914414">
                   <a:buClrTx/>
                   <a:defRPr/>
                 </a:pPr>
@@ -13363,7 +13363,7 @@
               <a:bodyPr rtlCol="0" anchor="ctr"/>
               <a:lstStyle/>
               <a:p>
-                <a:pPr algn="ctr" defTabSz="914357">
+                <a:pPr algn="ctr" defTabSz="914414">
                   <a:buClrTx/>
                   <a:defRPr/>
                 </a:pPr>
@@ -13441,7 +13441,7 @@
               <a:bodyPr rtlCol="0" anchor="ctr"/>
               <a:lstStyle/>
               <a:p>
-                <a:pPr algn="ctr" defTabSz="914357">
+                <a:pPr algn="ctr" defTabSz="914414">
                   <a:buClrTx/>
                   <a:defRPr/>
                 </a:pPr>
@@ -13596,7 +13596,7 @@
             </p:nvSpPr>
             <p:spPr>
               <a:xfrm>
-                <a:off x="3767375" y="3513339"/>
+                <a:off x="3767375" y="3513340"/>
                 <a:ext cx="1376202" cy="329657"/>
               </a:xfrm>
               <a:prstGeom prst="rect">
@@ -13610,7 +13610,7 @@
               </a:bodyPr>
               <a:lstStyle/>
               <a:p>
-                <a:pPr defTabSz="914357">
+                <a:pPr defTabSz="914414">
                   <a:buClrTx/>
                   <a:defRPr/>
                 </a:pPr>
@@ -13726,8 +13726,8 @@
             </p:nvSpPr>
             <p:spPr>
               <a:xfrm>
-                <a:off x="2260645" y="2547254"/>
-                <a:ext cx="999072" cy="339645"/>
+                <a:off x="2260645" y="2547255"/>
+                <a:ext cx="999072" cy="329657"/>
               </a:xfrm>
               <a:prstGeom prst="rect">
                 <a:avLst/>
@@ -13740,7 +13740,7 @@
               </a:bodyPr>
               <a:lstStyle/>
               <a:p>
-                <a:pPr defTabSz="914357">
+                <a:pPr defTabSz="914414">
                   <a:buClrTx/>
                   <a:defRPr/>
                 </a:pPr>
@@ -13780,8 +13780,8 @@
             </p:nvSpPr>
             <p:spPr>
               <a:xfrm>
-                <a:off x="6255709" y="2514128"/>
-                <a:ext cx="994230" cy="339645"/>
+                <a:off x="6255709" y="2514127"/>
+                <a:ext cx="994230" cy="329657"/>
               </a:xfrm>
               <a:prstGeom prst="rect">
                 <a:avLst/>
@@ -13794,7 +13794,7 @@
               </a:bodyPr>
               <a:lstStyle/>
               <a:p>
-                <a:pPr defTabSz="914357">
+                <a:pPr defTabSz="914414">
                   <a:buClrTx/>
                   <a:defRPr/>
                 </a:pPr>
@@ -13836,8 +13836,8 @@
         </p:nvSpPr>
         <p:spPr>
           <a:xfrm>
-            <a:off x="3714347" y="3862709"/>
-            <a:ext cx="3606839" cy="408044"/>
+            <a:off x="3618464" y="3860025"/>
+            <a:ext cx="3606840" cy="408044"/>
           </a:xfrm>
           <a:prstGeom prst="rect">
             <a:avLst/>
@@ -13883,7 +13883,7 @@
         </p:nvSpPr>
         <p:spPr>
           <a:xfrm rot="10800000">
-            <a:off x="5874793" y="4250476"/>
+            <a:off x="5778916" y="4247799"/>
             <a:ext cx="192655" cy="192649"/>
           </a:xfrm>
           <a:prstGeom prst="downArrow">
@@ -13935,7 +13935,7 @@
         </p:nvSpPr>
         <p:spPr>
           <a:xfrm>
-            <a:off x="3626968" y="4217561"/>
+            <a:off x="3531084" y="4214877"/>
             <a:ext cx="2784192" cy="215900"/>
           </a:xfrm>
           <a:prstGeom prst="rect">
@@ -13977,8 +13977,8 @@
         </p:nvSpPr>
         <p:spPr>
           <a:xfrm>
-            <a:off x="3614197" y="3466132"/>
-            <a:ext cx="3864826" cy="3197196"/>
+            <a:off x="3517819" y="3525440"/>
+            <a:ext cx="3864826" cy="3064900"/>
           </a:xfrm>
           <a:prstGeom prst="roundRect">
             <a:avLst>
@@ -14020,7 +14020,7 @@
         </p:nvSpPr>
         <p:spPr>
           <a:xfrm>
-            <a:off x="3546311" y="3500075"/>
+            <a:off x="3449941" y="3559383"/>
             <a:ext cx="2093583" cy="266700"/>
           </a:xfrm>
           <a:prstGeom prst="rect">
@@ -14072,7 +14072,7 @@
         </p:nvCxnSpPr>
         <p:spPr>
           <a:xfrm>
-            <a:off x="1683657" y="1832635"/>
+            <a:off x="1587280" y="1891949"/>
             <a:ext cx="0" cy="199365"/>
           </a:xfrm>
           <a:prstGeom prst="straightConnector1">
@@ -14115,8 +14115,8 @@
         </p:nvCxnSpPr>
         <p:spPr>
           <a:xfrm flipV="1">
-            <a:off x="3318432" y="5064730"/>
-            <a:ext cx="295765" cy="0"/>
+            <a:off x="3222055" y="5057896"/>
+            <a:ext cx="295766" cy="84109"/>
           </a:xfrm>
           <a:prstGeom prst="straightConnector1">
             <a:avLst/>
@@ -14154,7 +14154,7 @@
         </p:nvGrpSpPr>
         <p:grpSpPr>
           <a:xfrm>
-            <a:off x="3699368" y="427014"/>
+            <a:off x="3602996" y="486326"/>
             <a:ext cx="3722489" cy="1229875"/>
             <a:chOff x="3384012" y="411776"/>
             <a:chExt cx="3722489" cy="1229875"/>
@@ -14601,7 +14601,7 @@
         </p:nvCxnSpPr>
         <p:spPr>
           <a:xfrm flipV="1">
-            <a:off x="7616388" y="1684265"/>
+            <a:off x="7520018" y="1743572"/>
             <a:ext cx="532671" cy="148370"/>
           </a:xfrm>
           <a:prstGeom prst="line">
@@ -14638,8 +14638,8 @@
         </p:nvSpPr>
         <p:spPr>
           <a:xfrm>
-            <a:off x="7466274" y="535986"/>
-            <a:ext cx="185539" cy="2570480"/>
+            <a:off x="7369897" y="595299"/>
+            <a:ext cx="185540" cy="2570481"/>
           </a:xfrm>
           <a:prstGeom prst="rightBrace">
             <a:avLst>
@@ -14687,7 +14687,7 @@
         </p:nvGrpSpPr>
         <p:grpSpPr>
           <a:xfrm>
-            <a:off x="9925634" y="1803387"/>
+            <a:off x="9829265" y="1862694"/>
             <a:ext cx="2572715" cy="698500"/>
             <a:chOff x="4604727" y="4920679"/>
             <a:chExt cx="2572715" cy="698500"/>
@@ -15080,7 +15080,7 @@
         </p:nvGrpSpPr>
         <p:grpSpPr>
           <a:xfrm>
-            <a:off x="10078415" y="347724"/>
+            <a:off x="9982043" y="407036"/>
             <a:ext cx="1573515" cy="1221129"/>
             <a:chOff x="8913758" y="1877718"/>
             <a:chExt cx="1573515" cy="1221129"/>
@@ -15533,7 +15533,7 @@
         </p:nvGrpSpPr>
         <p:grpSpPr>
           <a:xfrm>
-            <a:off x="8068103" y="608800"/>
+            <a:off x="7971726" y="668107"/>
             <a:ext cx="1573196" cy="1508796"/>
             <a:chOff x="7841246" y="659452"/>
             <a:chExt cx="1573196" cy="1508796"/>
@@ -15966,7 +15966,7 @@
         </p:nvGrpSpPr>
         <p:grpSpPr>
           <a:xfrm>
-            <a:off x="7968777" y="287661"/>
+            <a:off x="7872400" y="346968"/>
             <a:ext cx="2507752" cy="279400"/>
             <a:chOff x="7741716" y="1157582"/>
             <a:chExt cx="2507752" cy="279400"/>
@@ -16132,7 +16132,7 @@
         </p:nvSpPr>
         <p:spPr>
           <a:xfrm>
-            <a:off x="9434051" y="984997"/>
+            <a:off x="9337681" y="1044311"/>
             <a:ext cx="613183" cy="1205177"/>
           </a:xfrm>
           <a:prstGeom prst="curvedRightArrow">
@@ -16183,7 +16183,7 @@
         </p:nvGrpSpPr>
         <p:grpSpPr>
           <a:xfrm>
-            <a:off x="8418593" y="2791971"/>
+            <a:off x="8322223" y="2851285"/>
             <a:ext cx="4011241" cy="691581"/>
             <a:chOff x="4695829" y="5705803"/>
             <a:chExt cx="4011241" cy="691581"/>
@@ -16615,8 +16615,8 @@
         </p:nvSpPr>
         <p:spPr>
           <a:xfrm>
-            <a:off x="9563414" y="1479240"/>
-            <a:ext cx="2343177" cy="264468"/>
+            <a:off x="9467044" y="1538548"/>
+            <a:ext cx="2343177" cy="261610"/>
           </a:xfrm>
           <a:prstGeom prst="rect">
             <a:avLst/>
@@ -16650,7 +16650,7 @@
         </p:nvSpPr>
         <p:spPr>
           <a:xfrm>
-            <a:off x="11266629" y="2525702"/>
+            <a:off x="11170259" y="2585009"/>
             <a:ext cx="214835" cy="290428"/>
           </a:xfrm>
           <a:prstGeom prst="downArrow">
@@ -16702,7 +16702,7 @@
         </p:nvSpPr>
         <p:spPr>
           <a:xfrm>
-            <a:off x="7879859" y="268570"/>
+            <a:off x="7783482" y="327877"/>
             <a:ext cx="4257616" cy="4591298"/>
           </a:xfrm>
           <a:prstGeom prst="roundRect">
@@ -16746,7 +16746,7 @@
         </p:nvGrpSpPr>
         <p:grpSpPr>
           <a:xfrm>
-            <a:off x="9068586" y="3851453"/>
+            <a:off x="8972216" y="3910766"/>
             <a:ext cx="2468789" cy="973427"/>
             <a:chOff x="8501761" y="3093823"/>
             <a:chExt cx="2468789" cy="973427"/>
@@ -17192,7 +17192,7 @@
         </p:nvGrpSpPr>
         <p:grpSpPr>
           <a:xfrm>
-            <a:off x="7916904" y="3821662"/>
+            <a:off x="7820534" y="3880976"/>
             <a:ext cx="1261461" cy="964593"/>
             <a:chOff x="10984860" y="3003295"/>
             <a:chExt cx="1261461" cy="964593"/>
@@ -17487,7 +17487,7 @@
         </p:nvSpPr>
         <p:spPr>
           <a:xfrm>
-            <a:off x="7820845" y="3506653"/>
+            <a:off x="7724469" y="3565961"/>
             <a:ext cx="3677266" cy="261610"/>
           </a:xfrm>
           <a:prstGeom prst="rect">
@@ -17566,8 +17566,8 @@
         </p:nvGrpSpPr>
         <p:grpSpPr>
           <a:xfrm>
-            <a:off x="8146577" y="2514946"/>
-            <a:ext cx="2906025" cy="296726"/>
+            <a:off x="8050206" y="2574261"/>
+            <a:ext cx="2906025" cy="296727"/>
             <a:chOff x="7048010" y="2464189"/>
             <a:chExt cx="2906025" cy="296726"/>
           </a:xfrm>
@@ -17587,7 +17587,7 @@
           <p:spPr>
             <a:xfrm>
               <a:off x="7048010" y="2464189"/>
-              <a:ext cx="2800435" cy="261610"/>
+              <a:ext cx="2800435" cy="261609"/>
             </a:xfrm>
             <a:prstGeom prst="rect">
               <a:avLst/>
@@ -17713,7 +17713,7 @@
         </p:nvSpPr>
         <p:spPr>
           <a:xfrm rot="16200000" flipV="1">
-            <a:off x="9966518" y="2342532"/>
+            <a:off x="9870141" y="2401839"/>
             <a:ext cx="3566704" cy="495808"/>
           </a:xfrm>
           <a:prstGeom prst="uturnArrow">
@@ -17767,7 +17767,7 @@
         </p:nvSpPr>
         <p:spPr>
           <a:xfrm>
-            <a:off x="11277774" y="3526375"/>
+            <a:off x="11181403" y="3585682"/>
             <a:ext cx="220337" cy="304330"/>
           </a:xfrm>
           <a:prstGeom prst="downArrow">
@@ -17819,7 +17819,7 @@
         </p:nvSpPr>
         <p:spPr>
           <a:xfrm rot="5400000">
-            <a:off x="10471434" y="2598569"/>
+            <a:off x="10375058" y="2657876"/>
             <a:ext cx="2468788" cy="296876"/>
           </a:xfrm>
           <a:prstGeom prst="rect">
@@ -17877,7 +17877,7 @@
         </p:nvSpPr>
         <p:spPr>
           <a:xfrm rot="10800000">
-            <a:off x="3546311" y="79493"/>
+            <a:off x="3449934" y="138801"/>
             <a:ext cx="8752132" cy="4932774"/>
           </a:xfrm>
           <a:prstGeom prst="corner">
@@ -17937,8 +17937,8 @@
         </p:nvCxnSpPr>
         <p:spPr>
           <a:xfrm flipV="1">
-            <a:off x="7321186" y="3157345"/>
-            <a:ext cx="1111215" cy="909386"/>
+            <a:off x="7225309" y="3216659"/>
+            <a:ext cx="1110721" cy="847395"/>
           </a:xfrm>
           <a:prstGeom prst="curvedConnector3">
             <a:avLst/>
@@ -17980,7 +17980,7 @@
         </p:nvGrpSpPr>
         <p:grpSpPr>
           <a:xfrm>
-            <a:off x="3673802" y="1766164"/>
+            <a:off x="3577432" y="1825471"/>
             <a:ext cx="4051401" cy="1358054"/>
             <a:chOff x="3390598" y="1821226"/>
             <a:chExt cx="4051401" cy="1358054"/>
@@ -18321,10 +18321,10 @@
                     <a:defRPr/>
                   </a:pPr>
                   <a:r>
-                    <a:rPr lang="en-US" sz="700"/>
+                    <a:rPr lang="en-US" sz="700" dirty="0"/>
                     <a:t>Mono Scripts Implemented Entity Interface</a:t>
                   </a:r>
-                  <a:endParaRPr lang="en-US" sz="1100"/>
+                  <a:endParaRPr lang="en-US" sz="1100" dirty="0"/>
                 </a:p>
               </p:txBody>
             </p:sp>
@@ -18952,7 +18952,7 @@
         </p:nvCxnSpPr>
         <p:spPr>
           <a:xfrm>
-            <a:off x="1685834" y="3466132"/>
+            <a:off x="1589457" y="3525440"/>
             <a:ext cx="0" cy="212408"/>
           </a:xfrm>
           <a:prstGeom prst="straightConnector1">
@@ -18991,7 +18991,7 @@
         </p:nvGrpSpPr>
         <p:grpSpPr>
           <a:xfrm>
-            <a:off x="207500" y="149897"/>
+            <a:off x="111125" y="209205"/>
             <a:ext cx="3079879" cy="1682738"/>
             <a:chOff x="284091" y="91500"/>
             <a:chExt cx="3079879" cy="1682738"/>
@@ -19255,7 +19255,7 @@
               </a:fontRef>
             </p:style>
             <p:txBody>
-              <a:bodyPr lIns="91440" tIns="45720" rIns="35560" bIns="45720" rtlCol="0" anchor="ctr">
+              <a:bodyPr lIns="91440" tIns="45720" rIns="35559" bIns="45720" rtlCol="0" anchor="ctr">
                 <a:noAutofit/>
               </a:bodyPr>
               <a:lstStyle/>
@@ -19752,7 +19752,7 @@
               </a:fontRef>
             </p:style>
             <p:txBody>
-              <a:bodyPr lIns="91440" tIns="45720" rIns="35560" bIns="45720" rtlCol="0" anchor="ctr">
+              <a:bodyPr lIns="91440" tIns="45720" rIns="35559" bIns="45720" rtlCol="0" anchor="ctr">
                 <a:noAutofit/>
               </a:bodyPr>
               <a:lstStyle/>
@@ -19774,7 +19774,7 @@
         </p:nvSpPr>
         <p:spPr>
           <a:xfrm>
-            <a:off x="247419" y="2056197"/>
+            <a:off x="151047" y="2115509"/>
             <a:ext cx="2983571" cy="1397127"/>
           </a:xfrm>
           <a:prstGeom prst="roundRect">
@@ -19819,7 +19819,7 @@
         </p:nvGrpSpPr>
         <p:grpSpPr>
           <a:xfrm>
-            <a:off x="339568" y="2414872"/>
+            <a:off x="243191" y="2474184"/>
             <a:ext cx="1319306" cy="873207"/>
             <a:chOff x="2849604" y="5857387"/>
             <a:chExt cx="2280543" cy="1323090"/>
@@ -20385,7 +20385,7 @@
         </p:nvGrpSpPr>
         <p:grpSpPr>
           <a:xfrm>
-            <a:off x="1782885" y="2497274"/>
+            <a:off x="1686515" y="2556588"/>
             <a:ext cx="1320333" cy="710715"/>
             <a:chOff x="201783" y="7309654"/>
             <a:chExt cx="1214093" cy="429113"/>
@@ -20594,7 +20594,7 @@
         </p:nvSpPr>
         <p:spPr>
           <a:xfrm>
-            <a:off x="239526" y="2038407"/>
+            <a:off x="143154" y="2097715"/>
             <a:ext cx="2413341" cy="335688"/>
           </a:xfrm>
           <a:prstGeom prst="rect">
@@ -20642,13 +20642,13 @@
           <p:nvPr>
             <p:extLst>
               <p:ext uri="{D42A27DB-BD31-4B8C-83A1-F6EECF244321}">
-                <p14:modId xmlns:p14="http://schemas.microsoft.com/office/powerpoint/2010/main" val="3773183059"/>
+                <p14:modId xmlns:p14="http://schemas.microsoft.com/office/powerpoint/2010/main" val="692604605"/>
               </p:ext>
             </p:extLst>
           </p:nvPr>
         </p:nvGraphicFramePr>
         <p:xfrm>
-          <a:off x="1865257" y="5488213"/>
+          <a:off x="1768887" y="5547520"/>
           <a:ext cx="1204349" cy="792480"/>
         </p:xfrm>
         <a:graphic>
@@ -20666,7 +20666,7 @@
                   </a:extLst>
                 </a:gridCol>
               </a:tblGrid>
-              <a:tr h="167915">
+              <a:tr h="243840">
                 <a:tc>
                   <a:txBody>
                     <a:bodyPr/>
@@ -20726,7 +20726,7 @@
                   </a:ext>
                 </a:extLst>
               </a:tr>
-              <a:tr h="146926">
+              <a:tr h="213360">
                 <a:tc>
                   <a:txBody>
                     <a:bodyPr/>
@@ -20751,7 +20751,7 @@
                   </a:ext>
                 </a:extLst>
               </a:tr>
-              <a:tr h="230883">
+              <a:tr h="335280">
                 <a:tc>
                   <a:txBody>
                     <a:bodyPr/>
@@ -20796,7 +20796,7 @@
         </p:nvSpPr>
         <p:spPr>
           <a:xfrm>
-            <a:off x="246613" y="3662870"/>
+            <a:off x="150240" y="3722177"/>
             <a:ext cx="2413341" cy="335688"/>
           </a:xfrm>
           <a:prstGeom prst="rect">
@@ -20843,7 +20843,7 @@
         </p:nvSpPr>
         <p:spPr>
           <a:xfrm>
-            <a:off x="255923" y="3673369"/>
+            <a:off x="159551" y="3732675"/>
             <a:ext cx="3062509" cy="2818644"/>
           </a:xfrm>
           <a:prstGeom prst="roundRect">
@@ -20888,7 +20888,7 @@
         </p:nvSpPr>
         <p:spPr>
           <a:xfrm>
-            <a:off x="332619" y="5271107"/>
+            <a:off x="236241" y="5330413"/>
             <a:ext cx="2880742" cy="1085244"/>
           </a:xfrm>
           <a:prstGeom prst="roundRect">
@@ -20938,7 +20938,7 @@
         </p:nvGrpSpPr>
         <p:grpSpPr>
           <a:xfrm>
-            <a:off x="493141" y="5230330"/>
+            <a:off x="396769" y="5289638"/>
             <a:ext cx="2027683" cy="1016322"/>
             <a:chOff x="493141" y="5230330"/>
             <a:chExt cx="2027683" cy="1016322"/>
@@ -21722,7 +21722,7 @@
               </a:fontRef>
             </p:style>
             <p:txBody>
-              <a:bodyPr lIns="91440" tIns="45720" rIns="35560" bIns="45720" rtlCol="0" anchor="ctr">
+              <a:bodyPr lIns="91440" tIns="45720" rIns="35559" bIns="45720" rtlCol="0" anchor="ctr">
                 <a:noAutofit/>
               </a:bodyPr>
               <a:lstStyle/>
@@ -21805,7 +21805,7 @@
         </p:nvGrpSpPr>
         <p:grpSpPr>
           <a:xfrm>
-            <a:off x="301960" y="4002766"/>
+            <a:off x="205588" y="4062078"/>
             <a:ext cx="2937363" cy="1173619"/>
             <a:chOff x="388700" y="4145621"/>
             <a:chExt cx="2937363" cy="1173619"/>
@@ -22403,7 +22403,7 @@
         </p:nvCxnSpPr>
         <p:spPr>
           <a:xfrm flipV="1">
-            <a:off x="2262591" y="4698728"/>
+            <a:off x="2166221" y="4758035"/>
             <a:ext cx="258233" cy="42332"/>
           </a:xfrm>
           <a:prstGeom prst="line">

</xml_diff>